<commit_message>
helth check no complete | Restful datatest no complete | Restful Websocket datatest no complete
</commit_message>
<xml_diff>
--- a/空白PPT.pptx
+++ b/空白PPT.pptx
@@ -5,18 +5,21 @@
     <p:sldMasterId id="2147483648" r:id="rId1"/>
   </p:sldMasterIdLst>
   <p:notesMasterIdLst>
-    <p:notesMasterId r:id="rId11"/>
+    <p:notesMasterId r:id="rId14"/>
   </p:notesMasterIdLst>
   <p:sldIdLst>
     <p:sldId id="256" r:id="rId2"/>
     <p:sldId id="296" r:id="rId3"/>
     <p:sldId id="291" r:id="rId4"/>
     <p:sldId id="354" r:id="rId5"/>
-    <p:sldId id="383" r:id="rId6"/>
-    <p:sldId id="384" r:id="rId7"/>
-    <p:sldId id="385" r:id="rId8"/>
-    <p:sldId id="386" r:id="rId9"/>
-    <p:sldId id="286" r:id="rId10"/>
+    <p:sldId id="387" r:id="rId6"/>
+    <p:sldId id="388" r:id="rId7"/>
+    <p:sldId id="389" r:id="rId8"/>
+    <p:sldId id="383" r:id="rId9"/>
+    <p:sldId id="384" r:id="rId10"/>
+    <p:sldId id="385" r:id="rId11"/>
+    <p:sldId id="386" r:id="rId12"/>
+    <p:sldId id="286" r:id="rId13"/>
   </p:sldIdLst>
   <p:sldSz cx="12192000" cy="6858000"/>
   <p:notesSz cx="6858000" cy="9144000"/>
@@ -124,6 +127,9 @@
             <p14:sldId id="296"/>
             <p14:sldId id="291"/>
             <p14:sldId id="354"/>
+            <p14:sldId id="387"/>
+            <p14:sldId id="388"/>
+            <p14:sldId id="389"/>
             <p14:sldId id="383"/>
             <p14:sldId id="384"/>
             <p14:sldId id="385"/>
@@ -134,7 +140,7 @@
       </p14:sectionLst>
     </p:ext>
     <p:ext uri="{EFAFB233-063F-42B5-8137-9DF3F51BA10A}">
-      <p15:sldGuideLst xmlns:p15="http://schemas.microsoft.com/office/powerpoint/2012/main" xmlns="">
+      <p15:sldGuideLst xmlns="" xmlns:p15="http://schemas.microsoft.com/office/powerpoint/2012/main">
         <p15:guide id="1" orient="horz" pos="2160">
           <p15:clr>
             <a:srgbClr val="A4A3A4"/>
@@ -233,7 +239,7 @@
           <a:p>
             <a:fld id="{1BA5755D-7932-44A5-A2C7-C8A2CBF288E8}" type="datetimeFigureOut">
               <a:rPr lang="zh-TW" altLang="en-US" smtClean="0"/>
-              <a:t>2020/2/3</a:t>
+              <a:t>2020/2/6</a:t>
             </a:fld>
             <a:endParaRPr lang="zh-TW" altLang="en-US"/>
           </a:p>
@@ -713,6 +719,178 @@
           <a:lstStyle/>
           <a:p>
             <a:r>
+              <a:rPr lang="en-US" altLang="zh-CN" dirty="0" smtClean="0"/>
+              <a:t>API = </a:t>
+            </a:r>
+            <a:r>
+              <a:rPr lang="en-US" altLang="zh-TW" b="0" dirty="0" smtClean="0"/>
+              <a:t> Application Programming Interface</a:t>
+            </a:r>
+          </a:p>
+          <a:p>
+            <a:r>
+              <a:rPr lang="en-US" altLang="zh-TW" b="0" dirty="0" smtClean="0"/>
+              <a:t>RPC</a:t>
+            </a:r>
+            <a:r>
+              <a:rPr lang="en-US" altLang="zh-TW" b="0" baseline="0" dirty="0" smtClean="0"/>
+              <a:t> = </a:t>
+            </a:r>
+            <a:r>
+              <a:rPr lang="zh-TW" altLang="en-US" sz="1200" b="0" i="0" kern="1200" dirty="0" smtClean="0">
+                <a:solidFill>
+                  <a:schemeClr val="tx1"/>
+                </a:solidFill>
+                <a:effectLst/>
+                <a:latin typeface="+mn-lt"/>
+                <a:ea typeface="+mn-ea"/>
+                <a:cs typeface="+mn-cs"/>
+              </a:rPr>
+              <a:t>遠端程序呼叫</a:t>
+            </a:r>
+            <a:endParaRPr lang="en-US" altLang="zh-TW" sz="1200" b="0" i="0" kern="1200" dirty="0" smtClean="0">
+              <a:solidFill>
+                <a:schemeClr val="tx1"/>
+              </a:solidFill>
+              <a:effectLst/>
+              <a:latin typeface="+mn-lt"/>
+              <a:ea typeface="+mn-ea"/>
+              <a:cs typeface="+mn-cs"/>
+            </a:endParaRPr>
+          </a:p>
+          <a:p>
+            <a:r>
+              <a:rPr lang="en-US" altLang="zh-TW" sz="1200" b="0" i="0" kern="1200" dirty="0" err="1" smtClean="0">
+                <a:solidFill>
+                  <a:schemeClr val="tx1"/>
+                </a:solidFill>
+                <a:effectLst/>
+                <a:latin typeface="+mn-lt"/>
+                <a:ea typeface="+mn-ea"/>
+                <a:cs typeface="+mn-cs"/>
+              </a:rPr>
+              <a:t>GraphQL</a:t>
+            </a:r>
+            <a:r>
+              <a:rPr lang="en-US" altLang="zh-TW" sz="1200" b="0" i="0" kern="1200" dirty="0" smtClean="0">
+                <a:solidFill>
+                  <a:schemeClr val="tx1"/>
+                </a:solidFill>
+                <a:effectLst/>
+                <a:latin typeface="+mn-lt"/>
+                <a:ea typeface="+mn-ea"/>
+                <a:cs typeface="+mn-cs"/>
+              </a:rPr>
+              <a:t> = Graph </a:t>
+            </a:r>
+            <a:r>
+              <a:rPr lang="zh-CN" altLang="en-US" sz="1200" b="0" i="0" kern="1200" dirty="0" smtClean="0">
+                <a:solidFill>
+                  <a:schemeClr val="tx1"/>
+                </a:solidFill>
+                <a:effectLst/>
+                <a:latin typeface="+mn-lt"/>
+                <a:ea typeface="+mn-ea"/>
+                <a:cs typeface="+mn-cs"/>
+              </a:rPr>
+              <a:t>查詢語言</a:t>
+            </a:r>
+            <a:endParaRPr lang="en-US" altLang="zh-TW" sz="1200" b="0" i="0" kern="1200" dirty="0" smtClean="0">
+              <a:solidFill>
+                <a:schemeClr val="tx1"/>
+              </a:solidFill>
+              <a:effectLst/>
+              <a:latin typeface="+mn-lt"/>
+              <a:ea typeface="+mn-ea"/>
+              <a:cs typeface="+mn-cs"/>
+            </a:endParaRPr>
+          </a:p>
+          <a:p>
+            <a:endParaRPr lang="zh-TW" altLang="en-US" dirty="0"/>
+          </a:p>
+        </p:txBody>
+      </p:sp>
+      <p:sp>
+        <p:nvSpPr>
+          <p:cNvPr id="4" name="投影片編號版面配置區 3"/>
+          <p:cNvSpPr>
+            <a:spLocks noGrp="1"/>
+          </p:cNvSpPr>
+          <p:nvPr>
+            <p:ph type="sldNum" sz="quarter" idx="10"/>
+          </p:nvPr>
+        </p:nvSpPr>
+        <p:spPr/>
+        <p:txBody>
+          <a:bodyPr/>
+          <a:lstStyle/>
+          <a:p>
+            <a:fld id="{EEBFCD98-6B9E-4D19-9C43-11FCDEF19DFC}" type="slidenum">
+              <a:rPr lang="zh-TW" altLang="en-US" smtClean="0"/>
+              <a:t>5</a:t>
+            </a:fld>
+            <a:endParaRPr lang="zh-TW" altLang="en-US"/>
+          </a:p>
+        </p:txBody>
+      </p:sp>
+    </p:spTree>
+    <p:extLst>
+      <p:ext uri="{BB962C8B-B14F-4D97-AF65-F5344CB8AC3E}">
+        <p14:creationId xmlns:p14="http://schemas.microsoft.com/office/powerpoint/2010/main" val="2643004282"/>
+      </p:ext>
+    </p:extLst>
+  </p:cSld>
+  <p:clrMapOvr>
+    <a:masterClrMapping/>
+  </p:clrMapOvr>
+</p:notes>
+</file>
+
+<file path=ppt/notesSlides/notesSlide4.xml><?xml version="1.0" encoding="utf-8"?>
+<p:notes xmlns:a="http://schemas.openxmlformats.org/drawingml/2006/main" xmlns:r="http://schemas.openxmlformats.org/officeDocument/2006/relationships" xmlns:p="http://schemas.openxmlformats.org/presentationml/2006/main">
+  <p:cSld>
+    <p:spTree>
+      <p:nvGrpSpPr>
+        <p:cNvPr id="1" name=""/>
+        <p:cNvGrpSpPr/>
+        <p:nvPr/>
+      </p:nvGrpSpPr>
+      <p:grpSpPr>
+        <a:xfrm>
+          <a:off x="0" y="0"/>
+          <a:ext cx="0" cy="0"/>
+          <a:chOff x="0" y="0"/>
+          <a:chExt cx="0" cy="0"/>
+        </a:xfrm>
+      </p:grpSpPr>
+      <p:sp>
+        <p:nvSpPr>
+          <p:cNvPr id="2" name="投影片圖像版面配置區 1"/>
+          <p:cNvSpPr>
+            <a:spLocks noGrp="1" noRot="1" noChangeAspect="1"/>
+          </p:cNvSpPr>
+          <p:nvPr>
+            <p:ph type="sldImg"/>
+          </p:nvPr>
+        </p:nvSpPr>
+        <p:spPr/>
+      </p:sp>
+      <p:sp>
+        <p:nvSpPr>
+          <p:cNvPr id="3" name="備忘稿版面配置區 2"/>
+          <p:cNvSpPr>
+            <a:spLocks noGrp="1"/>
+          </p:cNvSpPr>
+          <p:nvPr>
+            <p:ph type="body" idx="1"/>
+          </p:nvPr>
+        </p:nvSpPr>
+        <p:spPr/>
+        <p:txBody>
+          <a:bodyPr/>
+          <a:lstStyle/>
+          <a:p>
+            <a:r>
               <a:rPr lang="zh-CN" altLang="en-US" dirty="0" smtClean="0"/>
               <a:t>設定 </a:t>
             </a:r>
@@ -1239,7 +1417,7 @@
           <a:p>
             <a:fld id="{EEBFCD98-6B9E-4D19-9C43-11FCDEF19DFC}" type="slidenum">
               <a:rPr lang="zh-TW" altLang="en-US" smtClean="0"/>
-              <a:t>9</a:t>
+              <a:t>12</a:t>
             </a:fld>
             <a:endParaRPr lang="zh-TW" altLang="en-US"/>
           </a:p>
@@ -1280,7 +1458,7 @@
           <p:cNvPr id="2" name="標題 1">
             <a:extLst>
               <a:ext uri="{FF2B5EF4-FFF2-40B4-BE49-F238E27FC236}">
-                <a16:creationId xmlns="" xmlns:a16="http://schemas.microsoft.com/office/drawing/2014/main" id="{6A1C7254-695B-1F42-AC59-34E8D858E936}"/>
+                <a16:creationId xmlns:a16="http://schemas.microsoft.com/office/drawing/2014/main" xmlns="" id="{6A1C7254-695B-1F42-AC59-34E8D858E936}"/>
               </a:ext>
             </a:extLst>
           </p:cNvPr>
@@ -1323,7 +1501,7 @@
           <p:cNvPr id="3" name="文字版面配置區 2">
             <a:extLst>
               <a:ext uri="{FF2B5EF4-FFF2-40B4-BE49-F238E27FC236}">
-                <a16:creationId xmlns="" xmlns:a16="http://schemas.microsoft.com/office/drawing/2014/main" id="{1D19DA3B-2013-E14B-A941-CC519B76AD6F}"/>
+                <a16:creationId xmlns:a16="http://schemas.microsoft.com/office/drawing/2014/main" xmlns="" id="{1D19DA3B-2013-E14B-A941-CC519B76AD6F}"/>
               </a:ext>
             </a:extLst>
           </p:cNvPr>
@@ -1448,7 +1626,7 @@
           <p:cNvPr id="4" name="日期版面配置區 3">
             <a:extLst>
               <a:ext uri="{FF2B5EF4-FFF2-40B4-BE49-F238E27FC236}">
-                <a16:creationId xmlns="" xmlns:a16="http://schemas.microsoft.com/office/drawing/2014/main" id="{BC7211D9-290C-574E-B682-764110BB9BAF}"/>
+                <a16:creationId xmlns:a16="http://schemas.microsoft.com/office/drawing/2014/main" xmlns="" id="{BC7211D9-290C-574E-B682-764110BB9BAF}"/>
               </a:ext>
             </a:extLst>
           </p:cNvPr>
@@ -1466,7 +1644,7 @@
           <a:p>
             <a:fld id="{75F8934F-7F83-1046-9341-02CE27D9104D}" type="datetimeFigureOut">
               <a:rPr kumimoji="1" lang="zh-TW" altLang="en-US" smtClean="0"/>
-              <a:t>2020/2/3</a:t>
+              <a:t>2020/2/6</a:t>
             </a:fld>
             <a:endParaRPr kumimoji="1" lang="zh-TW" altLang="en-US" dirty="0"/>
           </a:p>
@@ -1477,7 +1655,7 @@
           <p:cNvPr id="5" name="頁尾版面配置區 4">
             <a:extLst>
               <a:ext uri="{FF2B5EF4-FFF2-40B4-BE49-F238E27FC236}">
-                <a16:creationId xmlns="" xmlns:a16="http://schemas.microsoft.com/office/drawing/2014/main" id="{D4D4BDD1-0BFA-0645-8197-068191AAF54C}"/>
+                <a16:creationId xmlns:a16="http://schemas.microsoft.com/office/drawing/2014/main" xmlns="" id="{D4D4BDD1-0BFA-0645-8197-068191AAF54C}"/>
               </a:ext>
             </a:extLst>
           </p:cNvPr>
@@ -1502,7 +1680,7 @@
           <p:cNvPr id="6" name="投影片編號版面配置區 5">
             <a:extLst>
               <a:ext uri="{FF2B5EF4-FFF2-40B4-BE49-F238E27FC236}">
-                <a16:creationId xmlns="" xmlns:a16="http://schemas.microsoft.com/office/drawing/2014/main" id="{F592E68C-AEE0-D84B-8844-7CF5E83647F7}"/>
+                <a16:creationId xmlns:a16="http://schemas.microsoft.com/office/drawing/2014/main" xmlns="" id="{F592E68C-AEE0-D84B-8844-7CF5E83647F7}"/>
               </a:ext>
             </a:extLst>
           </p:cNvPr>
@@ -1531,7 +1709,7 @@
           <p:cNvPr id="7" name="圖片 6">
             <a:extLst>
               <a:ext uri="{FF2B5EF4-FFF2-40B4-BE49-F238E27FC236}">
-                <a16:creationId xmlns="" xmlns:a16="http://schemas.microsoft.com/office/drawing/2014/main" id="{CFC0D688-7C0C-F240-82D7-136060E3079C}"/>
+                <a16:creationId xmlns:a16="http://schemas.microsoft.com/office/drawing/2014/main" xmlns="" id="{CFC0D688-7C0C-F240-82D7-136060E3079C}"/>
               </a:ext>
             </a:extLst>
           </p:cNvPr>
@@ -1699,7 +1877,7 @@
           <a:p>
             <a:fld id="{75F8934F-7F83-1046-9341-02CE27D9104D}" type="datetimeFigureOut">
               <a:rPr kumimoji="1" lang="zh-TW" altLang="en-US" smtClean="0"/>
-              <a:t>2020/2/3</a:t>
+              <a:t>2020/2/6</a:t>
             </a:fld>
             <a:endParaRPr kumimoji="1" lang="zh-TW" altLang="en-US"/>
           </a:p>
@@ -1821,7 +1999,7 @@
           <p:cNvPr id="10" name="圖片 9">
             <a:extLst>
               <a:ext uri="{FF2B5EF4-FFF2-40B4-BE49-F238E27FC236}">
-                <a16:creationId xmlns="" xmlns:a16="http://schemas.microsoft.com/office/drawing/2014/main" id="{5E0EAD78-AEC6-AB45-A710-DD47E43CBB16}"/>
+                <a16:creationId xmlns:a16="http://schemas.microsoft.com/office/drawing/2014/main" xmlns="" id="{5E0EAD78-AEC6-AB45-A710-DD47E43CBB16}"/>
               </a:ext>
             </a:extLst>
           </p:cNvPr>
@@ -1940,7 +2118,7 @@
           <a:p>
             <a:fld id="{75F8934F-7F83-1046-9341-02CE27D9104D}" type="datetimeFigureOut">
               <a:rPr kumimoji="1" lang="zh-TW" altLang="en-US" smtClean="0"/>
-              <a:t>2020/2/3</a:t>
+              <a:t>2020/2/6</a:t>
             </a:fld>
             <a:endParaRPr kumimoji="1" lang="zh-TW" altLang="en-US"/>
           </a:p>
@@ -2364,7 +2542,7 @@
           <p:cNvPr id="17" name="內容版面配置區 2">
             <a:extLst>
               <a:ext uri="{FF2B5EF4-FFF2-40B4-BE49-F238E27FC236}">
-                <a16:creationId xmlns="" xmlns:a16="http://schemas.microsoft.com/office/drawing/2014/main" id="{DB7FC4C6-C26F-214E-B2D6-C9ED5E2BD195}"/>
+                <a16:creationId xmlns:a16="http://schemas.microsoft.com/office/drawing/2014/main" xmlns="" id="{DB7FC4C6-C26F-214E-B2D6-C9ED5E2BD195}"/>
               </a:ext>
             </a:extLst>
           </p:cNvPr>
@@ -2456,7 +2634,7 @@
           <p:cNvPr id="18" name="內容版面配置區 2">
             <a:extLst>
               <a:ext uri="{FF2B5EF4-FFF2-40B4-BE49-F238E27FC236}">
-                <a16:creationId xmlns="" xmlns:a16="http://schemas.microsoft.com/office/drawing/2014/main" id="{DB7FC4C6-C26F-214E-B2D6-C9ED5E2BD195}"/>
+                <a16:creationId xmlns:a16="http://schemas.microsoft.com/office/drawing/2014/main" xmlns="" id="{DB7FC4C6-C26F-214E-B2D6-C9ED5E2BD195}"/>
               </a:ext>
             </a:extLst>
           </p:cNvPr>
@@ -2548,7 +2726,7 @@
           <p:cNvPr id="19" name="內容版面配置區 2">
             <a:extLst>
               <a:ext uri="{FF2B5EF4-FFF2-40B4-BE49-F238E27FC236}">
-                <a16:creationId xmlns="" xmlns:a16="http://schemas.microsoft.com/office/drawing/2014/main" id="{DB7FC4C6-C26F-214E-B2D6-C9ED5E2BD195}"/>
+                <a16:creationId xmlns:a16="http://schemas.microsoft.com/office/drawing/2014/main" xmlns="" id="{DB7FC4C6-C26F-214E-B2D6-C9ED5E2BD195}"/>
               </a:ext>
             </a:extLst>
           </p:cNvPr>
@@ -2640,7 +2818,7 @@
           <p:cNvPr id="20" name="內容版面配置區 2">
             <a:extLst>
               <a:ext uri="{FF2B5EF4-FFF2-40B4-BE49-F238E27FC236}">
-                <a16:creationId xmlns="" xmlns:a16="http://schemas.microsoft.com/office/drawing/2014/main" id="{DB7FC4C6-C26F-214E-B2D6-C9ED5E2BD195}"/>
+                <a16:creationId xmlns:a16="http://schemas.microsoft.com/office/drawing/2014/main" xmlns="" id="{DB7FC4C6-C26F-214E-B2D6-C9ED5E2BD195}"/>
               </a:ext>
             </a:extLst>
           </p:cNvPr>
@@ -2732,7 +2910,7 @@
           <p:cNvPr id="21" name="內容版面配置區 2">
             <a:extLst>
               <a:ext uri="{FF2B5EF4-FFF2-40B4-BE49-F238E27FC236}">
-                <a16:creationId xmlns="" xmlns:a16="http://schemas.microsoft.com/office/drawing/2014/main" id="{DB7FC4C6-C26F-214E-B2D6-C9ED5E2BD195}"/>
+                <a16:creationId xmlns:a16="http://schemas.microsoft.com/office/drawing/2014/main" xmlns="" id="{DB7FC4C6-C26F-214E-B2D6-C9ED5E2BD195}"/>
               </a:ext>
             </a:extLst>
           </p:cNvPr>
@@ -2824,7 +3002,7 @@
           <p:cNvPr id="22" name="內容版面配置區 2">
             <a:extLst>
               <a:ext uri="{FF2B5EF4-FFF2-40B4-BE49-F238E27FC236}">
-                <a16:creationId xmlns="" xmlns:a16="http://schemas.microsoft.com/office/drawing/2014/main" id="{DB7FC4C6-C26F-214E-B2D6-C9ED5E2BD195}"/>
+                <a16:creationId xmlns:a16="http://schemas.microsoft.com/office/drawing/2014/main" xmlns="" id="{DB7FC4C6-C26F-214E-B2D6-C9ED5E2BD195}"/>
               </a:ext>
             </a:extLst>
           </p:cNvPr>
@@ -3039,7 +3217,7 @@
           <a:p>
             <a:fld id="{75F8934F-7F83-1046-9341-02CE27D9104D}" type="datetimeFigureOut">
               <a:rPr kumimoji="1" lang="zh-TW" altLang="en-US" smtClean="0"/>
-              <a:t>2020/2/3</a:t>
+              <a:t>2020/2/6</a:t>
             </a:fld>
             <a:endParaRPr kumimoji="1" lang="zh-TW" altLang="en-US"/>
           </a:p>
@@ -3428,7 +3606,7 @@
           <p:cNvPr id="13" name="內容版面配置區 2">
             <a:extLst>
               <a:ext uri="{FF2B5EF4-FFF2-40B4-BE49-F238E27FC236}">
-                <a16:creationId xmlns="" xmlns:a16="http://schemas.microsoft.com/office/drawing/2014/main" id="{DB7FC4C6-C26F-214E-B2D6-C9ED5E2BD195}"/>
+                <a16:creationId xmlns:a16="http://schemas.microsoft.com/office/drawing/2014/main" xmlns="" id="{DB7FC4C6-C26F-214E-B2D6-C9ED5E2BD195}"/>
               </a:ext>
             </a:extLst>
           </p:cNvPr>
@@ -3520,7 +3698,7 @@
           <p:cNvPr id="15" name="內容版面配置區 2">
             <a:extLst>
               <a:ext uri="{FF2B5EF4-FFF2-40B4-BE49-F238E27FC236}">
-                <a16:creationId xmlns="" xmlns:a16="http://schemas.microsoft.com/office/drawing/2014/main" id="{DB7FC4C6-C26F-214E-B2D6-C9ED5E2BD195}"/>
+                <a16:creationId xmlns:a16="http://schemas.microsoft.com/office/drawing/2014/main" xmlns="" id="{DB7FC4C6-C26F-214E-B2D6-C9ED5E2BD195}"/>
               </a:ext>
             </a:extLst>
           </p:cNvPr>
@@ -3612,7 +3790,7 @@
           <p:cNvPr id="16" name="內容版面配置區 2">
             <a:extLst>
               <a:ext uri="{FF2B5EF4-FFF2-40B4-BE49-F238E27FC236}">
-                <a16:creationId xmlns="" xmlns:a16="http://schemas.microsoft.com/office/drawing/2014/main" id="{DB7FC4C6-C26F-214E-B2D6-C9ED5E2BD195}"/>
+                <a16:creationId xmlns:a16="http://schemas.microsoft.com/office/drawing/2014/main" xmlns="" id="{DB7FC4C6-C26F-214E-B2D6-C9ED5E2BD195}"/>
               </a:ext>
             </a:extLst>
           </p:cNvPr>
@@ -3704,7 +3882,7 @@
           <p:cNvPr id="17" name="內容版面配置區 2">
             <a:extLst>
               <a:ext uri="{FF2B5EF4-FFF2-40B4-BE49-F238E27FC236}">
-                <a16:creationId xmlns="" xmlns:a16="http://schemas.microsoft.com/office/drawing/2014/main" id="{DB7FC4C6-C26F-214E-B2D6-C9ED5E2BD195}"/>
+                <a16:creationId xmlns:a16="http://schemas.microsoft.com/office/drawing/2014/main" xmlns="" id="{DB7FC4C6-C26F-214E-B2D6-C9ED5E2BD195}"/>
               </a:ext>
             </a:extLst>
           </p:cNvPr>
@@ -3796,7 +3974,7 @@
           <p:cNvPr id="18" name="內容版面配置區 2">
             <a:extLst>
               <a:ext uri="{FF2B5EF4-FFF2-40B4-BE49-F238E27FC236}">
-                <a16:creationId xmlns="" xmlns:a16="http://schemas.microsoft.com/office/drawing/2014/main" id="{DB7FC4C6-C26F-214E-B2D6-C9ED5E2BD195}"/>
+                <a16:creationId xmlns:a16="http://schemas.microsoft.com/office/drawing/2014/main" xmlns="" id="{DB7FC4C6-C26F-214E-B2D6-C9ED5E2BD195}"/>
               </a:ext>
             </a:extLst>
           </p:cNvPr>
@@ -3888,7 +4066,7 @@
           <p:cNvPr id="19" name="內容版面配置區 2">
             <a:extLst>
               <a:ext uri="{FF2B5EF4-FFF2-40B4-BE49-F238E27FC236}">
-                <a16:creationId xmlns="" xmlns:a16="http://schemas.microsoft.com/office/drawing/2014/main" id="{DB7FC4C6-C26F-214E-B2D6-C9ED5E2BD195}"/>
+                <a16:creationId xmlns:a16="http://schemas.microsoft.com/office/drawing/2014/main" xmlns="" id="{DB7FC4C6-C26F-214E-B2D6-C9ED5E2BD195}"/>
               </a:ext>
             </a:extLst>
           </p:cNvPr>
@@ -4010,7 +4188,7 @@
           <p:cNvPr id="2" name="標題 1">
             <a:extLst>
               <a:ext uri="{FF2B5EF4-FFF2-40B4-BE49-F238E27FC236}">
-                <a16:creationId xmlns="" xmlns:a16="http://schemas.microsoft.com/office/drawing/2014/main" id="{AA60FC08-DB42-1443-B1D9-594B0DFFD819}"/>
+                <a16:creationId xmlns:a16="http://schemas.microsoft.com/office/drawing/2014/main" xmlns="" id="{AA60FC08-DB42-1443-B1D9-594B0DFFD819}"/>
               </a:ext>
             </a:extLst>
           </p:cNvPr>
@@ -4055,7 +4233,7 @@
           <p:cNvPr id="3" name="內容版面配置區 2">
             <a:extLst>
               <a:ext uri="{FF2B5EF4-FFF2-40B4-BE49-F238E27FC236}">
-                <a16:creationId xmlns="" xmlns:a16="http://schemas.microsoft.com/office/drawing/2014/main" id="{71BB2DE9-F9EC-0747-8110-57B6F42C6240}"/>
+                <a16:creationId xmlns:a16="http://schemas.microsoft.com/office/drawing/2014/main" xmlns="" id="{71BB2DE9-F9EC-0747-8110-57B6F42C6240}"/>
               </a:ext>
             </a:extLst>
           </p:cNvPr>
@@ -4163,7 +4341,7 @@
           <p:cNvPr id="4" name="日期版面配置區 3">
             <a:extLst>
               <a:ext uri="{FF2B5EF4-FFF2-40B4-BE49-F238E27FC236}">
-                <a16:creationId xmlns="" xmlns:a16="http://schemas.microsoft.com/office/drawing/2014/main" id="{6BA98535-4AD5-2846-9F28-9D341D2CBD82}"/>
+                <a16:creationId xmlns:a16="http://schemas.microsoft.com/office/drawing/2014/main" xmlns="" id="{6BA98535-4AD5-2846-9F28-9D341D2CBD82}"/>
               </a:ext>
             </a:extLst>
           </p:cNvPr>
@@ -4181,7 +4359,7 @@
           <a:p>
             <a:fld id="{75F8934F-7F83-1046-9341-02CE27D9104D}" type="datetimeFigureOut">
               <a:rPr kumimoji="1" lang="zh-TW" altLang="en-US" smtClean="0"/>
-              <a:t>2020/2/3</a:t>
+              <a:t>2020/2/6</a:t>
             </a:fld>
             <a:endParaRPr kumimoji="1" lang="zh-TW" altLang="en-US"/>
           </a:p>
@@ -4192,7 +4370,7 @@
           <p:cNvPr id="5" name="頁尾版面配置區 4">
             <a:extLst>
               <a:ext uri="{FF2B5EF4-FFF2-40B4-BE49-F238E27FC236}">
-                <a16:creationId xmlns="" xmlns:a16="http://schemas.microsoft.com/office/drawing/2014/main" id="{E4EAEED7-0802-7145-8C6C-66F66C8C1782}"/>
+                <a16:creationId xmlns:a16="http://schemas.microsoft.com/office/drawing/2014/main" xmlns="" id="{E4EAEED7-0802-7145-8C6C-66F66C8C1782}"/>
               </a:ext>
             </a:extLst>
           </p:cNvPr>
@@ -4217,7 +4395,7 @@
           <p:cNvPr id="6" name="投影片編號版面配置區 5">
             <a:extLst>
               <a:ext uri="{FF2B5EF4-FFF2-40B4-BE49-F238E27FC236}">
-                <a16:creationId xmlns="" xmlns:a16="http://schemas.microsoft.com/office/drawing/2014/main" id="{7D332B7E-1F76-A041-B6C6-AB635087BAB3}"/>
+                <a16:creationId xmlns:a16="http://schemas.microsoft.com/office/drawing/2014/main" xmlns="" id="{7D332B7E-1F76-A041-B6C6-AB635087BAB3}"/>
               </a:ext>
             </a:extLst>
           </p:cNvPr>
@@ -4246,7 +4424,7 @@
           <p:cNvPr id="7" name="矩形 6">
             <a:extLst>
               <a:ext uri="{FF2B5EF4-FFF2-40B4-BE49-F238E27FC236}">
-                <a16:creationId xmlns="" xmlns:a16="http://schemas.microsoft.com/office/drawing/2014/main" id="{C21960D3-0AC5-EE41-A19C-696161A1572E}"/>
+                <a16:creationId xmlns:a16="http://schemas.microsoft.com/office/drawing/2014/main" xmlns="" id="{C21960D3-0AC5-EE41-A19C-696161A1572E}"/>
               </a:ext>
             </a:extLst>
           </p:cNvPr>
@@ -4302,7 +4480,7 @@
           <p:cNvPr id="8" name="圖片 7">
             <a:extLst>
               <a:ext uri="{FF2B5EF4-FFF2-40B4-BE49-F238E27FC236}">
-                <a16:creationId xmlns="" xmlns:a16="http://schemas.microsoft.com/office/drawing/2014/main" id="{5E0EAD78-AEC6-AB45-A710-DD47E43CBB16}"/>
+                <a16:creationId xmlns:a16="http://schemas.microsoft.com/office/drawing/2014/main" xmlns="" id="{5E0EAD78-AEC6-AB45-A710-DD47E43CBB16}"/>
               </a:ext>
             </a:extLst>
           </p:cNvPr>
@@ -4338,7 +4516,7 @@
           <p:cNvPr id="9" name="矩形 8">
             <a:extLst>
               <a:ext uri="{FF2B5EF4-FFF2-40B4-BE49-F238E27FC236}">
-                <a16:creationId xmlns="" xmlns:a16="http://schemas.microsoft.com/office/drawing/2014/main" id="{387A2BAD-7558-A944-B806-7AEF1C4243D0}"/>
+                <a16:creationId xmlns:a16="http://schemas.microsoft.com/office/drawing/2014/main" xmlns="" id="{387A2BAD-7558-A944-B806-7AEF1C4243D0}"/>
               </a:ext>
             </a:extLst>
           </p:cNvPr>
@@ -4420,7 +4598,7 @@
           <p:cNvPr id="2" name="標題 1">
             <a:extLst>
               <a:ext uri="{FF2B5EF4-FFF2-40B4-BE49-F238E27FC236}">
-                <a16:creationId xmlns="" xmlns:a16="http://schemas.microsoft.com/office/drawing/2014/main" id="{AA60FC08-DB42-1443-B1D9-594B0DFFD819}"/>
+                <a16:creationId xmlns:a16="http://schemas.microsoft.com/office/drawing/2014/main" xmlns="" id="{AA60FC08-DB42-1443-B1D9-594B0DFFD819}"/>
               </a:ext>
             </a:extLst>
           </p:cNvPr>
@@ -4465,7 +4643,7 @@
           <p:cNvPr id="3" name="內容版面配置區 2">
             <a:extLst>
               <a:ext uri="{FF2B5EF4-FFF2-40B4-BE49-F238E27FC236}">
-                <a16:creationId xmlns="" xmlns:a16="http://schemas.microsoft.com/office/drawing/2014/main" id="{71BB2DE9-F9EC-0747-8110-57B6F42C6240}"/>
+                <a16:creationId xmlns:a16="http://schemas.microsoft.com/office/drawing/2014/main" xmlns="" id="{71BB2DE9-F9EC-0747-8110-57B6F42C6240}"/>
               </a:ext>
             </a:extLst>
           </p:cNvPr>
@@ -4576,7 +4754,7 @@
           <p:cNvPr id="4" name="日期版面配置區 3">
             <a:extLst>
               <a:ext uri="{FF2B5EF4-FFF2-40B4-BE49-F238E27FC236}">
-                <a16:creationId xmlns="" xmlns:a16="http://schemas.microsoft.com/office/drawing/2014/main" id="{6BA98535-4AD5-2846-9F28-9D341D2CBD82}"/>
+                <a16:creationId xmlns:a16="http://schemas.microsoft.com/office/drawing/2014/main" xmlns="" id="{6BA98535-4AD5-2846-9F28-9D341D2CBD82}"/>
               </a:ext>
             </a:extLst>
           </p:cNvPr>
@@ -4594,7 +4772,7 @@
           <a:p>
             <a:fld id="{75F8934F-7F83-1046-9341-02CE27D9104D}" type="datetimeFigureOut">
               <a:rPr kumimoji="1" lang="zh-TW" altLang="en-US" smtClean="0"/>
-              <a:t>2020/2/3</a:t>
+              <a:t>2020/2/6</a:t>
             </a:fld>
             <a:endParaRPr kumimoji="1" lang="zh-TW" altLang="en-US"/>
           </a:p>
@@ -4605,7 +4783,7 @@
           <p:cNvPr id="5" name="頁尾版面配置區 4">
             <a:extLst>
               <a:ext uri="{FF2B5EF4-FFF2-40B4-BE49-F238E27FC236}">
-                <a16:creationId xmlns="" xmlns:a16="http://schemas.microsoft.com/office/drawing/2014/main" id="{E4EAEED7-0802-7145-8C6C-66F66C8C1782}"/>
+                <a16:creationId xmlns:a16="http://schemas.microsoft.com/office/drawing/2014/main" xmlns="" id="{E4EAEED7-0802-7145-8C6C-66F66C8C1782}"/>
               </a:ext>
             </a:extLst>
           </p:cNvPr>
@@ -4630,7 +4808,7 @@
           <p:cNvPr id="6" name="投影片編號版面配置區 5">
             <a:extLst>
               <a:ext uri="{FF2B5EF4-FFF2-40B4-BE49-F238E27FC236}">
-                <a16:creationId xmlns="" xmlns:a16="http://schemas.microsoft.com/office/drawing/2014/main" id="{7D332B7E-1F76-A041-B6C6-AB635087BAB3}"/>
+                <a16:creationId xmlns:a16="http://schemas.microsoft.com/office/drawing/2014/main" xmlns="" id="{7D332B7E-1F76-A041-B6C6-AB635087BAB3}"/>
               </a:ext>
             </a:extLst>
           </p:cNvPr>
@@ -4659,7 +4837,7 @@
           <p:cNvPr id="7" name="矩形 6">
             <a:extLst>
               <a:ext uri="{FF2B5EF4-FFF2-40B4-BE49-F238E27FC236}">
-                <a16:creationId xmlns="" xmlns:a16="http://schemas.microsoft.com/office/drawing/2014/main" id="{C21960D3-0AC5-EE41-A19C-696161A1572E}"/>
+                <a16:creationId xmlns:a16="http://schemas.microsoft.com/office/drawing/2014/main" xmlns="" id="{C21960D3-0AC5-EE41-A19C-696161A1572E}"/>
               </a:ext>
             </a:extLst>
           </p:cNvPr>
@@ -4715,7 +4893,7 @@
           <p:cNvPr id="8" name="圖片 7">
             <a:extLst>
               <a:ext uri="{FF2B5EF4-FFF2-40B4-BE49-F238E27FC236}">
-                <a16:creationId xmlns="" xmlns:a16="http://schemas.microsoft.com/office/drawing/2014/main" id="{5E0EAD78-AEC6-AB45-A710-DD47E43CBB16}"/>
+                <a16:creationId xmlns:a16="http://schemas.microsoft.com/office/drawing/2014/main" xmlns="" id="{5E0EAD78-AEC6-AB45-A710-DD47E43CBB16}"/>
               </a:ext>
             </a:extLst>
           </p:cNvPr>
@@ -4751,7 +4929,7 @@
           <p:cNvPr id="9" name="矩形 8">
             <a:extLst>
               <a:ext uri="{FF2B5EF4-FFF2-40B4-BE49-F238E27FC236}">
-                <a16:creationId xmlns="" xmlns:a16="http://schemas.microsoft.com/office/drawing/2014/main" id="{387A2BAD-7558-A944-B806-7AEF1C4243D0}"/>
+                <a16:creationId xmlns:a16="http://schemas.microsoft.com/office/drawing/2014/main" xmlns="" id="{387A2BAD-7558-A944-B806-7AEF1C4243D0}"/>
               </a:ext>
             </a:extLst>
           </p:cNvPr>
@@ -4833,7 +5011,7 @@
           <p:cNvPr id="2" name="標題 1">
             <a:extLst>
               <a:ext uri="{FF2B5EF4-FFF2-40B4-BE49-F238E27FC236}">
-                <a16:creationId xmlns="" xmlns:a16="http://schemas.microsoft.com/office/drawing/2014/main" id="{AA60FC08-DB42-1443-B1D9-594B0DFFD819}"/>
+                <a16:creationId xmlns:a16="http://schemas.microsoft.com/office/drawing/2014/main" xmlns="" id="{AA60FC08-DB42-1443-B1D9-594B0DFFD819}"/>
               </a:ext>
             </a:extLst>
           </p:cNvPr>
@@ -4878,7 +5056,7 @@
           <p:cNvPr id="3" name="內容版面配置區 2">
             <a:extLst>
               <a:ext uri="{FF2B5EF4-FFF2-40B4-BE49-F238E27FC236}">
-                <a16:creationId xmlns="" xmlns:a16="http://schemas.microsoft.com/office/drawing/2014/main" id="{71BB2DE9-F9EC-0747-8110-57B6F42C6240}"/>
+                <a16:creationId xmlns:a16="http://schemas.microsoft.com/office/drawing/2014/main" xmlns="" id="{71BB2DE9-F9EC-0747-8110-57B6F42C6240}"/>
               </a:ext>
             </a:extLst>
           </p:cNvPr>
@@ -4977,7 +5155,7 @@
           <p:cNvPr id="4" name="日期版面配置區 3">
             <a:extLst>
               <a:ext uri="{FF2B5EF4-FFF2-40B4-BE49-F238E27FC236}">
-                <a16:creationId xmlns="" xmlns:a16="http://schemas.microsoft.com/office/drawing/2014/main" id="{6BA98535-4AD5-2846-9F28-9D341D2CBD82}"/>
+                <a16:creationId xmlns:a16="http://schemas.microsoft.com/office/drawing/2014/main" xmlns="" id="{6BA98535-4AD5-2846-9F28-9D341D2CBD82}"/>
               </a:ext>
             </a:extLst>
           </p:cNvPr>
@@ -4995,7 +5173,7 @@
           <a:p>
             <a:fld id="{75F8934F-7F83-1046-9341-02CE27D9104D}" type="datetimeFigureOut">
               <a:rPr kumimoji="1" lang="zh-TW" altLang="en-US" smtClean="0"/>
-              <a:t>2020/2/3</a:t>
+              <a:t>2020/2/6</a:t>
             </a:fld>
             <a:endParaRPr kumimoji="1" lang="zh-TW" altLang="en-US"/>
           </a:p>
@@ -5006,7 +5184,7 @@
           <p:cNvPr id="5" name="頁尾版面配置區 4">
             <a:extLst>
               <a:ext uri="{FF2B5EF4-FFF2-40B4-BE49-F238E27FC236}">
-                <a16:creationId xmlns="" xmlns:a16="http://schemas.microsoft.com/office/drawing/2014/main" id="{E4EAEED7-0802-7145-8C6C-66F66C8C1782}"/>
+                <a16:creationId xmlns:a16="http://schemas.microsoft.com/office/drawing/2014/main" xmlns="" id="{E4EAEED7-0802-7145-8C6C-66F66C8C1782}"/>
               </a:ext>
             </a:extLst>
           </p:cNvPr>
@@ -5031,7 +5209,7 @@
           <p:cNvPr id="6" name="投影片編號版面配置區 5">
             <a:extLst>
               <a:ext uri="{FF2B5EF4-FFF2-40B4-BE49-F238E27FC236}">
-                <a16:creationId xmlns="" xmlns:a16="http://schemas.microsoft.com/office/drawing/2014/main" id="{7D332B7E-1F76-A041-B6C6-AB635087BAB3}"/>
+                <a16:creationId xmlns:a16="http://schemas.microsoft.com/office/drawing/2014/main" xmlns="" id="{7D332B7E-1F76-A041-B6C6-AB635087BAB3}"/>
               </a:ext>
             </a:extLst>
           </p:cNvPr>
@@ -5060,7 +5238,7 @@
           <p:cNvPr id="7" name="矩形 6">
             <a:extLst>
               <a:ext uri="{FF2B5EF4-FFF2-40B4-BE49-F238E27FC236}">
-                <a16:creationId xmlns="" xmlns:a16="http://schemas.microsoft.com/office/drawing/2014/main" id="{C21960D3-0AC5-EE41-A19C-696161A1572E}"/>
+                <a16:creationId xmlns:a16="http://schemas.microsoft.com/office/drawing/2014/main" xmlns="" id="{C21960D3-0AC5-EE41-A19C-696161A1572E}"/>
               </a:ext>
             </a:extLst>
           </p:cNvPr>
@@ -5116,7 +5294,7 @@
           <p:cNvPr id="8" name="圖片 7">
             <a:extLst>
               <a:ext uri="{FF2B5EF4-FFF2-40B4-BE49-F238E27FC236}">
-                <a16:creationId xmlns="" xmlns:a16="http://schemas.microsoft.com/office/drawing/2014/main" id="{5E0EAD78-AEC6-AB45-A710-DD47E43CBB16}"/>
+                <a16:creationId xmlns:a16="http://schemas.microsoft.com/office/drawing/2014/main" xmlns="" id="{5E0EAD78-AEC6-AB45-A710-DD47E43CBB16}"/>
               </a:ext>
             </a:extLst>
           </p:cNvPr>
@@ -5152,7 +5330,7 @@
           <p:cNvPr id="9" name="矩形 8">
             <a:extLst>
               <a:ext uri="{FF2B5EF4-FFF2-40B4-BE49-F238E27FC236}">
-                <a16:creationId xmlns="" xmlns:a16="http://schemas.microsoft.com/office/drawing/2014/main" id="{387A2BAD-7558-A944-B806-7AEF1C4243D0}"/>
+                <a16:creationId xmlns:a16="http://schemas.microsoft.com/office/drawing/2014/main" xmlns="" id="{387A2BAD-7558-A944-B806-7AEF1C4243D0}"/>
               </a:ext>
             </a:extLst>
           </p:cNvPr>
@@ -5234,7 +5412,7 @@
           <p:cNvPr id="2" name="標題 1">
             <a:extLst>
               <a:ext uri="{FF2B5EF4-FFF2-40B4-BE49-F238E27FC236}">
-                <a16:creationId xmlns="" xmlns:a16="http://schemas.microsoft.com/office/drawing/2014/main" id="{AA60FC08-DB42-1443-B1D9-594B0DFFD819}"/>
+                <a16:creationId xmlns:a16="http://schemas.microsoft.com/office/drawing/2014/main" xmlns="" id="{AA60FC08-DB42-1443-B1D9-594B0DFFD819}"/>
               </a:ext>
             </a:extLst>
           </p:cNvPr>
@@ -5279,7 +5457,7 @@
           <p:cNvPr id="3" name="內容版面配置區 2">
             <a:extLst>
               <a:ext uri="{FF2B5EF4-FFF2-40B4-BE49-F238E27FC236}">
-                <a16:creationId xmlns="" xmlns:a16="http://schemas.microsoft.com/office/drawing/2014/main" id="{71BB2DE9-F9EC-0747-8110-57B6F42C6240}"/>
+                <a16:creationId xmlns:a16="http://schemas.microsoft.com/office/drawing/2014/main" xmlns="" id="{71BB2DE9-F9EC-0747-8110-57B6F42C6240}"/>
               </a:ext>
             </a:extLst>
           </p:cNvPr>
@@ -5387,7 +5565,7 @@
           <p:cNvPr id="4" name="日期版面配置區 3">
             <a:extLst>
               <a:ext uri="{FF2B5EF4-FFF2-40B4-BE49-F238E27FC236}">
-                <a16:creationId xmlns="" xmlns:a16="http://schemas.microsoft.com/office/drawing/2014/main" id="{6BA98535-4AD5-2846-9F28-9D341D2CBD82}"/>
+                <a16:creationId xmlns:a16="http://schemas.microsoft.com/office/drawing/2014/main" xmlns="" id="{6BA98535-4AD5-2846-9F28-9D341D2CBD82}"/>
               </a:ext>
             </a:extLst>
           </p:cNvPr>
@@ -5405,7 +5583,7 @@
           <a:p>
             <a:fld id="{75F8934F-7F83-1046-9341-02CE27D9104D}" type="datetimeFigureOut">
               <a:rPr kumimoji="1" lang="zh-TW" altLang="en-US" smtClean="0"/>
-              <a:t>2020/2/3</a:t>
+              <a:t>2020/2/6</a:t>
             </a:fld>
             <a:endParaRPr kumimoji="1" lang="zh-TW" altLang="en-US"/>
           </a:p>
@@ -5416,7 +5594,7 @@
           <p:cNvPr id="5" name="頁尾版面配置區 4">
             <a:extLst>
               <a:ext uri="{FF2B5EF4-FFF2-40B4-BE49-F238E27FC236}">
-                <a16:creationId xmlns="" xmlns:a16="http://schemas.microsoft.com/office/drawing/2014/main" id="{E4EAEED7-0802-7145-8C6C-66F66C8C1782}"/>
+                <a16:creationId xmlns:a16="http://schemas.microsoft.com/office/drawing/2014/main" xmlns="" id="{E4EAEED7-0802-7145-8C6C-66F66C8C1782}"/>
               </a:ext>
             </a:extLst>
           </p:cNvPr>
@@ -5441,7 +5619,7 @@
           <p:cNvPr id="6" name="投影片編號版面配置區 5">
             <a:extLst>
               <a:ext uri="{FF2B5EF4-FFF2-40B4-BE49-F238E27FC236}">
-                <a16:creationId xmlns="" xmlns:a16="http://schemas.microsoft.com/office/drawing/2014/main" id="{7D332B7E-1F76-A041-B6C6-AB635087BAB3}"/>
+                <a16:creationId xmlns:a16="http://schemas.microsoft.com/office/drawing/2014/main" xmlns="" id="{7D332B7E-1F76-A041-B6C6-AB635087BAB3}"/>
               </a:ext>
             </a:extLst>
           </p:cNvPr>
@@ -5470,7 +5648,7 @@
           <p:cNvPr id="7" name="矩形 6">
             <a:extLst>
               <a:ext uri="{FF2B5EF4-FFF2-40B4-BE49-F238E27FC236}">
-                <a16:creationId xmlns="" xmlns:a16="http://schemas.microsoft.com/office/drawing/2014/main" id="{C21960D3-0AC5-EE41-A19C-696161A1572E}"/>
+                <a16:creationId xmlns:a16="http://schemas.microsoft.com/office/drawing/2014/main" xmlns="" id="{C21960D3-0AC5-EE41-A19C-696161A1572E}"/>
               </a:ext>
             </a:extLst>
           </p:cNvPr>
@@ -5526,7 +5704,7 @@
           <p:cNvPr id="8" name="圖片 7">
             <a:extLst>
               <a:ext uri="{FF2B5EF4-FFF2-40B4-BE49-F238E27FC236}">
-                <a16:creationId xmlns="" xmlns:a16="http://schemas.microsoft.com/office/drawing/2014/main" id="{5E0EAD78-AEC6-AB45-A710-DD47E43CBB16}"/>
+                <a16:creationId xmlns:a16="http://schemas.microsoft.com/office/drawing/2014/main" xmlns="" id="{5E0EAD78-AEC6-AB45-A710-DD47E43CBB16}"/>
               </a:ext>
             </a:extLst>
           </p:cNvPr>
@@ -5562,7 +5740,7 @@
           <p:cNvPr id="9" name="矩形 8">
             <a:extLst>
               <a:ext uri="{FF2B5EF4-FFF2-40B4-BE49-F238E27FC236}">
-                <a16:creationId xmlns="" xmlns:a16="http://schemas.microsoft.com/office/drawing/2014/main" id="{387A2BAD-7558-A944-B806-7AEF1C4243D0}"/>
+                <a16:creationId xmlns:a16="http://schemas.microsoft.com/office/drawing/2014/main" xmlns="" id="{387A2BAD-7558-A944-B806-7AEF1C4243D0}"/>
               </a:ext>
             </a:extLst>
           </p:cNvPr>
@@ -5614,7 +5792,7 @@
           <p:cNvPr id="10" name="內容版面配置區 2">
             <a:extLst>
               <a:ext uri="{FF2B5EF4-FFF2-40B4-BE49-F238E27FC236}">
-                <a16:creationId xmlns="" xmlns:a16="http://schemas.microsoft.com/office/drawing/2014/main" id="{71BB2DE9-F9EC-0747-8110-57B6F42C6240}"/>
+                <a16:creationId xmlns:a16="http://schemas.microsoft.com/office/drawing/2014/main" xmlns="" id="{71BB2DE9-F9EC-0747-8110-57B6F42C6240}"/>
               </a:ext>
             </a:extLst>
           </p:cNvPr>
@@ -5752,7 +5930,7 @@
           <p:cNvPr id="2" name="標題 1">
             <a:extLst>
               <a:ext uri="{FF2B5EF4-FFF2-40B4-BE49-F238E27FC236}">
-                <a16:creationId xmlns="" xmlns:a16="http://schemas.microsoft.com/office/drawing/2014/main" id="{AA60FC08-DB42-1443-B1D9-594B0DFFD819}"/>
+                <a16:creationId xmlns:a16="http://schemas.microsoft.com/office/drawing/2014/main" xmlns="" id="{AA60FC08-DB42-1443-B1D9-594B0DFFD819}"/>
               </a:ext>
             </a:extLst>
           </p:cNvPr>
@@ -5797,7 +5975,7 @@
           <p:cNvPr id="3" name="內容版面配置區 2">
             <a:extLst>
               <a:ext uri="{FF2B5EF4-FFF2-40B4-BE49-F238E27FC236}">
-                <a16:creationId xmlns="" xmlns:a16="http://schemas.microsoft.com/office/drawing/2014/main" id="{71BB2DE9-F9EC-0747-8110-57B6F42C6240}"/>
+                <a16:creationId xmlns:a16="http://schemas.microsoft.com/office/drawing/2014/main" xmlns="" id="{71BB2DE9-F9EC-0747-8110-57B6F42C6240}"/>
               </a:ext>
             </a:extLst>
           </p:cNvPr>
@@ -5908,7 +6086,7 @@
           <p:cNvPr id="4" name="日期版面配置區 3">
             <a:extLst>
               <a:ext uri="{FF2B5EF4-FFF2-40B4-BE49-F238E27FC236}">
-                <a16:creationId xmlns="" xmlns:a16="http://schemas.microsoft.com/office/drawing/2014/main" id="{6BA98535-4AD5-2846-9F28-9D341D2CBD82}"/>
+                <a16:creationId xmlns:a16="http://schemas.microsoft.com/office/drawing/2014/main" xmlns="" id="{6BA98535-4AD5-2846-9F28-9D341D2CBD82}"/>
               </a:ext>
             </a:extLst>
           </p:cNvPr>
@@ -5926,7 +6104,7 @@
           <a:p>
             <a:fld id="{75F8934F-7F83-1046-9341-02CE27D9104D}" type="datetimeFigureOut">
               <a:rPr kumimoji="1" lang="zh-TW" altLang="en-US" smtClean="0"/>
-              <a:t>2020/2/3</a:t>
+              <a:t>2020/2/6</a:t>
             </a:fld>
             <a:endParaRPr kumimoji="1" lang="zh-TW" altLang="en-US"/>
           </a:p>
@@ -5937,7 +6115,7 @@
           <p:cNvPr id="5" name="頁尾版面配置區 4">
             <a:extLst>
               <a:ext uri="{FF2B5EF4-FFF2-40B4-BE49-F238E27FC236}">
-                <a16:creationId xmlns="" xmlns:a16="http://schemas.microsoft.com/office/drawing/2014/main" id="{E4EAEED7-0802-7145-8C6C-66F66C8C1782}"/>
+                <a16:creationId xmlns:a16="http://schemas.microsoft.com/office/drawing/2014/main" xmlns="" id="{E4EAEED7-0802-7145-8C6C-66F66C8C1782}"/>
               </a:ext>
             </a:extLst>
           </p:cNvPr>
@@ -5962,7 +6140,7 @@
           <p:cNvPr id="6" name="投影片編號版面配置區 5">
             <a:extLst>
               <a:ext uri="{FF2B5EF4-FFF2-40B4-BE49-F238E27FC236}">
-                <a16:creationId xmlns="" xmlns:a16="http://schemas.microsoft.com/office/drawing/2014/main" id="{7D332B7E-1F76-A041-B6C6-AB635087BAB3}"/>
+                <a16:creationId xmlns:a16="http://schemas.microsoft.com/office/drawing/2014/main" xmlns="" id="{7D332B7E-1F76-A041-B6C6-AB635087BAB3}"/>
               </a:ext>
             </a:extLst>
           </p:cNvPr>
@@ -5991,7 +6169,7 @@
           <p:cNvPr id="7" name="矩形 6">
             <a:extLst>
               <a:ext uri="{FF2B5EF4-FFF2-40B4-BE49-F238E27FC236}">
-                <a16:creationId xmlns="" xmlns:a16="http://schemas.microsoft.com/office/drawing/2014/main" id="{C21960D3-0AC5-EE41-A19C-696161A1572E}"/>
+                <a16:creationId xmlns:a16="http://schemas.microsoft.com/office/drawing/2014/main" xmlns="" id="{C21960D3-0AC5-EE41-A19C-696161A1572E}"/>
               </a:ext>
             </a:extLst>
           </p:cNvPr>
@@ -6047,7 +6225,7 @@
           <p:cNvPr id="8" name="圖片 7">
             <a:extLst>
               <a:ext uri="{FF2B5EF4-FFF2-40B4-BE49-F238E27FC236}">
-                <a16:creationId xmlns="" xmlns:a16="http://schemas.microsoft.com/office/drawing/2014/main" id="{5E0EAD78-AEC6-AB45-A710-DD47E43CBB16}"/>
+                <a16:creationId xmlns:a16="http://schemas.microsoft.com/office/drawing/2014/main" xmlns="" id="{5E0EAD78-AEC6-AB45-A710-DD47E43CBB16}"/>
               </a:ext>
             </a:extLst>
           </p:cNvPr>
@@ -6083,7 +6261,7 @@
           <p:cNvPr id="9" name="矩形 8">
             <a:extLst>
               <a:ext uri="{FF2B5EF4-FFF2-40B4-BE49-F238E27FC236}">
-                <a16:creationId xmlns="" xmlns:a16="http://schemas.microsoft.com/office/drawing/2014/main" id="{387A2BAD-7558-A944-B806-7AEF1C4243D0}"/>
+                <a16:creationId xmlns:a16="http://schemas.microsoft.com/office/drawing/2014/main" xmlns="" id="{387A2BAD-7558-A944-B806-7AEF1C4243D0}"/>
               </a:ext>
             </a:extLst>
           </p:cNvPr>
@@ -6135,7 +6313,7 @@
           <p:cNvPr id="10" name="內容版面配置區 2">
             <a:extLst>
               <a:ext uri="{FF2B5EF4-FFF2-40B4-BE49-F238E27FC236}">
-                <a16:creationId xmlns="" xmlns:a16="http://schemas.microsoft.com/office/drawing/2014/main" id="{71BB2DE9-F9EC-0747-8110-57B6F42C6240}"/>
+                <a16:creationId xmlns:a16="http://schemas.microsoft.com/office/drawing/2014/main" xmlns="" id="{71BB2DE9-F9EC-0747-8110-57B6F42C6240}"/>
               </a:ext>
             </a:extLst>
           </p:cNvPr>
@@ -6276,7 +6454,7 @@
           <p:cNvPr id="2" name="標題 1">
             <a:extLst>
               <a:ext uri="{FF2B5EF4-FFF2-40B4-BE49-F238E27FC236}">
-                <a16:creationId xmlns="" xmlns:a16="http://schemas.microsoft.com/office/drawing/2014/main" id="{AA60FC08-DB42-1443-B1D9-594B0DFFD819}"/>
+                <a16:creationId xmlns:a16="http://schemas.microsoft.com/office/drawing/2014/main" xmlns="" id="{AA60FC08-DB42-1443-B1D9-594B0DFFD819}"/>
               </a:ext>
             </a:extLst>
           </p:cNvPr>
@@ -6321,7 +6499,7 @@
           <p:cNvPr id="3" name="內容版面配置區 2">
             <a:extLst>
               <a:ext uri="{FF2B5EF4-FFF2-40B4-BE49-F238E27FC236}">
-                <a16:creationId xmlns="" xmlns:a16="http://schemas.microsoft.com/office/drawing/2014/main" id="{71BB2DE9-F9EC-0747-8110-57B6F42C6240}"/>
+                <a16:creationId xmlns:a16="http://schemas.microsoft.com/office/drawing/2014/main" xmlns="" id="{71BB2DE9-F9EC-0747-8110-57B6F42C6240}"/>
               </a:ext>
             </a:extLst>
           </p:cNvPr>
@@ -6420,7 +6598,7 @@
           <p:cNvPr id="4" name="日期版面配置區 3">
             <a:extLst>
               <a:ext uri="{FF2B5EF4-FFF2-40B4-BE49-F238E27FC236}">
-                <a16:creationId xmlns="" xmlns:a16="http://schemas.microsoft.com/office/drawing/2014/main" id="{6BA98535-4AD5-2846-9F28-9D341D2CBD82}"/>
+                <a16:creationId xmlns:a16="http://schemas.microsoft.com/office/drawing/2014/main" xmlns="" id="{6BA98535-4AD5-2846-9F28-9D341D2CBD82}"/>
               </a:ext>
             </a:extLst>
           </p:cNvPr>
@@ -6438,7 +6616,7 @@
           <a:p>
             <a:fld id="{75F8934F-7F83-1046-9341-02CE27D9104D}" type="datetimeFigureOut">
               <a:rPr kumimoji="1" lang="zh-TW" altLang="en-US" smtClean="0"/>
-              <a:t>2020/2/3</a:t>
+              <a:t>2020/2/6</a:t>
             </a:fld>
             <a:endParaRPr kumimoji="1" lang="zh-TW" altLang="en-US"/>
           </a:p>
@@ -6449,7 +6627,7 @@
           <p:cNvPr id="5" name="頁尾版面配置區 4">
             <a:extLst>
               <a:ext uri="{FF2B5EF4-FFF2-40B4-BE49-F238E27FC236}">
-                <a16:creationId xmlns="" xmlns:a16="http://schemas.microsoft.com/office/drawing/2014/main" id="{E4EAEED7-0802-7145-8C6C-66F66C8C1782}"/>
+                <a16:creationId xmlns:a16="http://schemas.microsoft.com/office/drawing/2014/main" xmlns="" id="{E4EAEED7-0802-7145-8C6C-66F66C8C1782}"/>
               </a:ext>
             </a:extLst>
           </p:cNvPr>
@@ -6474,7 +6652,7 @@
           <p:cNvPr id="6" name="投影片編號版面配置區 5">
             <a:extLst>
               <a:ext uri="{FF2B5EF4-FFF2-40B4-BE49-F238E27FC236}">
-                <a16:creationId xmlns="" xmlns:a16="http://schemas.microsoft.com/office/drawing/2014/main" id="{7D332B7E-1F76-A041-B6C6-AB635087BAB3}"/>
+                <a16:creationId xmlns:a16="http://schemas.microsoft.com/office/drawing/2014/main" xmlns="" id="{7D332B7E-1F76-A041-B6C6-AB635087BAB3}"/>
               </a:ext>
             </a:extLst>
           </p:cNvPr>
@@ -6503,7 +6681,7 @@
           <p:cNvPr id="7" name="矩形 6">
             <a:extLst>
               <a:ext uri="{FF2B5EF4-FFF2-40B4-BE49-F238E27FC236}">
-                <a16:creationId xmlns="" xmlns:a16="http://schemas.microsoft.com/office/drawing/2014/main" id="{C21960D3-0AC5-EE41-A19C-696161A1572E}"/>
+                <a16:creationId xmlns:a16="http://schemas.microsoft.com/office/drawing/2014/main" xmlns="" id="{C21960D3-0AC5-EE41-A19C-696161A1572E}"/>
               </a:ext>
             </a:extLst>
           </p:cNvPr>
@@ -6559,7 +6737,7 @@
           <p:cNvPr id="8" name="圖片 7">
             <a:extLst>
               <a:ext uri="{FF2B5EF4-FFF2-40B4-BE49-F238E27FC236}">
-                <a16:creationId xmlns="" xmlns:a16="http://schemas.microsoft.com/office/drawing/2014/main" id="{5E0EAD78-AEC6-AB45-A710-DD47E43CBB16}"/>
+                <a16:creationId xmlns:a16="http://schemas.microsoft.com/office/drawing/2014/main" xmlns="" id="{5E0EAD78-AEC6-AB45-A710-DD47E43CBB16}"/>
               </a:ext>
             </a:extLst>
           </p:cNvPr>
@@ -6595,7 +6773,7 @@
           <p:cNvPr id="9" name="矩形 8">
             <a:extLst>
               <a:ext uri="{FF2B5EF4-FFF2-40B4-BE49-F238E27FC236}">
-                <a16:creationId xmlns="" xmlns:a16="http://schemas.microsoft.com/office/drawing/2014/main" id="{387A2BAD-7558-A944-B806-7AEF1C4243D0}"/>
+                <a16:creationId xmlns:a16="http://schemas.microsoft.com/office/drawing/2014/main" xmlns="" id="{387A2BAD-7558-A944-B806-7AEF1C4243D0}"/>
               </a:ext>
             </a:extLst>
           </p:cNvPr>
@@ -6647,7 +6825,7 @@
           <p:cNvPr id="10" name="內容版面配置區 2">
             <a:extLst>
               <a:ext uri="{FF2B5EF4-FFF2-40B4-BE49-F238E27FC236}">
-                <a16:creationId xmlns="" xmlns:a16="http://schemas.microsoft.com/office/drawing/2014/main" id="{71BB2DE9-F9EC-0747-8110-57B6F42C6240}"/>
+                <a16:creationId xmlns:a16="http://schemas.microsoft.com/office/drawing/2014/main" xmlns="" id="{71BB2DE9-F9EC-0747-8110-57B6F42C6240}"/>
               </a:ext>
             </a:extLst>
           </p:cNvPr>
@@ -6776,7 +6954,7 @@
           <p:cNvPr id="2" name="標題 1">
             <a:extLst>
               <a:ext uri="{FF2B5EF4-FFF2-40B4-BE49-F238E27FC236}">
-                <a16:creationId xmlns="" xmlns:a16="http://schemas.microsoft.com/office/drawing/2014/main" id="{AA60FC08-DB42-1443-B1D9-594B0DFFD819}"/>
+                <a16:creationId xmlns:a16="http://schemas.microsoft.com/office/drawing/2014/main" xmlns="" id="{AA60FC08-DB42-1443-B1D9-594B0DFFD819}"/>
               </a:ext>
             </a:extLst>
           </p:cNvPr>
@@ -6821,7 +6999,7 @@
           <p:cNvPr id="3" name="內容版面配置區 2">
             <a:extLst>
               <a:ext uri="{FF2B5EF4-FFF2-40B4-BE49-F238E27FC236}">
-                <a16:creationId xmlns="" xmlns:a16="http://schemas.microsoft.com/office/drawing/2014/main" id="{71BB2DE9-F9EC-0747-8110-57B6F42C6240}"/>
+                <a16:creationId xmlns:a16="http://schemas.microsoft.com/office/drawing/2014/main" xmlns="" id="{71BB2DE9-F9EC-0747-8110-57B6F42C6240}"/>
               </a:ext>
             </a:extLst>
           </p:cNvPr>
@@ -6929,7 +7107,7 @@
           <p:cNvPr id="4" name="日期版面配置區 3">
             <a:extLst>
               <a:ext uri="{FF2B5EF4-FFF2-40B4-BE49-F238E27FC236}">
-                <a16:creationId xmlns="" xmlns:a16="http://schemas.microsoft.com/office/drawing/2014/main" id="{6BA98535-4AD5-2846-9F28-9D341D2CBD82}"/>
+                <a16:creationId xmlns:a16="http://schemas.microsoft.com/office/drawing/2014/main" xmlns="" id="{6BA98535-4AD5-2846-9F28-9D341D2CBD82}"/>
               </a:ext>
             </a:extLst>
           </p:cNvPr>
@@ -6947,7 +7125,7 @@
           <a:p>
             <a:fld id="{75F8934F-7F83-1046-9341-02CE27D9104D}" type="datetimeFigureOut">
               <a:rPr kumimoji="1" lang="zh-TW" altLang="en-US" smtClean="0"/>
-              <a:t>2020/2/3</a:t>
+              <a:t>2020/2/6</a:t>
             </a:fld>
             <a:endParaRPr kumimoji="1" lang="zh-TW" altLang="en-US"/>
           </a:p>
@@ -6958,7 +7136,7 @@
           <p:cNvPr id="5" name="頁尾版面配置區 4">
             <a:extLst>
               <a:ext uri="{FF2B5EF4-FFF2-40B4-BE49-F238E27FC236}">
-                <a16:creationId xmlns="" xmlns:a16="http://schemas.microsoft.com/office/drawing/2014/main" id="{E4EAEED7-0802-7145-8C6C-66F66C8C1782}"/>
+                <a16:creationId xmlns:a16="http://schemas.microsoft.com/office/drawing/2014/main" xmlns="" id="{E4EAEED7-0802-7145-8C6C-66F66C8C1782}"/>
               </a:ext>
             </a:extLst>
           </p:cNvPr>
@@ -6983,7 +7161,7 @@
           <p:cNvPr id="6" name="投影片編號版面配置區 5">
             <a:extLst>
               <a:ext uri="{FF2B5EF4-FFF2-40B4-BE49-F238E27FC236}">
-                <a16:creationId xmlns="" xmlns:a16="http://schemas.microsoft.com/office/drawing/2014/main" id="{7D332B7E-1F76-A041-B6C6-AB635087BAB3}"/>
+                <a16:creationId xmlns:a16="http://schemas.microsoft.com/office/drawing/2014/main" xmlns="" id="{7D332B7E-1F76-A041-B6C6-AB635087BAB3}"/>
               </a:ext>
             </a:extLst>
           </p:cNvPr>
@@ -7012,7 +7190,7 @@
           <p:cNvPr id="7" name="矩形 6">
             <a:extLst>
               <a:ext uri="{FF2B5EF4-FFF2-40B4-BE49-F238E27FC236}">
-                <a16:creationId xmlns="" xmlns:a16="http://schemas.microsoft.com/office/drawing/2014/main" id="{C21960D3-0AC5-EE41-A19C-696161A1572E}"/>
+                <a16:creationId xmlns:a16="http://schemas.microsoft.com/office/drawing/2014/main" xmlns="" id="{C21960D3-0AC5-EE41-A19C-696161A1572E}"/>
               </a:ext>
             </a:extLst>
           </p:cNvPr>
@@ -7068,7 +7246,7 @@
           <p:cNvPr id="8" name="圖片 7">
             <a:extLst>
               <a:ext uri="{FF2B5EF4-FFF2-40B4-BE49-F238E27FC236}">
-                <a16:creationId xmlns="" xmlns:a16="http://schemas.microsoft.com/office/drawing/2014/main" id="{5E0EAD78-AEC6-AB45-A710-DD47E43CBB16}"/>
+                <a16:creationId xmlns:a16="http://schemas.microsoft.com/office/drawing/2014/main" xmlns="" id="{5E0EAD78-AEC6-AB45-A710-DD47E43CBB16}"/>
               </a:ext>
             </a:extLst>
           </p:cNvPr>
@@ -7104,7 +7282,7 @@
           <p:cNvPr id="9" name="矩形 8">
             <a:extLst>
               <a:ext uri="{FF2B5EF4-FFF2-40B4-BE49-F238E27FC236}">
-                <a16:creationId xmlns="" xmlns:a16="http://schemas.microsoft.com/office/drawing/2014/main" id="{387A2BAD-7558-A944-B806-7AEF1C4243D0}"/>
+                <a16:creationId xmlns:a16="http://schemas.microsoft.com/office/drawing/2014/main" xmlns="" id="{387A2BAD-7558-A944-B806-7AEF1C4243D0}"/>
               </a:ext>
             </a:extLst>
           </p:cNvPr>
@@ -7156,7 +7334,7 @@
           <p:cNvPr id="10" name="內容版面配置區 2">
             <a:extLst>
               <a:ext uri="{FF2B5EF4-FFF2-40B4-BE49-F238E27FC236}">
-                <a16:creationId xmlns="" xmlns:a16="http://schemas.microsoft.com/office/drawing/2014/main" id="{71BB2DE9-F9EC-0747-8110-57B6F42C6240}"/>
+                <a16:creationId xmlns:a16="http://schemas.microsoft.com/office/drawing/2014/main" xmlns="" id="{71BB2DE9-F9EC-0747-8110-57B6F42C6240}"/>
               </a:ext>
             </a:extLst>
           </p:cNvPr>
@@ -7264,7 +7442,7 @@
           <p:cNvPr id="11" name="內容版面配置區 2">
             <a:extLst>
               <a:ext uri="{FF2B5EF4-FFF2-40B4-BE49-F238E27FC236}">
-                <a16:creationId xmlns="" xmlns:a16="http://schemas.microsoft.com/office/drawing/2014/main" id="{71BB2DE9-F9EC-0747-8110-57B6F42C6240}"/>
+                <a16:creationId xmlns:a16="http://schemas.microsoft.com/office/drawing/2014/main" xmlns="" id="{71BB2DE9-F9EC-0747-8110-57B6F42C6240}"/>
               </a:ext>
             </a:extLst>
           </p:cNvPr>
@@ -7372,7 +7550,7 @@
           <p:cNvPr id="12" name="內容版面配置區 2">
             <a:extLst>
               <a:ext uri="{FF2B5EF4-FFF2-40B4-BE49-F238E27FC236}">
-                <a16:creationId xmlns="" xmlns:a16="http://schemas.microsoft.com/office/drawing/2014/main" id="{71BB2DE9-F9EC-0747-8110-57B6F42C6240}"/>
+                <a16:creationId xmlns:a16="http://schemas.microsoft.com/office/drawing/2014/main" xmlns="" id="{71BB2DE9-F9EC-0747-8110-57B6F42C6240}"/>
               </a:ext>
             </a:extLst>
           </p:cNvPr>
@@ -7510,7 +7688,7 @@
           <p:cNvPr id="7" name="矩形 6">
             <a:extLst>
               <a:ext uri="{FF2B5EF4-FFF2-40B4-BE49-F238E27FC236}">
-                <a16:creationId xmlns="" xmlns:a16="http://schemas.microsoft.com/office/drawing/2014/main" id="{8A770271-AB73-DA4C-9664-09A28120DA97}"/>
+                <a16:creationId xmlns:a16="http://schemas.microsoft.com/office/drawing/2014/main" xmlns="" id="{8A770271-AB73-DA4C-9664-09A28120DA97}"/>
               </a:ext>
             </a:extLst>
           </p:cNvPr>
@@ -7562,7 +7740,7 @@
           <p:cNvPr id="2" name="標題 1">
             <a:extLst>
               <a:ext uri="{FF2B5EF4-FFF2-40B4-BE49-F238E27FC236}">
-                <a16:creationId xmlns="" xmlns:a16="http://schemas.microsoft.com/office/drawing/2014/main" id="{155A4563-E84E-2143-94D2-868ECA667901}"/>
+                <a16:creationId xmlns:a16="http://schemas.microsoft.com/office/drawing/2014/main" xmlns="" id="{155A4563-E84E-2143-94D2-868ECA667901}"/>
               </a:ext>
             </a:extLst>
           </p:cNvPr>
@@ -7607,7 +7785,7 @@
           <p:cNvPr id="3" name="副標題 2">
             <a:extLst>
               <a:ext uri="{FF2B5EF4-FFF2-40B4-BE49-F238E27FC236}">
-                <a16:creationId xmlns="" xmlns:a16="http://schemas.microsoft.com/office/drawing/2014/main" id="{01C11A57-485A-7843-90B7-CE4D3710822E}"/>
+                <a16:creationId xmlns:a16="http://schemas.microsoft.com/office/drawing/2014/main" xmlns="" id="{01C11A57-485A-7843-90B7-CE4D3710822E}"/>
               </a:ext>
             </a:extLst>
           </p:cNvPr>
@@ -7683,7 +7861,7 @@
           <p:cNvPr id="4" name="日期版面配置區 3">
             <a:extLst>
               <a:ext uri="{FF2B5EF4-FFF2-40B4-BE49-F238E27FC236}">
-                <a16:creationId xmlns="" xmlns:a16="http://schemas.microsoft.com/office/drawing/2014/main" id="{6FF04DFD-F863-024F-AB15-7DEB6ABDA713}"/>
+                <a16:creationId xmlns:a16="http://schemas.microsoft.com/office/drawing/2014/main" xmlns="" id="{6FF04DFD-F863-024F-AB15-7DEB6ABDA713}"/>
               </a:ext>
             </a:extLst>
           </p:cNvPr>
@@ -7701,7 +7879,7 @@
           <a:p>
             <a:fld id="{75F8934F-7F83-1046-9341-02CE27D9104D}" type="datetimeFigureOut">
               <a:rPr kumimoji="1" lang="zh-TW" altLang="en-US" smtClean="0"/>
-              <a:t>2020/2/3</a:t>
+              <a:t>2020/2/6</a:t>
             </a:fld>
             <a:endParaRPr kumimoji="1" lang="zh-TW" altLang="en-US"/>
           </a:p>
@@ -7712,7 +7890,7 @@
           <p:cNvPr id="5" name="頁尾版面配置區 4">
             <a:extLst>
               <a:ext uri="{FF2B5EF4-FFF2-40B4-BE49-F238E27FC236}">
-                <a16:creationId xmlns="" xmlns:a16="http://schemas.microsoft.com/office/drawing/2014/main" id="{C42252C1-473D-124E-AAFE-BBC473106861}"/>
+                <a16:creationId xmlns:a16="http://schemas.microsoft.com/office/drawing/2014/main" xmlns="" id="{C42252C1-473D-124E-AAFE-BBC473106861}"/>
               </a:ext>
             </a:extLst>
           </p:cNvPr>
@@ -7737,7 +7915,7 @@
           <p:cNvPr id="6" name="投影片編號版面配置區 5">
             <a:extLst>
               <a:ext uri="{FF2B5EF4-FFF2-40B4-BE49-F238E27FC236}">
-                <a16:creationId xmlns="" xmlns:a16="http://schemas.microsoft.com/office/drawing/2014/main" id="{871B4E1C-D0B1-194C-8D0D-EEB67A6B5AFE}"/>
+                <a16:creationId xmlns:a16="http://schemas.microsoft.com/office/drawing/2014/main" xmlns="" id="{871B4E1C-D0B1-194C-8D0D-EEB67A6B5AFE}"/>
               </a:ext>
             </a:extLst>
           </p:cNvPr>
@@ -7766,7 +7944,7 @@
           <p:cNvPr id="8" name="圖片 7">
             <a:extLst>
               <a:ext uri="{FF2B5EF4-FFF2-40B4-BE49-F238E27FC236}">
-                <a16:creationId xmlns="" xmlns:a16="http://schemas.microsoft.com/office/drawing/2014/main" id="{CFC0D688-7C0C-F240-82D7-136060E3079C}"/>
+                <a16:creationId xmlns:a16="http://schemas.microsoft.com/office/drawing/2014/main" xmlns="" id="{CFC0D688-7C0C-F240-82D7-136060E3079C}"/>
               </a:ext>
             </a:extLst>
           </p:cNvPr>
@@ -7802,7 +7980,7 @@
           <p:cNvPr id="10" name="文字版面配置區 9">
             <a:extLst>
               <a:ext uri="{FF2B5EF4-FFF2-40B4-BE49-F238E27FC236}">
-                <a16:creationId xmlns="" xmlns:a16="http://schemas.microsoft.com/office/drawing/2014/main" id="{541677EC-052B-1741-B92F-902A83DB4CDB}"/>
+                <a16:creationId xmlns:a16="http://schemas.microsoft.com/office/drawing/2014/main" xmlns="" id="{541677EC-052B-1741-B92F-902A83DB4CDB}"/>
               </a:ext>
             </a:extLst>
           </p:cNvPr>
@@ -7883,7 +8061,7 @@
           <p:cNvPr id="2" name="標題 1">
             <a:extLst>
               <a:ext uri="{FF2B5EF4-FFF2-40B4-BE49-F238E27FC236}">
-                <a16:creationId xmlns="" xmlns:a16="http://schemas.microsoft.com/office/drawing/2014/main" id="{AA60FC08-DB42-1443-B1D9-594B0DFFD819}"/>
+                <a16:creationId xmlns:a16="http://schemas.microsoft.com/office/drawing/2014/main" xmlns="" id="{AA60FC08-DB42-1443-B1D9-594B0DFFD819}"/>
               </a:ext>
             </a:extLst>
           </p:cNvPr>
@@ -7928,7 +8106,7 @@
           <p:cNvPr id="3" name="內容版面配置區 2">
             <a:extLst>
               <a:ext uri="{FF2B5EF4-FFF2-40B4-BE49-F238E27FC236}">
-                <a16:creationId xmlns="" xmlns:a16="http://schemas.microsoft.com/office/drawing/2014/main" id="{71BB2DE9-F9EC-0747-8110-57B6F42C6240}"/>
+                <a16:creationId xmlns:a16="http://schemas.microsoft.com/office/drawing/2014/main" xmlns="" id="{71BB2DE9-F9EC-0747-8110-57B6F42C6240}"/>
               </a:ext>
             </a:extLst>
           </p:cNvPr>
@@ -8039,7 +8217,7 @@
           <p:cNvPr id="4" name="日期版面配置區 3">
             <a:extLst>
               <a:ext uri="{FF2B5EF4-FFF2-40B4-BE49-F238E27FC236}">
-                <a16:creationId xmlns="" xmlns:a16="http://schemas.microsoft.com/office/drawing/2014/main" id="{6BA98535-4AD5-2846-9F28-9D341D2CBD82}"/>
+                <a16:creationId xmlns:a16="http://schemas.microsoft.com/office/drawing/2014/main" xmlns="" id="{6BA98535-4AD5-2846-9F28-9D341D2CBD82}"/>
               </a:ext>
             </a:extLst>
           </p:cNvPr>
@@ -8057,7 +8235,7 @@
           <a:p>
             <a:fld id="{75F8934F-7F83-1046-9341-02CE27D9104D}" type="datetimeFigureOut">
               <a:rPr kumimoji="1" lang="zh-TW" altLang="en-US" smtClean="0"/>
-              <a:t>2020/2/3</a:t>
+              <a:t>2020/2/6</a:t>
             </a:fld>
             <a:endParaRPr kumimoji="1" lang="zh-TW" altLang="en-US"/>
           </a:p>
@@ -8068,7 +8246,7 @@
           <p:cNvPr id="5" name="頁尾版面配置區 4">
             <a:extLst>
               <a:ext uri="{FF2B5EF4-FFF2-40B4-BE49-F238E27FC236}">
-                <a16:creationId xmlns="" xmlns:a16="http://schemas.microsoft.com/office/drawing/2014/main" id="{E4EAEED7-0802-7145-8C6C-66F66C8C1782}"/>
+                <a16:creationId xmlns:a16="http://schemas.microsoft.com/office/drawing/2014/main" xmlns="" id="{E4EAEED7-0802-7145-8C6C-66F66C8C1782}"/>
               </a:ext>
             </a:extLst>
           </p:cNvPr>
@@ -8093,7 +8271,7 @@
           <p:cNvPr id="6" name="投影片編號版面配置區 5">
             <a:extLst>
               <a:ext uri="{FF2B5EF4-FFF2-40B4-BE49-F238E27FC236}">
-                <a16:creationId xmlns="" xmlns:a16="http://schemas.microsoft.com/office/drawing/2014/main" id="{7D332B7E-1F76-A041-B6C6-AB635087BAB3}"/>
+                <a16:creationId xmlns:a16="http://schemas.microsoft.com/office/drawing/2014/main" xmlns="" id="{7D332B7E-1F76-A041-B6C6-AB635087BAB3}"/>
               </a:ext>
             </a:extLst>
           </p:cNvPr>
@@ -8122,7 +8300,7 @@
           <p:cNvPr id="7" name="矩形 6">
             <a:extLst>
               <a:ext uri="{FF2B5EF4-FFF2-40B4-BE49-F238E27FC236}">
-                <a16:creationId xmlns="" xmlns:a16="http://schemas.microsoft.com/office/drawing/2014/main" id="{C21960D3-0AC5-EE41-A19C-696161A1572E}"/>
+                <a16:creationId xmlns:a16="http://schemas.microsoft.com/office/drawing/2014/main" xmlns="" id="{C21960D3-0AC5-EE41-A19C-696161A1572E}"/>
               </a:ext>
             </a:extLst>
           </p:cNvPr>
@@ -8178,7 +8356,7 @@
           <p:cNvPr id="8" name="圖片 7">
             <a:extLst>
               <a:ext uri="{FF2B5EF4-FFF2-40B4-BE49-F238E27FC236}">
-                <a16:creationId xmlns="" xmlns:a16="http://schemas.microsoft.com/office/drawing/2014/main" id="{5E0EAD78-AEC6-AB45-A710-DD47E43CBB16}"/>
+                <a16:creationId xmlns:a16="http://schemas.microsoft.com/office/drawing/2014/main" xmlns="" id="{5E0EAD78-AEC6-AB45-A710-DD47E43CBB16}"/>
               </a:ext>
             </a:extLst>
           </p:cNvPr>
@@ -8214,7 +8392,7 @@
           <p:cNvPr id="9" name="矩形 8">
             <a:extLst>
               <a:ext uri="{FF2B5EF4-FFF2-40B4-BE49-F238E27FC236}">
-                <a16:creationId xmlns="" xmlns:a16="http://schemas.microsoft.com/office/drawing/2014/main" id="{387A2BAD-7558-A944-B806-7AEF1C4243D0}"/>
+                <a16:creationId xmlns:a16="http://schemas.microsoft.com/office/drawing/2014/main" xmlns="" id="{387A2BAD-7558-A944-B806-7AEF1C4243D0}"/>
               </a:ext>
             </a:extLst>
           </p:cNvPr>
@@ -8266,7 +8444,7 @@
           <p:cNvPr id="10" name="內容版面配置區 2">
             <a:extLst>
               <a:ext uri="{FF2B5EF4-FFF2-40B4-BE49-F238E27FC236}">
-                <a16:creationId xmlns="" xmlns:a16="http://schemas.microsoft.com/office/drawing/2014/main" id="{71BB2DE9-F9EC-0747-8110-57B6F42C6240}"/>
+                <a16:creationId xmlns:a16="http://schemas.microsoft.com/office/drawing/2014/main" xmlns="" id="{71BB2DE9-F9EC-0747-8110-57B6F42C6240}"/>
               </a:ext>
             </a:extLst>
           </p:cNvPr>
@@ -8377,7 +8555,7 @@
           <p:cNvPr id="11" name="內容版面配置區 2">
             <a:extLst>
               <a:ext uri="{FF2B5EF4-FFF2-40B4-BE49-F238E27FC236}">
-                <a16:creationId xmlns="" xmlns:a16="http://schemas.microsoft.com/office/drawing/2014/main" id="{71BB2DE9-F9EC-0747-8110-57B6F42C6240}"/>
+                <a16:creationId xmlns:a16="http://schemas.microsoft.com/office/drawing/2014/main" xmlns="" id="{71BB2DE9-F9EC-0747-8110-57B6F42C6240}"/>
               </a:ext>
             </a:extLst>
           </p:cNvPr>
@@ -8488,7 +8666,7 @@
           <p:cNvPr id="12" name="內容版面配置區 2">
             <a:extLst>
               <a:ext uri="{FF2B5EF4-FFF2-40B4-BE49-F238E27FC236}">
-                <a16:creationId xmlns="" xmlns:a16="http://schemas.microsoft.com/office/drawing/2014/main" id="{71BB2DE9-F9EC-0747-8110-57B6F42C6240}"/>
+                <a16:creationId xmlns:a16="http://schemas.microsoft.com/office/drawing/2014/main" xmlns="" id="{71BB2DE9-F9EC-0747-8110-57B6F42C6240}"/>
               </a:ext>
             </a:extLst>
           </p:cNvPr>
@@ -8629,7 +8807,7 @@
           <p:cNvPr id="2" name="標題 1">
             <a:extLst>
               <a:ext uri="{FF2B5EF4-FFF2-40B4-BE49-F238E27FC236}">
-                <a16:creationId xmlns="" xmlns:a16="http://schemas.microsoft.com/office/drawing/2014/main" id="{AA60FC08-DB42-1443-B1D9-594B0DFFD819}"/>
+                <a16:creationId xmlns:a16="http://schemas.microsoft.com/office/drawing/2014/main" xmlns="" id="{AA60FC08-DB42-1443-B1D9-594B0DFFD819}"/>
               </a:ext>
             </a:extLst>
           </p:cNvPr>
@@ -8674,7 +8852,7 @@
           <p:cNvPr id="3" name="內容版面配置區 2">
             <a:extLst>
               <a:ext uri="{FF2B5EF4-FFF2-40B4-BE49-F238E27FC236}">
-                <a16:creationId xmlns="" xmlns:a16="http://schemas.microsoft.com/office/drawing/2014/main" id="{71BB2DE9-F9EC-0747-8110-57B6F42C6240}"/>
+                <a16:creationId xmlns:a16="http://schemas.microsoft.com/office/drawing/2014/main" xmlns="" id="{71BB2DE9-F9EC-0747-8110-57B6F42C6240}"/>
               </a:ext>
             </a:extLst>
           </p:cNvPr>
@@ -8773,7 +8951,7 @@
           <p:cNvPr id="4" name="日期版面配置區 3">
             <a:extLst>
               <a:ext uri="{FF2B5EF4-FFF2-40B4-BE49-F238E27FC236}">
-                <a16:creationId xmlns="" xmlns:a16="http://schemas.microsoft.com/office/drawing/2014/main" id="{6BA98535-4AD5-2846-9F28-9D341D2CBD82}"/>
+                <a16:creationId xmlns:a16="http://schemas.microsoft.com/office/drawing/2014/main" xmlns="" id="{6BA98535-4AD5-2846-9F28-9D341D2CBD82}"/>
               </a:ext>
             </a:extLst>
           </p:cNvPr>
@@ -8791,7 +8969,7 @@
           <a:p>
             <a:fld id="{75F8934F-7F83-1046-9341-02CE27D9104D}" type="datetimeFigureOut">
               <a:rPr kumimoji="1" lang="zh-TW" altLang="en-US" smtClean="0"/>
-              <a:t>2020/2/3</a:t>
+              <a:t>2020/2/6</a:t>
             </a:fld>
             <a:endParaRPr kumimoji="1" lang="zh-TW" altLang="en-US"/>
           </a:p>
@@ -8802,7 +8980,7 @@
           <p:cNvPr id="5" name="頁尾版面配置區 4">
             <a:extLst>
               <a:ext uri="{FF2B5EF4-FFF2-40B4-BE49-F238E27FC236}">
-                <a16:creationId xmlns="" xmlns:a16="http://schemas.microsoft.com/office/drawing/2014/main" id="{E4EAEED7-0802-7145-8C6C-66F66C8C1782}"/>
+                <a16:creationId xmlns:a16="http://schemas.microsoft.com/office/drawing/2014/main" xmlns="" id="{E4EAEED7-0802-7145-8C6C-66F66C8C1782}"/>
               </a:ext>
             </a:extLst>
           </p:cNvPr>
@@ -8827,7 +9005,7 @@
           <p:cNvPr id="6" name="投影片編號版面配置區 5">
             <a:extLst>
               <a:ext uri="{FF2B5EF4-FFF2-40B4-BE49-F238E27FC236}">
-                <a16:creationId xmlns="" xmlns:a16="http://schemas.microsoft.com/office/drawing/2014/main" id="{7D332B7E-1F76-A041-B6C6-AB635087BAB3}"/>
+                <a16:creationId xmlns:a16="http://schemas.microsoft.com/office/drawing/2014/main" xmlns="" id="{7D332B7E-1F76-A041-B6C6-AB635087BAB3}"/>
               </a:ext>
             </a:extLst>
           </p:cNvPr>
@@ -8856,7 +9034,7 @@
           <p:cNvPr id="7" name="矩形 6">
             <a:extLst>
               <a:ext uri="{FF2B5EF4-FFF2-40B4-BE49-F238E27FC236}">
-                <a16:creationId xmlns="" xmlns:a16="http://schemas.microsoft.com/office/drawing/2014/main" id="{C21960D3-0AC5-EE41-A19C-696161A1572E}"/>
+                <a16:creationId xmlns:a16="http://schemas.microsoft.com/office/drawing/2014/main" xmlns="" id="{C21960D3-0AC5-EE41-A19C-696161A1572E}"/>
               </a:ext>
             </a:extLst>
           </p:cNvPr>
@@ -8912,7 +9090,7 @@
           <p:cNvPr id="8" name="圖片 7">
             <a:extLst>
               <a:ext uri="{FF2B5EF4-FFF2-40B4-BE49-F238E27FC236}">
-                <a16:creationId xmlns="" xmlns:a16="http://schemas.microsoft.com/office/drawing/2014/main" id="{5E0EAD78-AEC6-AB45-A710-DD47E43CBB16}"/>
+                <a16:creationId xmlns:a16="http://schemas.microsoft.com/office/drawing/2014/main" xmlns="" id="{5E0EAD78-AEC6-AB45-A710-DD47E43CBB16}"/>
               </a:ext>
             </a:extLst>
           </p:cNvPr>
@@ -8948,7 +9126,7 @@
           <p:cNvPr id="9" name="矩形 8">
             <a:extLst>
               <a:ext uri="{FF2B5EF4-FFF2-40B4-BE49-F238E27FC236}">
-                <a16:creationId xmlns="" xmlns:a16="http://schemas.microsoft.com/office/drawing/2014/main" id="{387A2BAD-7558-A944-B806-7AEF1C4243D0}"/>
+                <a16:creationId xmlns:a16="http://schemas.microsoft.com/office/drawing/2014/main" xmlns="" id="{387A2BAD-7558-A944-B806-7AEF1C4243D0}"/>
               </a:ext>
             </a:extLst>
           </p:cNvPr>
@@ -9000,7 +9178,7 @@
           <p:cNvPr id="10" name="內容版面配置區 2">
             <a:extLst>
               <a:ext uri="{FF2B5EF4-FFF2-40B4-BE49-F238E27FC236}">
-                <a16:creationId xmlns="" xmlns:a16="http://schemas.microsoft.com/office/drawing/2014/main" id="{71BB2DE9-F9EC-0747-8110-57B6F42C6240}"/>
+                <a16:creationId xmlns:a16="http://schemas.microsoft.com/office/drawing/2014/main" xmlns="" id="{71BB2DE9-F9EC-0747-8110-57B6F42C6240}"/>
               </a:ext>
             </a:extLst>
           </p:cNvPr>
@@ -9099,7 +9277,7 @@
           <p:cNvPr id="11" name="內容版面配置區 2">
             <a:extLst>
               <a:ext uri="{FF2B5EF4-FFF2-40B4-BE49-F238E27FC236}">
-                <a16:creationId xmlns="" xmlns:a16="http://schemas.microsoft.com/office/drawing/2014/main" id="{71BB2DE9-F9EC-0747-8110-57B6F42C6240}"/>
+                <a16:creationId xmlns:a16="http://schemas.microsoft.com/office/drawing/2014/main" xmlns="" id="{71BB2DE9-F9EC-0747-8110-57B6F42C6240}"/>
               </a:ext>
             </a:extLst>
           </p:cNvPr>
@@ -9198,7 +9376,7 @@
           <p:cNvPr id="12" name="內容版面配置區 2">
             <a:extLst>
               <a:ext uri="{FF2B5EF4-FFF2-40B4-BE49-F238E27FC236}">
-                <a16:creationId xmlns="" xmlns:a16="http://schemas.microsoft.com/office/drawing/2014/main" id="{71BB2DE9-F9EC-0747-8110-57B6F42C6240}"/>
+                <a16:creationId xmlns:a16="http://schemas.microsoft.com/office/drawing/2014/main" xmlns="" id="{71BB2DE9-F9EC-0747-8110-57B6F42C6240}"/>
               </a:ext>
             </a:extLst>
           </p:cNvPr>
@@ -9361,7 +9539,7 @@
           <a:p>
             <a:fld id="{75F8934F-7F83-1046-9341-02CE27D9104D}" type="datetimeFigureOut">
               <a:rPr kumimoji="1" lang="zh-TW" altLang="en-US" smtClean="0"/>
-              <a:t>2020/2/3</a:t>
+              <a:t>2020/2/6</a:t>
             </a:fld>
             <a:endParaRPr kumimoji="1" lang="zh-TW" altLang="en-US"/>
           </a:p>
@@ -9414,7 +9592,7 @@
           <p:cNvPr id="7" name="內容版面配置區 2">
             <a:extLst>
               <a:ext uri="{FF2B5EF4-FFF2-40B4-BE49-F238E27FC236}">
-                <a16:creationId xmlns="" xmlns:a16="http://schemas.microsoft.com/office/drawing/2014/main" id="{DB7FC4C6-C26F-214E-B2D6-C9ED5E2BD195}"/>
+                <a16:creationId xmlns:a16="http://schemas.microsoft.com/office/drawing/2014/main" xmlns="" id="{DB7FC4C6-C26F-214E-B2D6-C9ED5E2BD195}"/>
               </a:ext>
             </a:extLst>
           </p:cNvPr>
@@ -9476,7 +9654,7 @@
           <p:cNvPr id="8" name="矩形 7">
             <a:extLst>
               <a:ext uri="{FF2B5EF4-FFF2-40B4-BE49-F238E27FC236}">
-                <a16:creationId xmlns="" xmlns:a16="http://schemas.microsoft.com/office/drawing/2014/main" id="{C21960D3-0AC5-EE41-A19C-696161A1572E}"/>
+                <a16:creationId xmlns:a16="http://schemas.microsoft.com/office/drawing/2014/main" xmlns="" id="{C21960D3-0AC5-EE41-A19C-696161A1572E}"/>
               </a:ext>
             </a:extLst>
           </p:cNvPr>
@@ -9532,7 +9710,7 @@
           <p:cNvPr id="9" name="矩形 8">
             <a:extLst>
               <a:ext uri="{FF2B5EF4-FFF2-40B4-BE49-F238E27FC236}">
-                <a16:creationId xmlns="" xmlns:a16="http://schemas.microsoft.com/office/drawing/2014/main" id="{387A2BAD-7558-A944-B806-7AEF1C4243D0}"/>
+                <a16:creationId xmlns:a16="http://schemas.microsoft.com/office/drawing/2014/main" xmlns="" id="{387A2BAD-7558-A944-B806-7AEF1C4243D0}"/>
               </a:ext>
             </a:extLst>
           </p:cNvPr>
@@ -9584,7 +9762,7 @@
           <p:cNvPr id="10" name="圖片 9">
             <a:extLst>
               <a:ext uri="{FF2B5EF4-FFF2-40B4-BE49-F238E27FC236}">
-                <a16:creationId xmlns="" xmlns:a16="http://schemas.microsoft.com/office/drawing/2014/main" id="{5E0EAD78-AEC6-AB45-A710-DD47E43CBB16}"/>
+                <a16:creationId xmlns:a16="http://schemas.microsoft.com/office/drawing/2014/main" xmlns="" id="{5E0EAD78-AEC6-AB45-A710-DD47E43CBB16}"/>
               </a:ext>
             </a:extLst>
           </p:cNvPr>
@@ -9650,7 +9828,7 @@
           <p:cNvPr id="2" name="標題 1">
             <a:extLst>
               <a:ext uri="{FF2B5EF4-FFF2-40B4-BE49-F238E27FC236}">
-                <a16:creationId xmlns="" xmlns:a16="http://schemas.microsoft.com/office/drawing/2014/main" id="{979C6CD6-89CE-E846-934F-01618F2F117C}"/>
+                <a16:creationId xmlns:a16="http://schemas.microsoft.com/office/drawing/2014/main" xmlns="" id="{979C6CD6-89CE-E846-934F-01618F2F117C}"/>
               </a:ext>
             </a:extLst>
           </p:cNvPr>
@@ -9678,7 +9856,7 @@
           <p:cNvPr id="3" name="內容版面配置區 2">
             <a:extLst>
               <a:ext uri="{FF2B5EF4-FFF2-40B4-BE49-F238E27FC236}">
-                <a16:creationId xmlns="" xmlns:a16="http://schemas.microsoft.com/office/drawing/2014/main" id="{DB7FC4C6-C26F-214E-B2D6-C9ED5E2BD195}"/>
+                <a16:creationId xmlns:a16="http://schemas.microsoft.com/office/drawing/2014/main" xmlns="" id="{DB7FC4C6-C26F-214E-B2D6-C9ED5E2BD195}"/>
               </a:ext>
             </a:extLst>
           </p:cNvPr>
@@ -9740,7 +9918,7 @@
           <p:cNvPr id="4" name="內容版面配置區 3">
             <a:extLst>
               <a:ext uri="{FF2B5EF4-FFF2-40B4-BE49-F238E27FC236}">
-                <a16:creationId xmlns="" xmlns:a16="http://schemas.microsoft.com/office/drawing/2014/main" id="{DBED84A6-8329-9742-B24D-788F26DEA102}"/>
+                <a16:creationId xmlns:a16="http://schemas.microsoft.com/office/drawing/2014/main" xmlns="" id="{DBED84A6-8329-9742-B24D-788F26DEA102}"/>
               </a:ext>
             </a:extLst>
           </p:cNvPr>
@@ -9802,7 +9980,7 @@
           <p:cNvPr id="5" name="日期版面配置區 4">
             <a:extLst>
               <a:ext uri="{FF2B5EF4-FFF2-40B4-BE49-F238E27FC236}">
-                <a16:creationId xmlns="" xmlns:a16="http://schemas.microsoft.com/office/drawing/2014/main" id="{B9046B7C-39BE-4A4E-B699-9748D6DA088D}"/>
+                <a16:creationId xmlns:a16="http://schemas.microsoft.com/office/drawing/2014/main" xmlns="" id="{B9046B7C-39BE-4A4E-B699-9748D6DA088D}"/>
               </a:ext>
             </a:extLst>
           </p:cNvPr>
@@ -9820,7 +9998,7 @@
           <a:p>
             <a:fld id="{75F8934F-7F83-1046-9341-02CE27D9104D}" type="datetimeFigureOut">
               <a:rPr kumimoji="1" lang="zh-TW" altLang="en-US" smtClean="0"/>
-              <a:t>2020/2/3</a:t>
+              <a:t>2020/2/6</a:t>
             </a:fld>
             <a:endParaRPr kumimoji="1" lang="zh-TW" altLang="en-US"/>
           </a:p>
@@ -9831,7 +10009,7 @@
           <p:cNvPr id="6" name="頁尾版面配置區 5">
             <a:extLst>
               <a:ext uri="{FF2B5EF4-FFF2-40B4-BE49-F238E27FC236}">
-                <a16:creationId xmlns="" xmlns:a16="http://schemas.microsoft.com/office/drawing/2014/main" id="{1AD5E07B-3935-B144-8CAF-5251EF861FDA}"/>
+                <a16:creationId xmlns:a16="http://schemas.microsoft.com/office/drawing/2014/main" xmlns="" id="{1AD5E07B-3935-B144-8CAF-5251EF861FDA}"/>
               </a:ext>
             </a:extLst>
           </p:cNvPr>
@@ -9856,7 +10034,7 @@
           <p:cNvPr id="7" name="投影片編號版面配置區 6">
             <a:extLst>
               <a:ext uri="{FF2B5EF4-FFF2-40B4-BE49-F238E27FC236}">
-                <a16:creationId xmlns="" xmlns:a16="http://schemas.microsoft.com/office/drawing/2014/main" id="{C9A0C168-E66B-E24E-B30C-62EBA9A41007}"/>
+                <a16:creationId xmlns:a16="http://schemas.microsoft.com/office/drawing/2014/main" xmlns="" id="{C9A0C168-E66B-E24E-B30C-62EBA9A41007}"/>
               </a:ext>
             </a:extLst>
           </p:cNvPr>
@@ -9885,7 +10063,7 @@
           <p:cNvPr id="8" name="圖片 7">
             <a:extLst>
               <a:ext uri="{FF2B5EF4-FFF2-40B4-BE49-F238E27FC236}">
-                <a16:creationId xmlns="" xmlns:a16="http://schemas.microsoft.com/office/drawing/2014/main" id="{5E0EAD78-AEC6-AB45-A710-DD47E43CBB16}"/>
+                <a16:creationId xmlns:a16="http://schemas.microsoft.com/office/drawing/2014/main" xmlns="" id="{5E0EAD78-AEC6-AB45-A710-DD47E43CBB16}"/>
               </a:ext>
             </a:extLst>
           </p:cNvPr>
@@ -9921,7 +10099,7 @@
           <p:cNvPr id="9" name="矩形 8">
             <a:extLst>
               <a:ext uri="{FF2B5EF4-FFF2-40B4-BE49-F238E27FC236}">
-                <a16:creationId xmlns="" xmlns:a16="http://schemas.microsoft.com/office/drawing/2014/main" id="{C21960D3-0AC5-EE41-A19C-696161A1572E}"/>
+                <a16:creationId xmlns:a16="http://schemas.microsoft.com/office/drawing/2014/main" xmlns="" id="{C21960D3-0AC5-EE41-A19C-696161A1572E}"/>
               </a:ext>
             </a:extLst>
           </p:cNvPr>
@@ -9977,7 +10155,7 @@
           <p:cNvPr id="10" name="矩形 9">
             <a:extLst>
               <a:ext uri="{FF2B5EF4-FFF2-40B4-BE49-F238E27FC236}">
-                <a16:creationId xmlns="" xmlns:a16="http://schemas.microsoft.com/office/drawing/2014/main" id="{387A2BAD-7558-A944-B806-7AEF1C4243D0}"/>
+                <a16:creationId xmlns:a16="http://schemas.microsoft.com/office/drawing/2014/main" xmlns="" id="{387A2BAD-7558-A944-B806-7AEF1C4243D0}"/>
               </a:ext>
             </a:extLst>
           </p:cNvPr>
@@ -10086,7 +10264,7 @@
           <p:cNvPr id="3" name="日期版面配置區 2">
             <a:extLst>
               <a:ext uri="{FF2B5EF4-FFF2-40B4-BE49-F238E27FC236}">
-                <a16:creationId xmlns="" xmlns:a16="http://schemas.microsoft.com/office/drawing/2014/main" id="{F7C17A4E-EBA6-E34A-A86C-76416798A0B8}"/>
+                <a16:creationId xmlns:a16="http://schemas.microsoft.com/office/drawing/2014/main" xmlns="" id="{F7C17A4E-EBA6-E34A-A86C-76416798A0B8}"/>
               </a:ext>
             </a:extLst>
           </p:cNvPr>
@@ -10104,7 +10282,7 @@
           <a:p>
             <a:fld id="{75F8934F-7F83-1046-9341-02CE27D9104D}" type="datetimeFigureOut">
               <a:rPr kumimoji="1" lang="zh-TW" altLang="en-US" smtClean="0"/>
-              <a:t>2020/2/3</a:t>
+              <a:t>2020/2/6</a:t>
             </a:fld>
             <a:endParaRPr kumimoji="1" lang="zh-TW" altLang="en-US"/>
           </a:p>
@@ -10115,7 +10293,7 @@
           <p:cNvPr id="4" name="頁尾版面配置區 3">
             <a:extLst>
               <a:ext uri="{FF2B5EF4-FFF2-40B4-BE49-F238E27FC236}">
-                <a16:creationId xmlns="" xmlns:a16="http://schemas.microsoft.com/office/drawing/2014/main" id="{CA1C1E17-1A60-0144-B993-55C5B1B81E94}"/>
+                <a16:creationId xmlns:a16="http://schemas.microsoft.com/office/drawing/2014/main" xmlns="" id="{CA1C1E17-1A60-0144-B993-55C5B1B81E94}"/>
               </a:ext>
             </a:extLst>
           </p:cNvPr>
@@ -10140,7 +10318,7 @@
           <p:cNvPr id="5" name="投影片編號版面配置區 4">
             <a:extLst>
               <a:ext uri="{FF2B5EF4-FFF2-40B4-BE49-F238E27FC236}">
-                <a16:creationId xmlns="" xmlns:a16="http://schemas.microsoft.com/office/drawing/2014/main" id="{6E191D9A-D235-9D49-814E-DCBBB84DC544}"/>
+                <a16:creationId xmlns:a16="http://schemas.microsoft.com/office/drawing/2014/main" xmlns="" id="{6E191D9A-D235-9D49-814E-DCBBB84DC544}"/>
               </a:ext>
             </a:extLst>
           </p:cNvPr>
@@ -10169,7 +10347,7 @@
           <p:cNvPr id="7" name="圖片 6">
             <a:extLst>
               <a:ext uri="{FF2B5EF4-FFF2-40B4-BE49-F238E27FC236}">
-                <a16:creationId xmlns="" xmlns:a16="http://schemas.microsoft.com/office/drawing/2014/main" id="{5E0EAD78-AEC6-AB45-A710-DD47E43CBB16}"/>
+                <a16:creationId xmlns:a16="http://schemas.microsoft.com/office/drawing/2014/main" xmlns="" id="{5E0EAD78-AEC6-AB45-A710-DD47E43CBB16}"/>
               </a:ext>
             </a:extLst>
           </p:cNvPr>
@@ -10249,7 +10427,7 @@
           <p:cNvPr id="12" name="內容版面配置區 2">
             <a:extLst>
               <a:ext uri="{FF2B5EF4-FFF2-40B4-BE49-F238E27FC236}">
-                <a16:creationId xmlns="" xmlns:a16="http://schemas.microsoft.com/office/drawing/2014/main" id="{DB7FC4C6-C26F-214E-B2D6-C9ED5E2BD195}"/>
+                <a16:creationId xmlns:a16="http://schemas.microsoft.com/office/drawing/2014/main" xmlns="" id="{DB7FC4C6-C26F-214E-B2D6-C9ED5E2BD195}"/>
               </a:ext>
             </a:extLst>
           </p:cNvPr>
@@ -10311,7 +10489,7 @@
           <p:cNvPr id="13" name="矩形 12">
             <a:extLst>
               <a:ext uri="{FF2B5EF4-FFF2-40B4-BE49-F238E27FC236}">
-                <a16:creationId xmlns="" xmlns:a16="http://schemas.microsoft.com/office/drawing/2014/main" id="{C21960D3-0AC5-EE41-A19C-696161A1572E}"/>
+                <a16:creationId xmlns:a16="http://schemas.microsoft.com/office/drawing/2014/main" xmlns="" id="{C21960D3-0AC5-EE41-A19C-696161A1572E}"/>
               </a:ext>
             </a:extLst>
           </p:cNvPr>
@@ -10367,7 +10545,7 @@
           <p:cNvPr id="15" name="矩形 14">
             <a:extLst>
               <a:ext uri="{FF2B5EF4-FFF2-40B4-BE49-F238E27FC236}">
-                <a16:creationId xmlns="" xmlns:a16="http://schemas.microsoft.com/office/drawing/2014/main" id="{387A2BAD-7558-A944-B806-7AEF1C4243D0}"/>
+                <a16:creationId xmlns:a16="http://schemas.microsoft.com/office/drawing/2014/main" xmlns="" id="{387A2BAD-7558-A944-B806-7AEF1C4243D0}"/>
               </a:ext>
             </a:extLst>
           </p:cNvPr>
@@ -10624,7 +10802,7 @@
           <a:p>
             <a:fld id="{58A8743F-B12E-458C-9EA7-7F147439A6EC}" type="datetimeFigureOut">
               <a:rPr lang="zh-TW" altLang="en-US" smtClean="0"/>
-              <a:t>2020/2/3</a:t>
+              <a:t>2020/2/6</a:t>
             </a:fld>
             <a:endParaRPr lang="zh-TW" altLang="en-US"/>
           </a:p>
@@ -10677,7 +10855,7 @@
           <p:cNvPr id="8" name="矩形 7">
             <a:extLst>
               <a:ext uri="{FF2B5EF4-FFF2-40B4-BE49-F238E27FC236}">
-                <a16:creationId xmlns="" xmlns:a16="http://schemas.microsoft.com/office/drawing/2014/main" id="{C21960D3-0AC5-EE41-A19C-696161A1572E}"/>
+                <a16:creationId xmlns:a16="http://schemas.microsoft.com/office/drawing/2014/main" xmlns="" id="{C21960D3-0AC5-EE41-A19C-696161A1572E}"/>
               </a:ext>
             </a:extLst>
           </p:cNvPr>
@@ -10891,7 +11069,7 @@
           <p:cNvPr id="2" name="標題 1">
             <a:extLst>
               <a:ext uri="{FF2B5EF4-FFF2-40B4-BE49-F238E27FC236}">
-                <a16:creationId xmlns="" xmlns:a16="http://schemas.microsoft.com/office/drawing/2014/main" id="{6A1C7254-695B-1F42-AC59-34E8D858E936}"/>
+                <a16:creationId xmlns:a16="http://schemas.microsoft.com/office/drawing/2014/main" xmlns="" id="{6A1C7254-695B-1F42-AC59-34E8D858E936}"/>
               </a:ext>
             </a:extLst>
           </p:cNvPr>
@@ -10934,7 +11112,7 @@
           <p:cNvPr id="3" name="文字版面配置區 2">
             <a:extLst>
               <a:ext uri="{FF2B5EF4-FFF2-40B4-BE49-F238E27FC236}">
-                <a16:creationId xmlns="" xmlns:a16="http://schemas.microsoft.com/office/drawing/2014/main" id="{1D19DA3B-2013-E14B-A941-CC519B76AD6F}"/>
+                <a16:creationId xmlns:a16="http://schemas.microsoft.com/office/drawing/2014/main" xmlns="" id="{1D19DA3B-2013-E14B-A941-CC519B76AD6F}"/>
               </a:ext>
             </a:extLst>
           </p:cNvPr>
@@ -11059,7 +11237,7 @@
           <p:cNvPr id="4" name="日期版面配置區 3">
             <a:extLst>
               <a:ext uri="{FF2B5EF4-FFF2-40B4-BE49-F238E27FC236}">
-                <a16:creationId xmlns="" xmlns:a16="http://schemas.microsoft.com/office/drawing/2014/main" id="{BC7211D9-290C-574E-B682-764110BB9BAF}"/>
+                <a16:creationId xmlns:a16="http://schemas.microsoft.com/office/drawing/2014/main" xmlns="" id="{BC7211D9-290C-574E-B682-764110BB9BAF}"/>
               </a:ext>
             </a:extLst>
           </p:cNvPr>
@@ -11077,7 +11255,7 @@
           <a:p>
             <a:fld id="{75F8934F-7F83-1046-9341-02CE27D9104D}" type="datetimeFigureOut">
               <a:rPr kumimoji="1" lang="zh-TW" altLang="en-US" smtClean="0"/>
-              <a:t>2020/2/3</a:t>
+              <a:t>2020/2/6</a:t>
             </a:fld>
             <a:endParaRPr kumimoji="1" lang="zh-TW" altLang="en-US" dirty="0"/>
           </a:p>
@@ -11088,7 +11266,7 @@
           <p:cNvPr id="5" name="頁尾版面配置區 4">
             <a:extLst>
               <a:ext uri="{FF2B5EF4-FFF2-40B4-BE49-F238E27FC236}">
-                <a16:creationId xmlns="" xmlns:a16="http://schemas.microsoft.com/office/drawing/2014/main" id="{D4D4BDD1-0BFA-0645-8197-068191AAF54C}"/>
+                <a16:creationId xmlns:a16="http://schemas.microsoft.com/office/drawing/2014/main" xmlns="" id="{D4D4BDD1-0BFA-0645-8197-068191AAF54C}"/>
               </a:ext>
             </a:extLst>
           </p:cNvPr>
@@ -11113,7 +11291,7 @@
           <p:cNvPr id="6" name="投影片編號版面配置區 5">
             <a:extLst>
               <a:ext uri="{FF2B5EF4-FFF2-40B4-BE49-F238E27FC236}">
-                <a16:creationId xmlns="" xmlns:a16="http://schemas.microsoft.com/office/drawing/2014/main" id="{F592E68C-AEE0-D84B-8844-7CF5E83647F7}"/>
+                <a16:creationId xmlns:a16="http://schemas.microsoft.com/office/drawing/2014/main" xmlns="" id="{F592E68C-AEE0-D84B-8844-7CF5E83647F7}"/>
               </a:ext>
             </a:extLst>
           </p:cNvPr>
@@ -11218,7 +11396,7 @@
           <p:cNvPr id="2" name="標題 1">
             <a:extLst>
               <a:ext uri="{FF2B5EF4-FFF2-40B4-BE49-F238E27FC236}">
-                <a16:creationId xmlns="" xmlns:a16="http://schemas.microsoft.com/office/drawing/2014/main" id="{6A1C7254-695B-1F42-AC59-34E8D858E936}"/>
+                <a16:creationId xmlns:a16="http://schemas.microsoft.com/office/drawing/2014/main" xmlns="" id="{6A1C7254-695B-1F42-AC59-34E8D858E936}"/>
               </a:ext>
             </a:extLst>
           </p:cNvPr>
@@ -11261,7 +11439,7 @@
           <p:cNvPr id="3" name="文字版面配置區 2">
             <a:extLst>
               <a:ext uri="{FF2B5EF4-FFF2-40B4-BE49-F238E27FC236}">
-                <a16:creationId xmlns="" xmlns:a16="http://schemas.microsoft.com/office/drawing/2014/main" id="{1D19DA3B-2013-E14B-A941-CC519B76AD6F}"/>
+                <a16:creationId xmlns:a16="http://schemas.microsoft.com/office/drawing/2014/main" xmlns="" id="{1D19DA3B-2013-E14B-A941-CC519B76AD6F}"/>
               </a:ext>
             </a:extLst>
           </p:cNvPr>
@@ -11386,7 +11564,7 @@
           <p:cNvPr id="4" name="日期版面配置區 3">
             <a:extLst>
               <a:ext uri="{FF2B5EF4-FFF2-40B4-BE49-F238E27FC236}">
-                <a16:creationId xmlns="" xmlns:a16="http://schemas.microsoft.com/office/drawing/2014/main" id="{BC7211D9-290C-574E-B682-764110BB9BAF}"/>
+                <a16:creationId xmlns:a16="http://schemas.microsoft.com/office/drawing/2014/main" xmlns="" id="{BC7211D9-290C-574E-B682-764110BB9BAF}"/>
               </a:ext>
             </a:extLst>
           </p:cNvPr>
@@ -11404,7 +11582,7 @@
           <a:p>
             <a:fld id="{75F8934F-7F83-1046-9341-02CE27D9104D}" type="datetimeFigureOut">
               <a:rPr kumimoji="1" lang="zh-TW" altLang="en-US" smtClean="0"/>
-              <a:t>2020/2/3</a:t>
+              <a:t>2020/2/6</a:t>
             </a:fld>
             <a:endParaRPr kumimoji="1" lang="zh-TW" altLang="en-US" dirty="0"/>
           </a:p>
@@ -11415,7 +11593,7 @@
           <p:cNvPr id="5" name="頁尾版面配置區 4">
             <a:extLst>
               <a:ext uri="{FF2B5EF4-FFF2-40B4-BE49-F238E27FC236}">
-                <a16:creationId xmlns="" xmlns:a16="http://schemas.microsoft.com/office/drawing/2014/main" id="{D4D4BDD1-0BFA-0645-8197-068191AAF54C}"/>
+                <a16:creationId xmlns:a16="http://schemas.microsoft.com/office/drawing/2014/main" xmlns="" id="{D4D4BDD1-0BFA-0645-8197-068191AAF54C}"/>
               </a:ext>
             </a:extLst>
           </p:cNvPr>
@@ -11440,7 +11618,7 @@
           <p:cNvPr id="6" name="投影片編號版面配置區 5">
             <a:extLst>
               <a:ext uri="{FF2B5EF4-FFF2-40B4-BE49-F238E27FC236}">
-                <a16:creationId xmlns="" xmlns:a16="http://schemas.microsoft.com/office/drawing/2014/main" id="{F592E68C-AEE0-D84B-8844-7CF5E83647F7}"/>
+                <a16:creationId xmlns:a16="http://schemas.microsoft.com/office/drawing/2014/main" xmlns="" id="{F592E68C-AEE0-D84B-8844-7CF5E83647F7}"/>
               </a:ext>
             </a:extLst>
           </p:cNvPr>
@@ -11469,7 +11647,7 @@
           <p:cNvPr id="7" name="圖片 6">
             <a:extLst>
               <a:ext uri="{FF2B5EF4-FFF2-40B4-BE49-F238E27FC236}">
-                <a16:creationId xmlns="" xmlns:a16="http://schemas.microsoft.com/office/drawing/2014/main" id="{CFC0D688-7C0C-F240-82D7-136060E3079C}"/>
+                <a16:creationId xmlns:a16="http://schemas.microsoft.com/office/drawing/2014/main" xmlns="" id="{CFC0D688-7C0C-F240-82D7-136060E3079C}"/>
               </a:ext>
             </a:extLst>
           </p:cNvPr>
@@ -11668,7 +11846,7 @@
           <p:cNvPr id="2" name="標題 1">
             <a:extLst>
               <a:ext uri="{FF2B5EF4-FFF2-40B4-BE49-F238E27FC236}">
-                <a16:creationId xmlns="" xmlns:a16="http://schemas.microsoft.com/office/drawing/2014/main" id="{6A1C7254-695B-1F42-AC59-34E8D858E936}"/>
+                <a16:creationId xmlns:a16="http://schemas.microsoft.com/office/drawing/2014/main" xmlns="" id="{6A1C7254-695B-1F42-AC59-34E8D858E936}"/>
               </a:ext>
             </a:extLst>
           </p:cNvPr>
@@ -11711,7 +11889,7 @@
           <p:cNvPr id="3" name="文字版面配置區 2">
             <a:extLst>
               <a:ext uri="{FF2B5EF4-FFF2-40B4-BE49-F238E27FC236}">
-                <a16:creationId xmlns="" xmlns:a16="http://schemas.microsoft.com/office/drawing/2014/main" id="{1D19DA3B-2013-E14B-A941-CC519B76AD6F}"/>
+                <a16:creationId xmlns:a16="http://schemas.microsoft.com/office/drawing/2014/main" xmlns="" id="{1D19DA3B-2013-E14B-A941-CC519B76AD6F}"/>
               </a:ext>
             </a:extLst>
           </p:cNvPr>
@@ -11836,7 +12014,7 @@
           <p:cNvPr id="4" name="日期版面配置區 3">
             <a:extLst>
               <a:ext uri="{FF2B5EF4-FFF2-40B4-BE49-F238E27FC236}">
-                <a16:creationId xmlns="" xmlns:a16="http://schemas.microsoft.com/office/drawing/2014/main" id="{BC7211D9-290C-574E-B682-764110BB9BAF}"/>
+                <a16:creationId xmlns:a16="http://schemas.microsoft.com/office/drawing/2014/main" xmlns="" id="{BC7211D9-290C-574E-B682-764110BB9BAF}"/>
               </a:ext>
             </a:extLst>
           </p:cNvPr>
@@ -11854,7 +12032,7 @@
           <a:p>
             <a:fld id="{75F8934F-7F83-1046-9341-02CE27D9104D}" type="datetimeFigureOut">
               <a:rPr kumimoji="1" lang="zh-TW" altLang="en-US" smtClean="0"/>
-              <a:t>2020/2/3</a:t>
+              <a:t>2020/2/6</a:t>
             </a:fld>
             <a:endParaRPr kumimoji="1" lang="zh-TW" altLang="en-US" dirty="0"/>
           </a:p>
@@ -11865,7 +12043,7 @@
           <p:cNvPr id="5" name="頁尾版面配置區 4">
             <a:extLst>
               <a:ext uri="{FF2B5EF4-FFF2-40B4-BE49-F238E27FC236}">
-                <a16:creationId xmlns="" xmlns:a16="http://schemas.microsoft.com/office/drawing/2014/main" id="{D4D4BDD1-0BFA-0645-8197-068191AAF54C}"/>
+                <a16:creationId xmlns:a16="http://schemas.microsoft.com/office/drawing/2014/main" xmlns="" id="{D4D4BDD1-0BFA-0645-8197-068191AAF54C}"/>
               </a:ext>
             </a:extLst>
           </p:cNvPr>
@@ -11890,7 +12068,7 @@
           <p:cNvPr id="6" name="投影片編號版面配置區 5">
             <a:extLst>
               <a:ext uri="{FF2B5EF4-FFF2-40B4-BE49-F238E27FC236}">
-                <a16:creationId xmlns="" xmlns:a16="http://schemas.microsoft.com/office/drawing/2014/main" id="{F592E68C-AEE0-D84B-8844-7CF5E83647F7}"/>
+                <a16:creationId xmlns:a16="http://schemas.microsoft.com/office/drawing/2014/main" xmlns="" id="{F592E68C-AEE0-D84B-8844-7CF5E83647F7}"/>
               </a:ext>
             </a:extLst>
           </p:cNvPr>
@@ -11999,7 +12177,7 @@
           <p:cNvPr id="3" name="內容版面配置區 2">
             <a:extLst>
               <a:ext uri="{FF2B5EF4-FFF2-40B4-BE49-F238E27FC236}">
-                <a16:creationId xmlns="" xmlns:a16="http://schemas.microsoft.com/office/drawing/2014/main" id="{DB7FC4C6-C26F-214E-B2D6-C9ED5E2BD195}"/>
+                <a16:creationId xmlns:a16="http://schemas.microsoft.com/office/drawing/2014/main" xmlns="" id="{DB7FC4C6-C26F-214E-B2D6-C9ED5E2BD195}"/>
               </a:ext>
             </a:extLst>
           </p:cNvPr>
@@ -12091,7 +12269,7 @@
           <p:cNvPr id="5" name="日期版面配置區 4">
             <a:extLst>
               <a:ext uri="{FF2B5EF4-FFF2-40B4-BE49-F238E27FC236}">
-                <a16:creationId xmlns="" xmlns:a16="http://schemas.microsoft.com/office/drawing/2014/main" id="{B9046B7C-39BE-4A4E-B699-9748D6DA088D}"/>
+                <a16:creationId xmlns:a16="http://schemas.microsoft.com/office/drawing/2014/main" xmlns="" id="{B9046B7C-39BE-4A4E-B699-9748D6DA088D}"/>
               </a:ext>
             </a:extLst>
           </p:cNvPr>
@@ -12109,7 +12287,7 @@
           <a:p>
             <a:fld id="{75F8934F-7F83-1046-9341-02CE27D9104D}" type="datetimeFigureOut">
               <a:rPr kumimoji="1" lang="zh-TW" altLang="en-US" smtClean="0"/>
-              <a:t>2020/2/3</a:t>
+              <a:t>2020/2/6</a:t>
             </a:fld>
             <a:endParaRPr kumimoji="1" lang="zh-TW" altLang="en-US"/>
           </a:p>
@@ -12120,7 +12298,7 @@
           <p:cNvPr id="6" name="頁尾版面配置區 5">
             <a:extLst>
               <a:ext uri="{FF2B5EF4-FFF2-40B4-BE49-F238E27FC236}">
-                <a16:creationId xmlns="" xmlns:a16="http://schemas.microsoft.com/office/drawing/2014/main" id="{1AD5E07B-3935-B144-8CAF-5251EF861FDA}"/>
+                <a16:creationId xmlns:a16="http://schemas.microsoft.com/office/drawing/2014/main" xmlns="" id="{1AD5E07B-3935-B144-8CAF-5251EF861FDA}"/>
               </a:ext>
             </a:extLst>
           </p:cNvPr>
@@ -12145,7 +12323,7 @@
           <p:cNvPr id="7" name="投影片編號版面配置區 6">
             <a:extLst>
               <a:ext uri="{FF2B5EF4-FFF2-40B4-BE49-F238E27FC236}">
-                <a16:creationId xmlns="" xmlns:a16="http://schemas.microsoft.com/office/drawing/2014/main" id="{C9A0C168-E66B-E24E-B30C-62EBA9A41007}"/>
+                <a16:creationId xmlns:a16="http://schemas.microsoft.com/office/drawing/2014/main" xmlns="" id="{C9A0C168-E66B-E24E-B30C-62EBA9A41007}"/>
               </a:ext>
             </a:extLst>
           </p:cNvPr>
@@ -12174,7 +12352,7 @@
           <p:cNvPr id="8" name="圖片 7">
             <a:extLst>
               <a:ext uri="{FF2B5EF4-FFF2-40B4-BE49-F238E27FC236}">
-                <a16:creationId xmlns="" xmlns:a16="http://schemas.microsoft.com/office/drawing/2014/main" id="{5E0EAD78-AEC6-AB45-A710-DD47E43CBB16}"/>
+                <a16:creationId xmlns:a16="http://schemas.microsoft.com/office/drawing/2014/main" xmlns="" id="{5E0EAD78-AEC6-AB45-A710-DD47E43CBB16}"/>
               </a:ext>
             </a:extLst>
           </p:cNvPr>
@@ -12210,7 +12388,7 @@
           <p:cNvPr id="10" name="矩形 9">
             <a:extLst>
               <a:ext uri="{FF2B5EF4-FFF2-40B4-BE49-F238E27FC236}">
-                <a16:creationId xmlns="" xmlns:a16="http://schemas.microsoft.com/office/drawing/2014/main" id="{387A2BAD-7558-A944-B806-7AEF1C4243D0}"/>
+                <a16:creationId xmlns:a16="http://schemas.microsoft.com/office/drawing/2014/main" xmlns="" id="{387A2BAD-7558-A944-B806-7AEF1C4243D0}"/>
               </a:ext>
             </a:extLst>
           </p:cNvPr>
@@ -12262,7 +12440,7 @@
           <p:cNvPr id="11" name="標題 1">
             <a:extLst>
               <a:ext uri="{FF2B5EF4-FFF2-40B4-BE49-F238E27FC236}">
-                <a16:creationId xmlns="" xmlns:a16="http://schemas.microsoft.com/office/drawing/2014/main" id="{AA60FC08-DB42-1443-B1D9-594B0DFFD819}"/>
+                <a16:creationId xmlns:a16="http://schemas.microsoft.com/office/drawing/2014/main" xmlns="" id="{AA60FC08-DB42-1443-B1D9-594B0DFFD819}"/>
               </a:ext>
             </a:extLst>
           </p:cNvPr>
@@ -12307,7 +12485,7 @@
           <p:cNvPr id="13" name="矩形 12">
             <a:extLst>
               <a:ext uri="{FF2B5EF4-FFF2-40B4-BE49-F238E27FC236}">
-                <a16:creationId xmlns="" xmlns:a16="http://schemas.microsoft.com/office/drawing/2014/main" id="{C21960D3-0AC5-EE41-A19C-696161A1572E}"/>
+                <a16:creationId xmlns:a16="http://schemas.microsoft.com/office/drawing/2014/main" xmlns="" id="{C21960D3-0AC5-EE41-A19C-696161A1572E}"/>
               </a:ext>
             </a:extLst>
           </p:cNvPr>
@@ -12417,7 +12595,7 @@
           <p:cNvPr id="12" name="矩形 11">
             <a:extLst>
               <a:ext uri="{FF2B5EF4-FFF2-40B4-BE49-F238E27FC236}">
-                <a16:creationId xmlns="" xmlns:a16="http://schemas.microsoft.com/office/drawing/2014/main" id="{387A2BAD-7558-A944-B806-7AEF1C4243D0}"/>
+                <a16:creationId xmlns:a16="http://schemas.microsoft.com/office/drawing/2014/main" xmlns="" id="{387A2BAD-7558-A944-B806-7AEF1C4243D0}"/>
               </a:ext>
             </a:extLst>
           </p:cNvPr>
@@ -12566,7 +12744,7 @@
           <p:cNvPr id="2" name="標題 1">
             <a:extLst>
               <a:ext uri="{FF2B5EF4-FFF2-40B4-BE49-F238E27FC236}">
-                <a16:creationId xmlns="" xmlns:a16="http://schemas.microsoft.com/office/drawing/2014/main" id="{979C6CD6-89CE-E846-934F-01618F2F117C}"/>
+                <a16:creationId xmlns:a16="http://schemas.microsoft.com/office/drawing/2014/main" xmlns="" id="{979C6CD6-89CE-E846-934F-01618F2F117C}"/>
               </a:ext>
             </a:extLst>
           </p:cNvPr>
@@ -12607,7 +12785,7 @@
           <p:cNvPr id="3" name="內容版面配置區 2">
             <a:extLst>
               <a:ext uri="{FF2B5EF4-FFF2-40B4-BE49-F238E27FC236}">
-                <a16:creationId xmlns="" xmlns:a16="http://schemas.microsoft.com/office/drawing/2014/main" id="{DB7FC4C6-C26F-214E-B2D6-C9ED5E2BD195}"/>
+                <a16:creationId xmlns:a16="http://schemas.microsoft.com/office/drawing/2014/main" xmlns="" id="{DB7FC4C6-C26F-214E-B2D6-C9ED5E2BD195}"/>
               </a:ext>
             </a:extLst>
           </p:cNvPr>
@@ -12699,7 +12877,7 @@
           <p:cNvPr id="5" name="日期版面配置區 4">
             <a:extLst>
               <a:ext uri="{FF2B5EF4-FFF2-40B4-BE49-F238E27FC236}">
-                <a16:creationId xmlns="" xmlns:a16="http://schemas.microsoft.com/office/drawing/2014/main" id="{B9046B7C-39BE-4A4E-B699-9748D6DA088D}"/>
+                <a16:creationId xmlns:a16="http://schemas.microsoft.com/office/drawing/2014/main" xmlns="" id="{B9046B7C-39BE-4A4E-B699-9748D6DA088D}"/>
               </a:ext>
             </a:extLst>
           </p:cNvPr>
@@ -12717,7 +12895,7 @@
           <a:p>
             <a:fld id="{75F8934F-7F83-1046-9341-02CE27D9104D}" type="datetimeFigureOut">
               <a:rPr kumimoji="1" lang="zh-TW" altLang="en-US" smtClean="0"/>
-              <a:t>2020/2/3</a:t>
+              <a:t>2020/2/6</a:t>
             </a:fld>
             <a:endParaRPr kumimoji="1" lang="zh-TW" altLang="en-US"/>
           </a:p>
@@ -12728,7 +12906,7 @@
           <p:cNvPr id="6" name="頁尾版面配置區 5">
             <a:extLst>
               <a:ext uri="{FF2B5EF4-FFF2-40B4-BE49-F238E27FC236}">
-                <a16:creationId xmlns="" xmlns:a16="http://schemas.microsoft.com/office/drawing/2014/main" id="{1AD5E07B-3935-B144-8CAF-5251EF861FDA}"/>
+                <a16:creationId xmlns:a16="http://schemas.microsoft.com/office/drawing/2014/main" xmlns="" id="{1AD5E07B-3935-B144-8CAF-5251EF861FDA}"/>
               </a:ext>
             </a:extLst>
           </p:cNvPr>
@@ -12753,7 +12931,7 @@
           <p:cNvPr id="7" name="投影片編號版面配置區 6">
             <a:extLst>
               <a:ext uri="{FF2B5EF4-FFF2-40B4-BE49-F238E27FC236}">
-                <a16:creationId xmlns="" xmlns:a16="http://schemas.microsoft.com/office/drawing/2014/main" id="{C9A0C168-E66B-E24E-B30C-62EBA9A41007}"/>
+                <a16:creationId xmlns:a16="http://schemas.microsoft.com/office/drawing/2014/main" xmlns="" id="{C9A0C168-E66B-E24E-B30C-62EBA9A41007}"/>
               </a:ext>
             </a:extLst>
           </p:cNvPr>
@@ -12782,7 +12960,7 @@
           <p:cNvPr id="8" name="圖片 7">
             <a:extLst>
               <a:ext uri="{FF2B5EF4-FFF2-40B4-BE49-F238E27FC236}">
-                <a16:creationId xmlns="" xmlns:a16="http://schemas.microsoft.com/office/drawing/2014/main" id="{5E0EAD78-AEC6-AB45-A710-DD47E43CBB16}"/>
+                <a16:creationId xmlns:a16="http://schemas.microsoft.com/office/drawing/2014/main" xmlns="" id="{5E0EAD78-AEC6-AB45-A710-DD47E43CBB16}"/>
               </a:ext>
             </a:extLst>
           </p:cNvPr>
@@ -12818,7 +12996,7 @@
           <p:cNvPr id="17" name="內容版面配置區 2">
             <a:extLst>
               <a:ext uri="{FF2B5EF4-FFF2-40B4-BE49-F238E27FC236}">
-                <a16:creationId xmlns="" xmlns:a16="http://schemas.microsoft.com/office/drawing/2014/main" id="{DB7FC4C6-C26F-214E-B2D6-C9ED5E2BD195}"/>
+                <a16:creationId xmlns:a16="http://schemas.microsoft.com/office/drawing/2014/main" xmlns="" id="{DB7FC4C6-C26F-214E-B2D6-C9ED5E2BD195}"/>
               </a:ext>
             </a:extLst>
           </p:cNvPr>
@@ -12910,7 +13088,7 @@
           <p:cNvPr id="24" name="內容版面配置區 2">
             <a:extLst>
               <a:ext uri="{FF2B5EF4-FFF2-40B4-BE49-F238E27FC236}">
-                <a16:creationId xmlns="" xmlns:a16="http://schemas.microsoft.com/office/drawing/2014/main" id="{DB7FC4C6-C26F-214E-B2D6-C9ED5E2BD195}"/>
+                <a16:creationId xmlns:a16="http://schemas.microsoft.com/office/drawing/2014/main" xmlns="" id="{DB7FC4C6-C26F-214E-B2D6-C9ED5E2BD195}"/>
               </a:ext>
             </a:extLst>
           </p:cNvPr>
@@ -13002,7 +13180,7 @@
           <p:cNvPr id="26" name="內容版面配置區 2">
             <a:extLst>
               <a:ext uri="{FF2B5EF4-FFF2-40B4-BE49-F238E27FC236}">
-                <a16:creationId xmlns="" xmlns:a16="http://schemas.microsoft.com/office/drawing/2014/main" id="{DB7FC4C6-C26F-214E-B2D6-C9ED5E2BD195}"/>
+                <a16:creationId xmlns:a16="http://schemas.microsoft.com/office/drawing/2014/main" xmlns="" id="{DB7FC4C6-C26F-214E-B2D6-C9ED5E2BD195}"/>
               </a:ext>
             </a:extLst>
           </p:cNvPr>
@@ -13094,7 +13272,7 @@
           <p:cNvPr id="27" name="內容版面配置區 2">
             <a:extLst>
               <a:ext uri="{FF2B5EF4-FFF2-40B4-BE49-F238E27FC236}">
-                <a16:creationId xmlns="" xmlns:a16="http://schemas.microsoft.com/office/drawing/2014/main" id="{DB7FC4C6-C26F-214E-B2D6-C9ED5E2BD195}"/>
+                <a16:creationId xmlns:a16="http://schemas.microsoft.com/office/drawing/2014/main" xmlns="" id="{DB7FC4C6-C26F-214E-B2D6-C9ED5E2BD195}"/>
               </a:ext>
             </a:extLst>
           </p:cNvPr>
@@ -13186,7 +13364,7 @@
           <p:cNvPr id="28" name="內容版面配置區 2">
             <a:extLst>
               <a:ext uri="{FF2B5EF4-FFF2-40B4-BE49-F238E27FC236}">
-                <a16:creationId xmlns="" xmlns:a16="http://schemas.microsoft.com/office/drawing/2014/main" id="{DB7FC4C6-C26F-214E-B2D6-C9ED5E2BD195}"/>
+                <a16:creationId xmlns:a16="http://schemas.microsoft.com/office/drawing/2014/main" xmlns="" id="{DB7FC4C6-C26F-214E-B2D6-C9ED5E2BD195}"/>
               </a:ext>
             </a:extLst>
           </p:cNvPr>
@@ -13278,7 +13456,7 @@
           <p:cNvPr id="29" name="內容版面配置區 2">
             <a:extLst>
               <a:ext uri="{FF2B5EF4-FFF2-40B4-BE49-F238E27FC236}">
-                <a16:creationId xmlns="" xmlns:a16="http://schemas.microsoft.com/office/drawing/2014/main" id="{DB7FC4C6-C26F-214E-B2D6-C9ED5E2BD195}"/>
+                <a16:creationId xmlns:a16="http://schemas.microsoft.com/office/drawing/2014/main" xmlns="" id="{DB7FC4C6-C26F-214E-B2D6-C9ED5E2BD195}"/>
               </a:ext>
             </a:extLst>
           </p:cNvPr>
@@ -13370,7 +13548,7 @@
           <p:cNvPr id="30" name="內容版面配置區 2">
             <a:extLst>
               <a:ext uri="{FF2B5EF4-FFF2-40B4-BE49-F238E27FC236}">
-                <a16:creationId xmlns="" xmlns:a16="http://schemas.microsoft.com/office/drawing/2014/main" id="{DB7FC4C6-C26F-214E-B2D6-C9ED5E2BD195}"/>
+                <a16:creationId xmlns:a16="http://schemas.microsoft.com/office/drawing/2014/main" xmlns="" id="{DB7FC4C6-C26F-214E-B2D6-C9ED5E2BD195}"/>
               </a:ext>
             </a:extLst>
           </p:cNvPr>
@@ -13462,7 +13640,7 @@
           <p:cNvPr id="31" name="內容版面配置區 2">
             <a:extLst>
               <a:ext uri="{FF2B5EF4-FFF2-40B4-BE49-F238E27FC236}">
-                <a16:creationId xmlns="" xmlns:a16="http://schemas.microsoft.com/office/drawing/2014/main" id="{DB7FC4C6-C26F-214E-B2D6-C9ED5E2BD195}"/>
+                <a16:creationId xmlns:a16="http://schemas.microsoft.com/office/drawing/2014/main" xmlns="" id="{DB7FC4C6-C26F-214E-B2D6-C9ED5E2BD195}"/>
               </a:ext>
             </a:extLst>
           </p:cNvPr>
@@ -13627,7 +13805,7 @@
           <a:p>
             <a:fld id="{75F8934F-7F83-1046-9341-02CE27D9104D}" type="datetimeFigureOut">
               <a:rPr kumimoji="1" lang="zh-TW" altLang="en-US" smtClean="0"/>
-              <a:t>2020/2/3</a:t>
+              <a:t>2020/2/6</a:t>
             </a:fld>
             <a:endParaRPr kumimoji="1" lang="zh-TW" altLang="en-US"/>
           </a:p>
@@ -13726,7 +13904,7 @@
           <p:cNvPr id="22" name="文字版面配置區 2">
             <a:extLst>
               <a:ext uri="{FF2B5EF4-FFF2-40B4-BE49-F238E27FC236}">
-                <a16:creationId xmlns="" xmlns:a16="http://schemas.microsoft.com/office/drawing/2014/main" id="{1D19DA3B-2013-E14B-A941-CC519B76AD6F}"/>
+                <a16:creationId xmlns:a16="http://schemas.microsoft.com/office/drawing/2014/main" xmlns="" id="{1D19DA3B-2013-E14B-A941-CC519B76AD6F}"/>
               </a:ext>
             </a:extLst>
           </p:cNvPr>
@@ -14131,7 +14309,7 @@
           <p:cNvPr id="28" name="文字版面配置區 2">
             <a:extLst>
               <a:ext uri="{FF2B5EF4-FFF2-40B4-BE49-F238E27FC236}">
-                <a16:creationId xmlns="" xmlns:a16="http://schemas.microsoft.com/office/drawing/2014/main" id="{1D19DA3B-2013-E14B-A941-CC519B76AD6F}"/>
+                <a16:creationId xmlns:a16="http://schemas.microsoft.com/office/drawing/2014/main" xmlns="" id="{1D19DA3B-2013-E14B-A941-CC519B76AD6F}"/>
               </a:ext>
             </a:extLst>
           </p:cNvPr>
@@ -14256,7 +14434,7 @@
           <p:cNvPr id="29" name="文字版面配置區 2">
             <a:extLst>
               <a:ext uri="{FF2B5EF4-FFF2-40B4-BE49-F238E27FC236}">
-                <a16:creationId xmlns="" xmlns:a16="http://schemas.microsoft.com/office/drawing/2014/main" id="{1D19DA3B-2013-E14B-A941-CC519B76AD6F}"/>
+                <a16:creationId xmlns:a16="http://schemas.microsoft.com/office/drawing/2014/main" xmlns="" id="{1D19DA3B-2013-E14B-A941-CC519B76AD6F}"/>
               </a:ext>
             </a:extLst>
           </p:cNvPr>
@@ -14381,7 +14559,7 @@
           <p:cNvPr id="30" name="文字版面配置區 2">
             <a:extLst>
               <a:ext uri="{FF2B5EF4-FFF2-40B4-BE49-F238E27FC236}">
-                <a16:creationId xmlns="" xmlns:a16="http://schemas.microsoft.com/office/drawing/2014/main" id="{1D19DA3B-2013-E14B-A941-CC519B76AD6F}"/>
+                <a16:creationId xmlns:a16="http://schemas.microsoft.com/office/drawing/2014/main" xmlns="" id="{1D19DA3B-2013-E14B-A941-CC519B76AD6F}"/>
               </a:ext>
             </a:extLst>
           </p:cNvPr>
@@ -14506,7 +14684,7 @@
           <p:cNvPr id="31" name="文字版面配置區 2">
             <a:extLst>
               <a:ext uri="{FF2B5EF4-FFF2-40B4-BE49-F238E27FC236}">
-                <a16:creationId xmlns="" xmlns:a16="http://schemas.microsoft.com/office/drawing/2014/main" id="{1D19DA3B-2013-E14B-A941-CC519B76AD6F}"/>
+                <a16:creationId xmlns:a16="http://schemas.microsoft.com/office/drawing/2014/main" xmlns="" id="{1D19DA3B-2013-E14B-A941-CC519B76AD6F}"/>
               </a:ext>
             </a:extLst>
           </p:cNvPr>
@@ -14631,7 +14809,7 @@
           <p:cNvPr id="32" name="圖片 31">
             <a:extLst>
               <a:ext uri="{FF2B5EF4-FFF2-40B4-BE49-F238E27FC236}">
-                <a16:creationId xmlns="" xmlns:a16="http://schemas.microsoft.com/office/drawing/2014/main" id="{5E0EAD78-AEC6-AB45-A710-DD47E43CBB16}"/>
+                <a16:creationId xmlns:a16="http://schemas.microsoft.com/office/drawing/2014/main" xmlns="" id="{5E0EAD78-AEC6-AB45-A710-DD47E43CBB16}"/>
               </a:ext>
             </a:extLst>
           </p:cNvPr>
@@ -14709,7 +14887,7 @@
           <a:p>
             <a:fld id="{75F8934F-7F83-1046-9341-02CE27D9104D}" type="datetimeFigureOut">
               <a:rPr kumimoji="1" lang="zh-TW" altLang="en-US" smtClean="0"/>
-              <a:t>2020/2/3</a:t>
+              <a:t>2020/2/6</a:t>
             </a:fld>
             <a:endParaRPr kumimoji="1" lang="zh-TW" altLang="en-US"/>
           </a:p>
@@ -14762,7 +14940,7 @@
           <p:cNvPr id="6" name="標題 1">
             <a:extLst>
               <a:ext uri="{FF2B5EF4-FFF2-40B4-BE49-F238E27FC236}">
-                <a16:creationId xmlns="" xmlns:a16="http://schemas.microsoft.com/office/drawing/2014/main" id="{AA60FC08-DB42-1443-B1D9-594B0DFFD819}"/>
+                <a16:creationId xmlns:a16="http://schemas.microsoft.com/office/drawing/2014/main" xmlns="" id="{AA60FC08-DB42-1443-B1D9-594B0DFFD819}"/>
               </a:ext>
             </a:extLst>
           </p:cNvPr>
@@ -14944,7 +15122,7 @@
           <p:cNvPr id="29" name="圖片 28">
             <a:extLst>
               <a:ext uri="{FF2B5EF4-FFF2-40B4-BE49-F238E27FC236}">
-                <a16:creationId xmlns="" xmlns:a16="http://schemas.microsoft.com/office/drawing/2014/main" id="{5E0EAD78-AEC6-AB45-A710-DD47E43CBB16}"/>
+                <a16:creationId xmlns:a16="http://schemas.microsoft.com/office/drawing/2014/main" xmlns="" id="{5E0EAD78-AEC6-AB45-A710-DD47E43CBB16}"/>
               </a:ext>
             </a:extLst>
           </p:cNvPr>
@@ -15015,7 +15193,7 @@
           <p:cNvPr id="2" name="標題版面配置區 1">
             <a:extLst>
               <a:ext uri="{FF2B5EF4-FFF2-40B4-BE49-F238E27FC236}">
-                <a16:creationId xmlns="" xmlns:a16="http://schemas.microsoft.com/office/drawing/2014/main" id="{94C8FF7A-2620-884D-9FB3-5AB36BFB548D}"/>
+                <a16:creationId xmlns:a16="http://schemas.microsoft.com/office/drawing/2014/main" xmlns="" id="{94C8FF7A-2620-884D-9FB3-5AB36BFB548D}"/>
               </a:ext>
             </a:extLst>
           </p:cNvPr>
@@ -15053,7 +15231,7 @@
           <p:cNvPr id="3" name="文字版面配置區 2">
             <a:extLst>
               <a:ext uri="{FF2B5EF4-FFF2-40B4-BE49-F238E27FC236}">
-                <a16:creationId xmlns="" xmlns:a16="http://schemas.microsoft.com/office/drawing/2014/main" id="{53B0CFF8-A290-1148-B62C-B24910D4324A}"/>
+                <a16:creationId xmlns:a16="http://schemas.microsoft.com/office/drawing/2014/main" xmlns="" id="{53B0CFF8-A290-1148-B62C-B24910D4324A}"/>
               </a:ext>
             </a:extLst>
           </p:cNvPr>
@@ -15120,7 +15298,7 @@
           <p:cNvPr id="4" name="日期版面配置區 3">
             <a:extLst>
               <a:ext uri="{FF2B5EF4-FFF2-40B4-BE49-F238E27FC236}">
-                <a16:creationId xmlns="" xmlns:a16="http://schemas.microsoft.com/office/drawing/2014/main" id="{6A059F25-1F05-934B-A3C3-A243C45024BD}"/>
+                <a16:creationId xmlns:a16="http://schemas.microsoft.com/office/drawing/2014/main" xmlns="" id="{6A059F25-1F05-934B-A3C3-A243C45024BD}"/>
               </a:ext>
             </a:extLst>
           </p:cNvPr>
@@ -15156,7 +15334,7 @@
           <a:p>
             <a:fld id="{75F8934F-7F83-1046-9341-02CE27D9104D}" type="datetimeFigureOut">
               <a:rPr kumimoji="1" lang="zh-TW" altLang="en-US" smtClean="0"/>
-              <a:t>2020/2/3</a:t>
+              <a:t>2020/2/6</a:t>
             </a:fld>
             <a:endParaRPr kumimoji="1" lang="zh-TW" altLang="en-US"/>
           </a:p>
@@ -15167,7 +15345,7 @@
           <p:cNvPr id="5" name="頁尾版面配置區 4">
             <a:extLst>
               <a:ext uri="{FF2B5EF4-FFF2-40B4-BE49-F238E27FC236}">
-                <a16:creationId xmlns="" xmlns:a16="http://schemas.microsoft.com/office/drawing/2014/main" id="{96F5D358-7817-1940-9383-7E6BF6DB94C4}"/>
+                <a16:creationId xmlns:a16="http://schemas.microsoft.com/office/drawing/2014/main" xmlns="" id="{96F5D358-7817-1940-9383-7E6BF6DB94C4}"/>
               </a:ext>
             </a:extLst>
           </p:cNvPr>
@@ -15210,7 +15388,7 @@
           <p:cNvPr id="6" name="投影片編號版面配置區 5">
             <a:extLst>
               <a:ext uri="{FF2B5EF4-FFF2-40B4-BE49-F238E27FC236}">
-                <a16:creationId xmlns="" xmlns:a16="http://schemas.microsoft.com/office/drawing/2014/main" id="{42AF2059-64BB-A041-B166-4ABAE4368C85}"/>
+                <a16:creationId xmlns:a16="http://schemas.microsoft.com/office/drawing/2014/main" xmlns="" id="{42AF2059-64BB-A041-B166-4ABAE4368C85}"/>
               </a:ext>
             </a:extLst>
           </p:cNvPr>
@@ -15592,7 +15770,7 @@
           <p:cNvPr id="2" name="標題 1">
             <a:extLst>
               <a:ext uri="{FF2B5EF4-FFF2-40B4-BE49-F238E27FC236}">
-                <a16:creationId xmlns="" xmlns:a16="http://schemas.microsoft.com/office/drawing/2014/main" id="{21D1F93B-0172-6544-80FA-8E4F07C59D60}"/>
+                <a16:creationId xmlns:a16="http://schemas.microsoft.com/office/drawing/2014/main" xmlns="" id="{21D1F93B-0172-6544-80FA-8E4F07C59D60}"/>
               </a:ext>
             </a:extLst>
           </p:cNvPr>
@@ -15617,7 +15795,7 @@
           <p:cNvPr id="3" name="副標題 2">
             <a:extLst>
               <a:ext uri="{FF2B5EF4-FFF2-40B4-BE49-F238E27FC236}">
-                <a16:creationId xmlns="" xmlns:a16="http://schemas.microsoft.com/office/drawing/2014/main" id="{EF107643-09F5-CF46-B8BB-0DC1151E4CD0}"/>
+                <a16:creationId xmlns:a16="http://schemas.microsoft.com/office/drawing/2014/main" xmlns="" id="{EF107643-09F5-CF46-B8BB-0DC1151E4CD0}"/>
               </a:ext>
             </a:extLst>
           </p:cNvPr>
@@ -15642,7 +15820,7 @@
           <p:cNvPr id="6" name="文字版面配置區 5">
             <a:extLst>
               <a:ext uri="{FF2B5EF4-FFF2-40B4-BE49-F238E27FC236}">
-                <a16:creationId xmlns="" xmlns:a16="http://schemas.microsoft.com/office/drawing/2014/main" id="{EC4C7251-0CC8-BC4A-A90C-9020762D8B31}"/>
+                <a16:creationId xmlns:a16="http://schemas.microsoft.com/office/drawing/2014/main" xmlns="" id="{EC4C7251-0CC8-BC4A-A90C-9020762D8B31}"/>
               </a:ext>
             </a:extLst>
           </p:cNvPr>
@@ -15672,6 +15850,445 @@
     <p:extLst>
       <p:ext uri="{BB962C8B-B14F-4D97-AF65-F5344CB8AC3E}">
         <p14:creationId xmlns:p14="http://schemas.microsoft.com/office/powerpoint/2010/main" val="3897332384"/>
+      </p:ext>
+    </p:extLst>
+  </p:cSld>
+  <p:clrMapOvr>
+    <a:masterClrMapping/>
+  </p:clrMapOvr>
+</p:sld>
+</file>
+
+<file path=ppt/slides/slide10.xml><?xml version="1.0" encoding="utf-8"?>
+<p:sld xmlns:a="http://schemas.openxmlformats.org/drawingml/2006/main" xmlns:r="http://schemas.openxmlformats.org/officeDocument/2006/relationships" xmlns:p="http://schemas.openxmlformats.org/presentationml/2006/main">
+  <p:cSld>
+    <p:spTree>
+      <p:nvGrpSpPr>
+        <p:cNvPr id="1" name=""/>
+        <p:cNvGrpSpPr/>
+        <p:nvPr/>
+      </p:nvGrpSpPr>
+      <p:grpSpPr>
+        <a:xfrm>
+          <a:off x="0" y="0"/>
+          <a:ext cx="0" cy="0"/>
+          <a:chOff x="0" y="0"/>
+          <a:chExt cx="0" cy="0"/>
+        </a:xfrm>
+      </p:grpSpPr>
+      <p:sp>
+        <p:nvSpPr>
+          <p:cNvPr id="2" name="標題 1"/>
+          <p:cNvSpPr>
+            <a:spLocks noGrp="1"/>
+          </p:cNvSpPr>
+          <p:nvPr>
+            <p:ph type="title"/>
+          </p:nvPr>
+        </p:nvSpPr>
+        <p:spPr/>
+        <p:txBody>
+          <a:bodyPr/>
+          <a:lstStyle/>
+          <a:p>
+            <a:endParaRPr lang="zh-TW" altLang="en-US"/>
+          </a:p>
+        </p:txBody>
+      </p:sp>
+      <p:sp>
+        <p:nvSpPr>
+          <p:cNvPr id="3" name="內容版面配置區 2"/>
+          <p:cNvSpPr>
+            <a:spLocks noGrp="1"/>
+          </p:cNvSpPr>
+          <p:nvPr>
+            <p:ph sz="quarter" idx="13"/>
+          </p:nvPr>
+        </p:nvSpPr>
+        <p:spPr/>
+        <p:txBody>
+          <a:bodyPr/>
+          <a:lstStyle/>
+          <a:p>
+            <a:endParaRPr lang="zh-TW" altLang="en-US"/>
+          </a:p>
+        </p:txBody>
+      </p:sp>
+      <p:sp>
+        <p:nvSpPr>
+          <p:cNvPr id="4" name="內容版面配置區 3"/>
+          <p:cNvSpPr>
+            <a:spLocks noGrp="1"/>
+          </p:cNvSpPr>
+          <p:nvPr>
+            <p:ph sz="half" idx="1"/>
+          </p:nvPr>
+        </p:nvSpPr>
+        <p:spPr/>
+        <p:txBody>
+          <a:bodyPr/>
+          <a:lstStyle/>
+          <a:p>
+            <a:endParaRPr lang="zh-TW" altLang="en-US" dirty="0"/>
+          </a:p>
+        </p:txBody>
+      </p:sp>
+      <p:pic>
+        <p:nvPicPr>
+          <p:cNvPr id="1026" name="Picture 2"/>
+          <p:cNvPicPr>
+            <a:picLocks noChangeAspect="1" noChangeArrowheads="1"/>
+          </p:cNvPicPr>
+          <p:nvPr/>
+        </p:nvPicPr>
+        <p:blipFill>
+          <a:blip r:embed="rId2">
+            <a:extLst>
+              <a:ext uri="{28A0092B-C50C-407E-A947-70E740481C1C}">
+                <a14:useLocalDpi xmlns:a14="http://schemas.microsoft.com/office/drawing/2010/main" val="0"/>
+              </a:ext>
+            </a:extLst>
+          </a:blip>
+          <a:srcRect/>
+          <a:stretch>
+            <a:fillRect/>
+          </a:stretch>
+        </p:blipFill>
+        <p:spPr bwMode="auto">
+          <a:xfrm>
+            <a:off x="926833" y="1930399"/>
+            <a:ext cx="6276975" cy="4467225"/>
+          </a:xfrm>
+          <a:prstGeom prst="rect">
+            <a:avLst/>
+          </a:prstGeom>
+          <a:noFill/>
+          <a:ln>
+            <a:noFill/>
+          </a:ln>
+          <a:extLst>
+            <a:ext uri="{909E8E84-426E-40DD-AFC4-6F175D3DCCD1}">
+              <a14:hiddenFill xmlns:a14="http://schemas.microsoft.com/office/drawing/2010/main">
+                <a:solidFill>
+                  <a:schemeClr val="accent1"/>
+                </a:solidFill>
+              </a14:hiddenFill>
+            </a:ext>
+            <a:ext uri="{91240B29-F687-4F45-9708-019B960494DF}">
+              <a14:hiddenLine xmlns:a14="http://schemas.microsoft.com/office/drawing/2010/main" w="9525">
+                <a:solidFill>
+                  <a:schemeClr val="tx1"/>
+                </a:solidFill>
+                <a:miter lim="800000"/>
+                <a:headEnd/>
+                <a:tailEnd/>
+              </a14:hiddenLine>
+            </a:ext>
+          </a:extLst>
+        </p:spPr>
+      </p:pic>
+    </p:spTree>
+    <p:extLst>
+      <p:ext uri="{BB962C8B-B14F-4D97-AF65-F5344CB8AC3E}">
+        <p14:creationId xmlns:p14="http://schemas.microsoft.com/office/powerpoint/2010/main" val="2227107922"/>
+      </p:ext>
+    </p:extLst>
+  </p:cSld>
+  <p:clrMapOvr>
+    <a:masterClrMapping/>
+  </p:clrMapOvr>
+</p:sld>
+</file>
+
+<file path=ppt/slides/slide11.xml><?xml version="1.0" encoding="utf-8"?>
+<p:sld xmlns:a="http://schemas.openxmlformats.org/drawingml/2006/main" xmlns:r="http://schemas.openxmlformats.org/officeDocument/2006/relationships" xmlns:p="http://schemas.openxmlformats.org/presentationml/2006/main">
+  <p:cSld>
+    <p:spTree>
+      <p:nvGrpSpPr>
+        <p:cNvPr id="1" name=""/>
+        <p:cNvGrpSpPr/>
+        <p:nvPr/>
+      </p:nvGrpSpPr>
+      <p:grpSpPr>
+        <a:xfrm>
+          <a:off x="0" y="0"/>
+          <a:ext cx="0" cy="0"/>
+          <a:chOff x="0" y="0"/>
+          <a:chExt cx="0" cy="0"/>
+        </a:xfrm>
+      </p:grpSpPr>
+      <p:sp>
+        <p:nvSpPr>
+          <p:cNvPr id="2" name="標題 1"/>
+          <p:cNvSpPr>
+            <a:spLocks noGrp="1"/>
+          </p:cNvSpPr>
+          <p:nvPr>
+            <p:ph type="title"/>
+          </p:nvPr>
+        </p:nvSpPr>
+        <p:spPr/>
+        <p:txBody>
+          <a:bodyPr/>
+          <a:lstStyle/>
+          <a:p>
+            <a:r>
+              <a:rPr lang="zh-CN" altLang="en-US" dirty="0"/>
+              <a:t>生产环境如何使用 </a:t>
+            </a:r>
+            <a:r>
+              <a:rPr lang="en-US" altLang="zh-CN" dirty="0" err="1" smtClean="0"/>
+              <a:t>gRPC</a:t>
+            </a:r>
+            <a:endParaRPr lang="zh-TW" altLang="en-US" dirty="0"/>
+          </a:p>
+        </p:txBody>
+      </p:sp>
+      <p:sp>
+        <p:nvSpPr>
+          <p:cNvPr id="3" name="內容版面配置區 2"/>
+          <p:cNvSpPr>
+            <a:spLocks noGrp="1"/>
+          </p:cNvSpPr>
+          <p:nvPr>
+            <p:ph sz="quarter" idx="13"/>
+          </p:nvPr>
+        </p:nvSpPr>
+        <p:spPr/>
+        <p:txBody>
+          <a:bodyPr/>
+          <a:lstStyle/>
+          <a:p>
+            <a:endParaRPr lang="zh-TW" altLang="en-US"/>
+          </a:p>
+        </p:txBody>
+      </p:sp>
+      <p:sp>
+        <p:nvSpPr>
+          <p:cNvPr id="4" name="內容版面配置區 3"/>
+          <p:cNvSpPr>
+            <a:spLocks noGrp="1"/>
+          </p:cNvSpPr>
+          <p:nvPr>
+            <p:ph sz="half" idx="1"/>
+          </p:nvPr>
+        </p:nvSpPr>
+        <p:spPr/>
+        <p:txBody>
+          <a:bodyPr/>
+          <a:lstStyle/>
+          <a:p>
+            <a:r>
+              <a:rPr lang="en-US" altLang="zh-TW" dirty="0"/>
+              <a:t>HTTP/2 </a:t>
+            </a:r>
+            <a:r>
+              <a:rPr lang="en-US" altLang="zh-TW" dirty="0" err="1"/>
+              <a:t>protobuf</a:t>
+            </a:r>
+            <a:r>
+              <a:rPr lang="en-US" altLang="zh-TW" dirty="0"/>
+              <a:t> serialization (pluggable) </a:t>
+            </a:r>
+            <a:r>
+              <a:rPr lang="zh-TW" altLang="en-US" dirty="0"/>
+              <a:t>客户端会和 </a:t>
+            </a:r>
+            <a:r>
+              <a:rPr lang="en-US" altLang="zh-TW" dirty="0" err="1"/>
+              <a:t>grpc</a:t>
+            </a:r>
+            <a:r>
+              <a:rPr lang="en-US" altLang="zh-TW" dirty="0"/>
+              <a:t> </a:t>
+            </a:r>
+            <a:r>
+              <a:rPr lang="zh-TW" altLang="en-US" dirty="0"/>
+              <a:t>服务器打开一个长连接 对于每一个 </a:t>
+            </a:r>
+            <a:r>
+              <a:rPr lang="en-US" altLang="zh-TW" dirty="0"/>
+              <a:t>RPC </a:t>
+            </a:r>
+            <a:r>
+              <a:rPr lang="zh-TW" altLang="en-US" dirty="0"/>
+              <a:t>调用都将是一个新的 </a:t>
+            </a:r>
+            <a:r>
+              <a:rPr lang="en-US" altLang="zh-TW" dirty="0"/>
+              <a:t>HTTP/2 stream</a:t>
+            </a:r>
+          </a:p>
+          <a:p>
+            <a:r>
+              <a:rPr lang="zh-TW" altLang="en-US" dirty="0"/>
+              <a:t>允许模拟飞行模式的 </a:t>
+            </a:r>
+            <a:r>
+              <a:rPr lang="en-US" altLang="zh-TW" dirty="0"/>
+              <a:t>RPC </a:t>
+            </a:r>
+            <a:r>
+              <a:rPr lang="zh-TW" altLang="en-US" dirty="0"/>
+              <a:t>调用</a:t>
+            </a:r>
+          </a:p>
+          <a:p>
+            <a:r>
+              <a:rPr lang="zh-TW" altLang="en-US" dirty="0"/>
+              <a:t>允许客户端 和 服务端 </a:t>
+            </a:r>
+            <a:r>
+              <a:rPr lang="en-US" altLang="zh-TW" dirty="0" smtClean="0"/>
+              <a:t>Streaming</a:t>
+            </a:r>
+            <a:endParaRPr lang="en-US" altLang="zh-TW" dirty="0"/>
+          </a:p>
+        </p:txBody>
+      </p:sp>
+    </p:spTree>
+    <p:extLst>
+      <p:ext uri="{BB962C8B-B14F-4D97-AF65-F5344CB8AC3E}">
+        <p14:creationId xmlns:p14="http://schemas.microsoft.com/office/powerpoint/2010/main" val="1759547864"/>
+      </p:ext>
+    </p:extLst>
+  </p:cSld>
+  <p:clrMapOvr>
+    <a:masterClrMapping/>
+  </p:clrMapOvr>
+</p:sld>
+</file>
+
+<file path=ppt/slides/slide12.xml><?xml version="1.0" encoding="utf-8"?>
+<p:sld xmlns:a="http://schemas.openxmlformats.org/drawingml/2006/main" xmlns:r="http://schemas.openxmlformats.org/officeDocument/2006/relationships" xmlns:p="http://schemas.openxmlformats.org/presentationml/2006/main">
+  <p:cSld>
+    <p:spTree>
+      <p:nvGrpSpPr>
+        <p:cNvPr id="1" name=""/>
+        <p:cNvGrpSpPr/>
+        <p:nvPr/>
+      </p:nvGrpSpPr>
+      <p:grpSpPr>
+        <a:xfrm>
+          <a:off x="0" y="0"/>
+          <a:ext cx="0" cy="0"/>
+          <a:chOff x="0" y="0"/>
+          <a:chExt cx="0" cy="0"/>
+        </a:xfrm>
+      </p:grpSpPr>
+      <p:sp>
+        <p:nvSpPr>
+          <p:cNvPr id="4" name="標題 3"/>
+          <p:cNvSpPr>
+            <a:spLocks noGrp="1"/>
+          </p:cNvSpPr>
+          <p:nvPr>
+            <p:ph type="ctrTitle"/>
+          </p:nvPr>
+        </p:nvSpPr>
+        <p:spPr/>
+        <p:txBody>
+          <a:bodyPr>
+            <a:normAutofit/>
+          </a:bodyPr>
+          <a:lstStyle/>
+          <a:p>
+            <a:r>
+              <a:rPr lang="en-US" altLang="zh-TW" sz="6600" dirty="0">
+                <a:latin typeface="Tw Cen MT" pitchFamily="34" charset="0"/>
+              </a:rPr>
+              <a:t>Thank You</a:t>
+            </a:r>
+            <a:endParaRPr lang="zh-TW" altLang="en-US" sz="6600" dirty="0">
+              <a:latin typeface="Tw Cen MT" pitchFamily="34" charset="0"/>
+            </a:endParaRPr>
+          </a:p>
+        </p:txBody>
+      </p:sp>
+      <p:sp>
+        <p:nvSpPr>
+          <p:cNvPr id="6" name="副標題 5"/>
+          <p:cNvSpPr>
+            <a:spLocks noGrp="1"/>
+          </p:cNvSpPr>
+          <p:nvPr>
+            <p:ph type="subTitle" idx="1"/>
+          </p:nvPr>
+        </p:nvSpPr>
+        <p:spPr/>
+        <p:txBody>
+          <a:bodyPr/>
+          <a:lstStyle/>
+          <a:p>
+            <a:r>
+              <a:rPr lang="en-US" altLang="zh-TW" sz="2800" b="0" dirty="0" smtClean="0">
+                <a:latin typeface="Tw Cen MT" pitchFamily="34" charset="0"/>
+              </a:rPr>
+              <a:t>Q</a:t>
+            </a:r>
+            <a:r>
+              <a:rPr lang="zh-TW" altLang="en-US" sz="2800" b="0" dirty="0" smtClean="0">
+                <a:latin typeface="Tw Cen MT" pitchFamily="34" charset="0"/>
+              </a:rPr>
+              <a:t> </a:t>
+            </a:r>
+            <a:r>
+              <a:rPr lang="en-US" altLang="zh-TW" sz="2800" b="0" dirty="0">
+                <a:latin typeface="Tw Cen MT" pitchFamily="34" charset="0"/>
+              </a:rPr>
+              <a:t>&amp;</a:t>
+            </a:r>
+            <a:r>
+              <a:rPr lang="zh-TW" altLang="en-US" sz="2800" b="0" dirty="0">
+                <a:latin typeface="Tw Cen MT" pitchFamily="34" charset="0"/>
+              </a:rPr>
+              <a:t> </a:t>
+            </a:r>
+            <a:r>
+              <a:rPr lang="en-US" altLang="zh-TW" sz="2800" b="0" dirty="0">
+                <a:latin typeface="Tw Cen MT" pitchFamily="34" charset="0"/>
+              </a:rPr>
+              <a:t>A</a:t>
+            </a:r>
+            <a:endParaRPr lang="zh-TW" altLang="en-US" b="0" dirty="0">
+              <a:latin typeface="Tw Cen MT" pitchFamily="34" charset="0"/>
+            </a:endParaRPr>
+          </a:p>
+        </p:txBody>
+      </p:sp>
+      <p:sp>
+        <p:nvSpPr>
+          <p:cNvPr id="7" name="文字版面配置區 6"/>
+          <p:cNvSpPr>
+            <a:spLocks noGrp="1"/>
+          </p:cNvSpPr>
+          <p:nvPr>
+            <p:ph type="body" sz="quarter" idx="13"/>
+          </p:nvPr>
+        </p:nvSpPr>
+        <p:spPr/>
+        <p:txBody>
+          <a:bodyPr>
+            <a:normAutofit lnSpcReduction="10000"/>
+          </a:bodyPr>
+          <a:lstStyle/>
+          <a:p>
+            <a:r>
+              <a:rPr lang="en-US" altLang="zh-TW" dirty="0"/>
+              <a:t>By </a:t>
+            </a:r>
+            <a:r>
+              <a:rPr lang="en-US" altLang="zh-TW" dirty="0" smtClean="0"/>
+              <a:t>Beer</a:t>
+            </a:r>
+            <a:endParaRPr lang="zh-TW" altLang="en-US" dirty="0"/>
+          </a:p>
+        </p:txBody>
+      </p:sp>
+    </p:spTree>
+    <p:extLst>
+      <p:ext uri="{BB962C8B-B14F-4D97-AF65-F5344CB8AC3E}">
+        <p14:creationId xmlns:p14="http://schemas.microsoft.com/office/powerpoint/2010/main" val="3310412145"/>
       </p:ext>
     </p:extLst>
   </p:cSld>
@@ -15916,6 +16533,9 @@
             </a:r>
           </a:p>
           <a:p>
+            <a:endParaRPr lang="en-US" altLang="zh-CN" dirty="0" smtClean="0"/>
+          </a:p>
+          <a:p>
             <a:endParaRPr lang="zh-CN" altLang="en-US" b="0" dirty="0"/>
           </a:p>
         </p:txBody>
@@ -15965,198 +16585,249 @@
           <a:bodyPr/>
           <a:lstStyle/>
           <a:p>
+            <a:endParaRPr lang="zh-TW" altLang="en-US"/>
+          </a:p>
+        </p:txBody>
+      </p:sp>
+      <p:sp>
+        <p:nvSpPr>
+          <p:cNvPr id="3" name="內容版面配置區 2"/>
+          <p:cNvSpPr>
+            <a:spLocks noGrp="1"/>
+          </p:cNvSpPr>
+          <p:nvPr>
+            <p:ph sz="quarter" idx="13"/>
+          </p:nvPr>
+        </p:nvSpPr>
+        <p:spPr/>
+        <p:txBody>
+          <a:bodyPr/>
+          <a:lstStyle/>
+          <a:p>
+            <a:endParaRPr lang="zh-TW" altLang="en-US"/>
+          </a:p>
+        </p:txBody>
+      </p:sp>
+      <p:sp>
+        <p:nvSpPr>
+          <p:cNvPr id="4" name="內容版面配置區 3"/>
+          <p:cNvSpPr>
+            <a:spLocks noGrp="1"/>
+          </p:cNvSpPr>
+          <p:nvPr>
+            <p:ph sz="half" idx="1"/>
+          </p:nvPr>
+        </p:nvSpPr>
+        <p:spPr/>
+        <p:txBody>
+          <a:bodyPr/>
+          <a:lstStyle/>
+          <a:p>
+            <a:pPr marL="514350" indent="-514350">
+              <a:buAutoNum type="arabicPeriod"/>
+            </a:pPr>
+            <a:r>
+              <a:rPr lang="en-US" altLang="zh-TW" dirty="0" smtClean="0"/>
+              <a:t>RESTful API </a:t>
+            </a:r>
             <a:r>
               <a:rPr lang="zh-CN" altLang="en-US" dirty="0" smtClean="0"/>
-              <a:t>為什麼</a:t>
-            </a:r>
+              <a:t>（</a:t>
+            </a:r>
+            <a:r>
+              <a:rPr lang="en-US" altLang="zh-TW" b="0" dirty="0"/>
+              <a:t> </a:t>
+            </a:r>
+            <a:r>
+              <a:rPr lang="en-US" altLang="zh-TW" b="0" dirty="0" err="1"/>
+              <a:t>REpresentational</a:t>
+            </a:r>
+            <a:r>
+              <a:rPr lang="en-US" altLang="zh-TW" b="0" dirty="0"/>
+              <a:t> State Transfer </a:t>
+            </a:r>
+            <a:r>
+              <a:rPr lang="en-US" altLang="zh-TW" b="0" dirty="0" smtClean="0"/>
+              <a:t>API</a:t>
+            </a:r>
+            <a:r>
+              <a:rPr lang="zh-CN" altLang="en-US" dirty="0" smtClean="0"/>
+              <a:t>）</a:t>
+            </a:r>
+            <a:endParaRPr lang="en-US" altLang="zh-TW" dirty="0" smtClean="0"/>
+          </a:p>
+          <a:p>
+            <a:pPr marL="514350" indent="-514350">
+              <a:buAutoNum type="arabicPeriod"/>
+            </a:pPr>
+            <a:r>
+              <a:rPr lang="en-US" altLang="zh-TW" dirty="0" smtClean="0"/>
+              <a:t>RPC</a:t>
+            </a:r>
+            <a:r>
+              <a:rPr lang="zh-CN" altLang="en-US" dirty="0" smtClean="0"/>
+              <a:t>（</a:t>
+            </a:r>
+            <a:r>
+              <a:rPr lang="en-US" altLang="zh-TW" b="0" dirty="0"/>
+              <a:t> </a:t>
+            </a:r>
+            <a:r>
+              <a:rPr lang="en-US" altLang="zh-TW" b="0" dirty="0" smtClean="0"/>
+              <a:t>Remote Procedure Call </a:t>
+            </a:r>
+            <a:r>
+              <a:rPr lang="zh-CN" altLang="en-US" dirty="0" smtClean="0"/>
+              <a:t>）</a:t>
+            </a:r>
+            <a:endParaRPr lang="en-US" altLang="zh-CN" dirty="0" smtClean="0"/>
+          </a:p>
+          <a:p>
+            <a:pPr marL="1200150" lvl="1" indent="-514350">
+              <a:buAutoNum type="arabicPeriod"/>
+            </a:pPr>
+            <a:r>
+              <a:rPr lang="zh-CN" altLang="en-US" dirty="0" smtClean="0"/>
+              <a:t>是 </a:t>
+            </a:r>
+            <a:r>
+              <a:rPr lang="en-US" altLang="zh-TW" dirty="0"/>
+              <a:t>SUN</a:t>
+            </a:r>
+            <a:r>
+              <a:rPr lang="en-US" altLang="zh-CN" dirty="0" smtClean="0"/>
+              <a:t> </a:t>
+            </a:r>
+            <a:r>
+              <a:rPr lang="zh-CN" altLang="en-US" dirty="0" smtClean="0"/>
+              <a:t>內部使用的通訊方式</a:t>
+            </a:r>
+            <a:endParaRPr lang="en-US" altLang="zh-CN" dirty="0" smtClean="0"/>
+          </a:p>
+          <a:p>
+            <a:pPr marL="1200150" lvl="1" indent="-514350">
+              <a:buAutoNum type="arabicPeriod"/>
+            </a:pPr>
+            <a:r>
+              <a:rPr lang="zh-CN" altLang="en-US" dirty="0" smtClean="0"/>
+              <a:t>於</a:t>
+            </a:r>
+            <a:endParaRPr lang="en-US" altLang="zh-CN" dirty="0" smtClean="0"/>
+          </a:p>
+          <a:p>
+            <a:pPr marL="1200150" lvl="1" indent="-514350">
+              <a:buAutoNum type="arabicPeriod"/>
+            </a:pPr>
             <a:r>
               <a:rPr lang="zh-TW" altLang="en-US" dirty="0" smtClean="0"/>
-              <a:t> </a:t>
-            </a:r>
-            <a:r>
-              <a:rPr lang="en-US" altLang="zh-TW" dirty="0"/>
-              <a:t>REST API </a:t>
-            </a:r>
-            <a:r>
-              <a:rPr lang="zh-CN" altLang="en-US" dirty="0"/>
-              <a:t>不好用</a:t>
+              <a:t>協定允許執行於一台電腦的</a:t>
+            </a:r>
+            <a:r>
+              <a:rPr lang="zh-TW" altLang="en-US" dirty="0" smtClean="0">
+                <a:hlinkClick r:id="rId3" tooltip="程式"/>
+              </a:rPr>
+              <a:t>程式</a:t>
             </a:r>
             <a:r>
               <a:rPr lang="zh-TW" altLang="en-US" dirty="0" smtClean="0"/>
-              <a:t>？</a:t>
-            </a:r>
-            <a:endParaRPr lang="zh-TW" altLang="en-US" dirty="0"/>
-          </a:p>
-        </p:txBody>
-      </p:sp>
-      <p:sp>
-        <p:nvSpPr>
-          <p:cNvPr id="3" name="內容版面配置區 2"/>
-          <p:cNvSpPr>
-            <a:spLocks noGrp="1"/>
-          </p:cNvSpPr>
-          <p:nvPr>
-            <p:ph sz="quarter" idx="13"/>
-          </p:nvPr>
-        </p:nvSpPr>
-        <p:spPr/>
-        <p:txBody>
-          <a:bodyPr/>
-          <a:lstStyle/>
-          <a:p>
-            <a:endParaRPr lang="zh-TW" altLang="en-US"/>
-          </a:p>
-        </p:txBody>
-      </p:sp>
-      <p:sp>
-        <p:nvSpPr>
-          <p:cNvPr id="4" name="內容版面配置區 3"/>
-          <p:cNvSpPr>
-            <a:spLocks noGrp="1"/>
-          </p:cNvSpPr>
-          <p:nvPr>
-            <p:ph sz="half" idx="1"/>
-          </p:nvPr>
-        </p:nvSpPr>
-        <p:spPr/>
-        <p:txBody>
-          <a:bodyPr/>
-          <a:lstStyle/>
-          <a:p>
-            <a:pPr marL="457200" indent="-457200">
-              <a:buFont typeface="Arial" panose="020B0604020202020204" pitchFamily="34" charset="0"/>
-              <a:buChar char="•"/>
+              <a:t>呼叫另一個</a:t>
+            </a:r>
+            <a:r>
+              <a:rPr lang="zh-TW" altLang="en-US" dirty="0" smtClean="0">
+                <a:hlinkClick r:id="rId4" tooltip="位址空間"/>
+              </a:rPr>
+              <a:t>位址空間</a:t>
+            </a:r>
+            <a:r>
+              <a:rPr lang="zh-TW" altLang="en-US" dirty="0" smtClean="0"/>
+              <a:t>（通常為一個開放網路的一台電腦）的</a:t>
+            </a:r>
+            <a:r>
+              <a:rPr lang="zh-TW" altLang="en-US" dirty="0" smtClean="0">
+                <a:hlinkClick r:id="rId5" tooltip="子程式"/>
+              </a:rPr>
+              <a:t>子程式</a:t>
+            </a:r>
+            <a:endParaRPr lang="en-US" altLang="zh-TW" dirty="0" smtClean="0"/>
+          </a:p>
+          <a:p>
+            <a:pPr marL="514350" indent="-514350">
+              <a:buAutoNum type="arabicPeriod"/>
             </a:pPr>
             <a:r>
+              <a:rPr lang="en-US" altLang="zh-TW" dirty="0" err="1" smtClean="0"/>
+              <a:t>GraphQL</a:t>
+            </a:r>
+            <a:r>
               <a:rPr lang="zh-CN" altLang="en-US" dirty="0" smtClean="0"/>
-              <a:t>實現</a:t>
+              <a:t>（</a:t>
+            </a:r>
+            <a:r>
+              <a:rPr lang="en-US" altLang="zh-TW" b="0" dirty="0"/>
+              <a:t> Graph Query Language </a:t>
+            </a:r>
+            <a:r>
+              <a:rPr lang="zh-CN" altLang="en-US" dirty="0" smtClean="0"/>
+              <a:t>）</a:t>
+            </a:r>
+            <a:endParaRPr lang="en-US" altLang="zh-CN" dirty="0" smtClean="0"/>
+          </a:p>
+          <a:p>
+            <a:pPr marL="1200150" lvl="1" indent="-514350">
+              <a:buAutoNum type="arabicPeriod"/>
+            </a:pPr>
+            <a:r>
+              <a:rPr lang="zh-CN" altLang="en-US" dirty="0" smtClean="0"/>
+              <a:t>是 </a:t>
             </a:r>
             <a:r>
               <a:rPr lang="en-US" altLang="zh-CN" dirty="0" smtClean="0"/>
-              <a:t>Stream</a:t>
+              <a:t>Facebook </a:t>
             </a:r>
             <a:r>
               <a:rPr lang="zh-CN" altLang="en-US" dirty="0" smtClean="0"/>
-              <a:t>太難了</a:t>
+              <a:t>內部使用的通訊方式</a:t>
             </a:r>
             <a:endParaRPr lang="en-US" altLang="zh-CN" dirty="0" smtClean="0"/>
           </a:p>
           <a:p>
-            <a:pPr marL="457200" indent="-457200">
-              <a:buFont typeface="Arial" panose="020B0604020202020204" pitchFamily="34" charset="0"/>
-              <a:buChar char="•"/>
+            <a:pPr marL="1200150" lvl="1" indent="-514350">
+              <a:buAutoNum type="arabicPeriod"/>
             </a:pPr>
             <a:r>
               <a:rPr lang="zh-CN" altLang="en-US" dirty="0" smtClean="0"/>
-              <a:t>雙向的流（</a:t>
-            </a:r>
-            <a:r>
-              <a:rPr lang="en-US" altLang="zh-CN" dirty="0" err="1" smtClean="0"/>
-              <a:t>WebSocket</a:t>
+              <a:t>於 </a:t>
+            </a:r>
+            <a:r>
+              <a:rPr lang="en-US" altLang="zh-CN" dirty="0" smtClean="0"/>
+              <a:t>2015 </a:t>
             </a:r>
             <a:r>
               <a:rPr lang="zh-CN" altLang="en-US" dirty="0" smtClean="0"/>
-              <a:t>）根本不可能</a:t>
+              <a:t>開源</a:t>
             </a:r>
             <a:endParaRPr lang="en-US" altLang="zh-CN" dirty="0" smtClean="0"/>
           </a:p>
           <a:p>
-            <a:pPr marL="457200" indent="-457200">
-              <a:buFont typeface="Arial" panose="020B0604020202020204" pitchFamily="34" charset="0"/>
-              <a:buChar char="•"/>
+            <a:pPr marL="1200150" lvl="1" indent="-514350">
+              <a:buAutoNum type="arabicPeriod"/>
             </a:pPr>
             <a:r>
               <a:rPr lang="zh-CN" altLang="en-US" dirty="0" smtClean="0"/>
-              <a:t>很難對操作建立模型</a:t>
+              <a:t>使用的產品 </a:t>
             </a:r>
             <a:r>
               <a:rPr lang="en-US" altLang="zh-CN" dirty="0" smtClean="0"/>
-              <a:t>(</a:t>
+              <a:t>Twitter </a:t>
             </a:r>
             <a:r>
               <a:rPr lang="zh-CN" altLang="en-US" dirty="0" smtClean="0"/>
-              <a:t>不會有規範的文件</a:t>
+              <a:t>、 </a:t>
             </a:r>
             <a:r>
               <a:rPr lang="en-US" altLang="zh-CN" dirty="0" smtClean="0"/>
-              <a:t>)</a:t>
-            </a:r>
-            <a:endParaRPr lang="en-US" altLang="zh-CN" dirty="0" smtClean="0"/>
-          </a:p>
-          <a:p>
-            <a:pPr marL="457200" indent="-457200">
-              <a:buFont typeface="Arial" panose="020B0604020202020204" pitchFamily="34" charset="0"/>
-              <a:buChar char="•"/>
-            </a:pPr>
-            <a:r>
-              <a:rPr lang="zh-CN" altLang="en-US" dirty="0"/>
-              <a:t>很</a:t>
-            </a:r>
-            <a:r>
-              <a:rPr lang="zh-CN" altLang="en-US" dirty="0" smtClean="0"/>
-              <a:t>難再一個請求中取得多個資源數據</a:t>
-            </a:r>
-            <a:r>
-              <a:rPr lang="en-US" altLang="zh-CN" dirty="0" smtClean="0"/>
-              <a:t>(</a:t>
-            </a:r>
-            <a:r>
-              <a:rPr lang="zh-CN" altLang="en-US" dirty="0" smtClean="0"/>
-              <a:t>從兩個</a:t>
-            </a:r>
-            <a:r>
-              <a:rPr lang="en-US" altLang="zh-CN" dirty="0" smtClean="0"/>
-              <a:t>server</a:t>
-            </a:r>
-            <a:r>
-              <a:rPr lang="zh-CN" altLang="en-US" dirty="0" smtClean="0"/>
-              <a:t>取資料</a:t>
-            </a:r>
-            <a:r>
-              <a:rPr lang="en-US" altLang="zh-CN" dirty="0" smtClean="0"/>
-              <a:t>)</a:t>
-            </a:r>
-          </a:p>
-          <a:p>
-            <a:pPr marL="457200" indent="-457200">
-              <a:buFont typeface="Arial" panose="020B0604020202020204" pitchFamily="34" charset="0"/>
-              <a:buChar char="•"/>
-            </a:pPr>
-            <a:r>
-              <a:rPr lang="zh-CN" altLang="en-US" dirty="0" smtClean="0"/>
-              <a:t>沒有正式的</a:t>
-            </a:r>
-            <a:r>
-              <a:rPr lang="en-US" altLang="zh-CN" dirty="0" smtClean="0"/>
-              <a:t>(</a:t>
-            </a:r>
-            <a:r>
-              <a:rPr lang="zh-CN" altLang="en-US" dirty="0" smtClean="0"/>
-              <a:t>機械可讀</a:t>
-            </a:r>
-            <a:r>
-              <a:rPr lang="en-US" altLang="zh-CN" dirty="0" smtClean="0"/>
-              <a:t>)</a:t>
-            </a:r>
-            <a:r>
-              <a:rPr lang="zh-CN" altLang="en-US" dirty="0" smtClean="0"/>
-              <a:t>的</a:t>
-            </a:r>
-            <a:r>
-              <a:rPr lang="en-US" altLang="zh-CN" dirty="0" smtClean="0"/>
-              <a:t>API</a:t>
-            </a:r>
-            <a:r>
-              <a:rPr lang="zh-CN" altLang="en-US" dirty="0"/>
-              <a:t>文件</a:t>
-            </a:r>
-            <a:endParaRPr lang="en-US" altLang="zh-CN" dirty="0" smtClean="0"/>
-          </a:p>
-          <a:p>
-            <a:pPr marL="457200" indent="-457200">
-              <a:buFont typeface="Arial" panose="020B0604020202020204" pitchFamily="34" charset="0"/>
-              <a:buChar char="•"/>
-            </a:pPr>
+              <a:t>Facebook</a:t>
+            </a:r>
             <a:endParaRPr lang="zh-TW" altLang="en-US" dirty="0"/>
           </a:p>
         </p:txBody>
@@ -16164,7 +16835,7 @@
     </p:spTree>
     <p:extLst>
       <p:ext uri="{BB962C8B-B14F-4D97-AF65-F5344CB8AC3E}">
-        <p14:creationId xmlns:p14="http://schemas.microsoft.com/office/powerpoint/2010/main" val="295187108"/>
+        <p14:creationId xmlns:p14="http://schemas.microsoft.com/office/powerpoint/2010/main" val="1539119850"/>
       </p:ext>
     </p:extLst>
   </p:cSld>
@@ -16207,64 +16878,6 @@
           <a:lstStyle/>
           <a:p>
             <a:r>
-              <a:rPr lang="zh-CN" altLang="en-US" dirty="0" smtClean="0"/>
-              <a:t>什麼是</a:t>
-            </a:r>
-            <a:r>
-              <a:rPr lang="en-US" altLang="zh-CN" dirty="0" err="1" smtClean="0"/>
-              <a:t>gRPC</a:t>
-            </a:r>
-            <a:r>
-              <a:rPr lang="zh-CN" altLang="en-US" dirty="0" smtClean="0"/>
-              <a:t>？</a:t>
-            </a:r>
-            <a:endParaRPr lang="zh-TW" altLang="en-US" dirty="0"/>
-          </a:p>
-        </p:txBody>
-      </p:sp>
-      <p:sp>
-        <p:nvSpPr>
-          <p:cNvPr id="3" name="內容版面配置區 2"/>
-          <p:cNvSpPr>
-            <a:spLocks noGrp="1"/>
-          </p:cNvSpPr>
-          <p:nvPr>
-            <p:ph sz="quarter" idx="13"/>
-          </p:nvPr>
-        </p:nvSpPr>
-        <p:spPr/>
-        <p:txBody>
-          <a:bodyPr/>
-          <a:lstStyle/>
-          <a:p>
-            <a:endParaRPr lang="zh-TW" altLang="en-US"/>
-          </a:p>
-        </p:txBody>
-      </p:sp>
-      <p:sp>
-        <p:nvSpPr>
-          <p:cNvPr id="4" name="內容版面配置區 3"/>
-          <p:cNvSpPr>
-            <a:spLocks noGrp="1"/>
-          </p:cNvSpPr>
-          <p:nvPr>
-            <p:ph sz="half" idx="1"/>
-          </p:nvPr>
-        </p:nvSpPr>
-        <p:spPr/>
-        <p:txBody>
-          <a:bodyPr/>
-          <a:lstStyle/>
-          <a:p>
-            <a:r>
-              <a:rPr lang="en-US" altLang="zh-CN" dirty="0" err="1" smtClean="0"/>
-              <a:t>gRPC</a:t>
-            </a:r>
-            <a:r>
-              <a:rPr lang="zh-CN" altLang="en-US" dirty="0" smtClean="0"/>
-              <a:t>是高性能的、開源、通用的</a:t>
-            </a:r>
-            <a:r>
               <a:rPr lang="en-US" altLang="zh-CN" dirty="0" smtClean="0"/>
               <a:t>RPC</a:t>
             </a:r>
@@ -16272,59 +16885,128 @@
               <a:rPr lang="zh-CN" altLang="en-US" dirty="0" smtClean="0"/>
               <a:t>框架</a:t>
             </a:r>
-            <a:endParaRPr lang="en-US" altLang="zh-CN" dirty="0" smtClean="0"/>
-          </a:p>
-          <a:p>
-            <a:endParaRPr lang="en-US" altLang="zh-TW" dirty="0"/>
-          </a:p>
-          <a:p>
+            <a:endParaRPr lang="zh-TW" altLang="en-US" dirty="0"/>
+          </a:p>
+        </p:txBody>
+      </p:sp>
+      <p:sp>
+        <p:nvSpPr>
+          <p:cNvPr id="3" name="內容版面配置區 2"/>
+          <p:cNvSpPr>
+            <a:spLocks noGrp="1"/>
+          </p:cNvSpPr>
+          <p:nvPr>
+            <p:ph sz="quarter" idx="13"/>
+          </p:nvPr>
+        </p:nvSpPr>
+        <p:spPr/>
+        <p:txBody>
+          <a:bodyPr/>
+          <a:lstStyle/>
+          <a:p>
+            <a:endParaRPr lang="zh-TW" altLang="en-US"/>
+          </a:p>
+        </p:txBody>
+      </p:sp>
+      <p:sp>
+        <p:nvSpPr>
+          <p:cNvPr id="4" name="內容版面配置區 3"/>
+          <p:cNvSpPr>
+            <a:spLocks noGrp="1"/>
+          </p:cNvSpPr>
+          <p:nvPr>
+            <p:ph sz="half" idx="1"/>
+          </p:nvPr>
+        </p:nvSpPr>
+        <p:spPr/>
+        <p:txBody>
+          <a:bodyPr/>
+          <a:lstStyle/>
+          <a:p>
+            <a:pPr marL="514350" indent="-514350">
+              <a:buAutoNum type="arabicPeriod"/>
+            </a:pPr>
+            <a:r>
+              <a:rPr lang="en-US" altLang="zh-CN" dirty="0" smtClean="0"/>
+              <a:t>Facebook</a:t>
+            </a:r>
+          </a:p>
+          <a:p>
+            <a:pPr marL="1200150" lvl="1" indent="-514350">
+              <a:buAutoNum type="arabicPeriod"/>
+            </a:pPr>
+            <a:r>
+              <a:rPr lang="en-US" altLang="zh-TW" b="0" dirty="0" smtClean="0"/>
+              <a:t>thrift</a:t>
+            </a:r>
+          </a:p>
+          <a:p>
+            <a:pPr marL="514350" indent="-514350">
+              <a:buAutoNum type="arabicPeriod"/>
+            </a:pPr>
+            <a:r>
+              <a:rPr lang="en-US" altLang="zh-TW" dirty="0" smtClean="0"/>
+              <a:t>Google</a:t>
+            </a:r>
+          </a:p>
+          <a:p>
+            <a:pPr marL="1200150" lvl="1" indent="-514350">
+              <a:buAutoNum type="arabicPeriod"/>
+            </a:pPr>
+            <a:r>
+              <a:rPr lang="en-US" altLang="zh-TW" dirty="0" err="1" smtClean="0"/>
+              <a:t>gPRC</a:t>
+            </a:r>
+            <a:endParaRPr lang="en-US" altLang="zh-TW" dirty="0" smtClean="0"/>
+          </a:p>
+          <a:p>
+            <a:pPr marL="514350" indent="-514350">
+              <a:buAutoNum type="arabicPeriod"/>
+            </a:pPr>
+            <a:r>
+              <a:rPr lang="en-US" altLang="zh-TW" dirty="0" smtClean="0"/>
+              <a:t>Alibaba</a:t>
+            </a:r>
+          </a:p>
+          <a:p>
+            <a:pPr marL="1200150" lvl="1" indent="-514350">
+              <a:buAutoNum type="arabicPeriod"/>
+            </a:pPr>
+            <a:r>
+              <a:rPr lang="en-US" altLang="zh-TW" dirty="0" err="1" smtClean="0"/>
+              <a:t>Dubbo</a:t>
+            </a:r>
+            <a:endParaRPr lang="en-US" altLang="zh-TW" dirty="0" smtClean="0"/>
+          </a:p>
+          <a:p>
+            <a:pPr marL="1200150" lvl="1" indent="-514350">
+              <a:buAutoNum type="arabicPeriod"/>
+            </a:pPr>
+            <a:r>
+              <a:rPr lang="zh-TW" altLang="en-US" dirty="0" smtClean="0"/>
+              <a:t>仅支持 </a:t>
+            </a:r>
+            <a:r>
+              <a:rPr lang="en-US" altLang="zh-TW" dirty="0" smtClean="0"/>
+              <a:t>Java </a:t>
+            </a:r>
+            <a:r>
+              <a:rPr lang="zh-TW" altLang="en-US" dirty="0" smtClean="0"/>
+              <a:t>语言</a:t>
+            </a:r>
+            <a:endParaRPr lang="en-US" altLang="zh-TW" dirty="0" smtClean="0"/>
+          </a:p>
+          <a:p>
+            <a:pPr marL="1200150" lvl="1" indent="-514350">
+              <a:buAutoNum type="arabicPeriod"/>
+            </a:pPr>
+            <a:r>
+              <a:rPr lang="en-US" altLang="zh-TW" dirty="0" smtClean="0"/>
+              <a:t>2011</a:t>
+            </a:r>
             <a:r>
               <a:rPr lang="zh-CN" altLang="en-US" dirty="0" smtClean="0"/>
-              <a:t>開始時我們從寫</a:t>
-            </a:r>
-            <a:r>
-              <a:rPr lang="en-US" altLang="zh-CN" dirty="0" err="1" smtClean="0"/>
-              <a:t>gRPC</a:t>
-            </a:r>
-            <a:r>
-              <a:rPr lang="zh-CN" altLang="en-US" dirty="0" smtClean="0"/>
-              <a:t>的</a:t>
-            </a:r>
-            <a:r>
-              <a:rPr lang="en-US" altLang="zh-CN" dirty="0" smtClean="0"/>
-              <a:t>IDL</a:t>
-            </a:r>
-            <a:r>
-              <a:rPr lang="zh-CN" altLang="en-US" dirty="0" smtClean="0"/>
-              <a:t>開始。</a:t>
-            </a:r>
-            <a:endParaRPr lang="en-US" altLang="zh-CN" dirty="0" smtClean="0"/>
-          </a:p>
-          <a:p>
-            <a:endParaRPr lang="en-US" altLang="zh-TW" dirty="0"/>
-          </a:p>
-          <a:p>
-            <a:endParaRPr lang="en-US" altLang="zh-TW" dirty="0" smtClean="0"/>
-          </a:p>
-          <a:p>
-            <a:endParaRPr lang="en-US" altLang="zh-TW" dirty="0"/>
-          </a:p>
-          <a:p>
-            <a:r>
-              <a:rPr lang="en-US" altLang="zh-TW" dirty="0" smtClean="0"/>
-              <a:t>#IDL </a:t>
-            </a:r>
-            <a:r>
-              <a:rPr lang="zh-CN" altLang="en-US" dirty="0" smtClean="0"/>
-              <a:t>類似於</a:t>
-            </a:r>
-            <a:r>
-              <a:rPr lang="en-US" altLang="zh-CN" dirty="0" err="1" smtClean="0"/>
-              <a:t>Struct</a:t>
-            </a:r>
-            <a:r>
-              <a:rPr lang="zh-CN" altLang="en-US" dirty="0" smtClean="0"/>
-              <a:t>的資料架構。</a:t>
+              <a:t>開源</a:t>
             </a:r>
             <a:endParaRPr lang="zh-TW" altLang="en-US" dirty="0"/>
           </a:p>
@@ -16333,7 +17015,7 @@
     </p:spTree>
     <p:extLst>
       <p:ext uri="{BB962C8B-B14F-4D97-AF65-F5344CB8AC3E}">
-        <p14:creationId xmlns:p14="http://schemas.microsoft.com/office/powerpoint/2010/main" val="745161297"/>
+        <p14:creationId xmlns:p14="http://schemas.microsoft.com/office/powerpoint/2010/main" val="2479643448"/>
       </p:ext>
     </p:extLst>
   </p:cSld>
@@ -16381,7 +17063,90 @@
       </p:sp>
       <p:sp>
         <p:nvSpPr>
-          <p:cNvPr id="3" name="內容版面配置區 2"/>
+          <p:cNvPr id="4" name="內容版面配置區 3"/>
+          <p:cNvSpPr>
+            <a:spLocks noGrp="1"/>
+          </p:cNvSpPr>
+          <p:nvPr>
+            <p:ph sz="half" idx="1"/>
+          </p:nvPr>
+        </p:nvSpPr>
+        <p:spPr/>
+        <p:txBody>
+          <a:bodyPr/>
+          <a:lstStyle/>
+          <a:p>
+            <a:r>
+              <a:rPr lang="zh-CN" altLang="en-US" b="0" dirty="0" smtClean="0"/>
+              <a:t>原理</a:t>
+            </a:r>
+            <a:endParaRPr lang="en-US" altLang="zh-CN" b="0" dirty="0" smtClean="0"/>
+          </a:p>
+          <a:p>
+            <a:r>
+              <a:rPr lang="en-US" altLang="zh-CN" b="0" dirty="0" smtClean="0"/>
+              <a:t>1.</a:t>
+            </a:r>
+            <a:r>
+              <a:rPr lang="zh-TW" altLang="en-US" b="0" dirty="0" smtClean="0"/>
+              <a:t>通</a:t>
+            </a:r>
+            <a:r>
+              <a:rPr lang="zh-TW" altLang="en-US" b="0" dirty="0"/>
+              <a:t>过 </a:t>
+            </a:r>
+            <a:r>
+              <a:rPr lang="en-US" altLang="zh-TW" b="0" dirty="0"/>
+              <a:t>IDL</a:t>
+            </a:r>
+            <a:r>
+              <a:rPr lang="zh-TW" altLang="en-US" b="0" dirty="0"/>
+              <a:t>（</a:t>
+            </a:r>
+            <a:r>
+              <a:rPr lang="en-US" altLang="zh-TW" b="0" dirty="0"/>
+              <a:t>Interface Definition Language</a:t>
+            </a:r>
+            <a:r>
+              <a:rPr lang="zh-TW" altLang="en-US" b="0" dirty="0"/>
+              <a:t>）文件定义服务接口的参数和返回值类</a:t>
+            </a:r>
+            <a:r>
+              <a:rPr lang="zh-TW" altLang="en-US" b="0" dirty="0" smtClean="0"/>
+              <a:t>型</a:t>
+            </a:r>
+            <a:endParaRPr lang="en-US" altLang="zh-TW" b="0" dirty="0" smtClean="0"/>
+          </a:p>
+          <a:p>
+            <a:r>
+              <a:rPr lang="en-US" altLang="zh-CN" b="0" dirty="0" smtClean="0"/>
+              <a:t>2.</a:t>
+            </a:r>
+            <a:r>
+              <a:rPr lang="zh-CN" altLang="en-US" b="0" dirty="0" smtClean="0"/>
+              <a:t>通過代</a:t>
+            </a:r>
+            <a:r>
+              <a:rPr lang="zh-CN" altLang="en-US" b="0" dirty="0"/>
+              <a:t>码生成程序生成服务端和客户端的具体实现代</a:t>
+            </a:r>
+            <a:r>
+              <a:rPr lang="zh-CN" altLang="en-US" b="0" dirty="0" smtClean="0"/>
+              <a:t>码</a:t>
+            </a:r>
+            <a:endParaRPr lang="en-US" altLang="zh-CN" b="0" dirty="0" smtClean="0"/>
+          </a:p>
+          <a:p>
+            <a:endParaRPr lang="en-US" altLang="zh-TW" b="0" dirty="0"/>
+          </a:p>
+          <a:p>
+            <a:endParaRPr lang="zh-TW" altLang="en-US" dirty="0"/>
+          </a:p>
+        </p:txBody>
+      </p:sp>
+      <p:sp>
+        <p:nvSpPr>
+          <p:cNvPr id="8" name="內容版面配置區 7"/>
           <p:cNvSpPr>
             <a:spLocks noGrp="1"/>
           </p:cNvSpPr>
@@ -16398,83 +17163,10 @@
           </a:p>
         </p:txBody>
       </p:sp>
-      <p:sp>
-        <p:nvSpPr>
-          <p:cNvPr id="4" name="內容版面配置區 3"/>
-          <p:cNvSpPr>
-            <a:spLocks noGrp="1"/>
-          </p:cNvSpPr>
-          <p:nvPr>
-            <p:ph sz="half" idx="1"/>
-          </p:nvPr>
-        </p:nvSpPr>
-        <p:spPr/>
-        <p:txBody>
-          <a:bodyPr/>
-          <a:lstStyle/>
-          <a:p>
-            <a:endParaRPr lang="zh-TW" altLang="en-US" dirty="0"/>
-          </a:p>
-        </p:txBody>
-      </p:sp>
-      <p:pic>
-        <p:nvPicPr>
-          <p:cNvPr id="1026" name="Picture 2"/>
-          <p:cNvPicPr>
-            <a:picLocks noChangeAspect="1" noChangeArrowheads="1"/>
-          </p:cNvPicPr>
-          <p:nvPr/>
-        </p:nvPicPr>
-        <p:blipFill>
-          <a:blip r:embed="rId2">
-            <a:extLst>
-              <a:ext uri="{28A0092B-C50C-407E-A947-70E740481C1C}">
-                <a14:useLocalDpi xmlns:a14="http://schemas.microsoft.com/office/drawing/2010/main" val="0"/>
-              </a:ext>
-            </a:extLst>
-          </a:blip>
-          <a:srcRect/>
-          <a:stretch>
-            <a:fillRect/>
-          </a:stretch>
-        </p:blipFill>
-        <p:spPr bwMode="auto">
-          <a:xfrm>
-            <a:off x="926833" y="1930399"/>
-            <a:ext cx="6276975" cy="4467225"/>
-          </a:xfrm>
-          <a:prstGeom prst="rect">
-            <a:avLst/>
-          </a:prstGeom>
-          <a:noFill/>
-          <a:ln>
-            <a:noFill/>
-          </a:ln>
-          <a:extLst>
-            <a:ext uri="{909E8E84-426E-40DD-AFC4-6F175D3DCCD1}">
-              <a14:hiddenFill xmlns:a14="http://schemas.microsoft.com/office/drawing/2010/main">
-                <a:solidFill>
-                  <a:schemeClr val="accent1"/>
-                </a:solidFill>
-              </a14:hiddenFill>
-            </a:ext>
-            <a:ext uri="{91240B29-F687-4F45-9708-019B960494DF}">
-              <a14:hiddenLine xmlns:a14="http://schemas.microsoft.com/office/drawing/2010/main" w="9525">
-                <a:solidFill>
-                  <a:schemeClr val="tx1"/>
-                </a:solidFill>
-                <a:miter lim="800000"/>
-                <a:headEnd/>
-                <a:tailEnd/>
-              </a14:hiddenLine>
-            </a:ext>
-          </a:extLst>
-        </p:spPr>
-      </p:pic>
     </p:spTree>
     <p:extLst>
       <p:ext uri="{BB962C8B-B14F-4D97-AF65-F5344CB8AC3E}">
-        <p14:creationId xmlns:p14="http://schemas.microsoft.com/office/powerpoint/2010/main" val="2227107922"/>
+        <p14:creationId xmlns:p14="http://schemas.microsoft.com/office/powerpoint/2010/main" val="1479848473"/>
       </p:ext>
     </p:extLst>
   </p:cSld>
@@ -16517,123 +17209,204 @@
           <a:lstStyle/>
           <a:p>
             <a:r>
+              <a:rPr lang="zh-CN" altLang="en-US" dirty="0" smtClean="0"/>
+              <a:t>為什麼</a:t>
+            </a:r>
+            <a:r>
+              <a:rPr lang="zh-TW" altLang="en-US" dirty="0" smtClean="0"/>
+              <a:t> </a:t>
+            </a:r>
+            <a:r>
+              <a:rPr lang="en-US" altLang="zh-TW" dirty="0"/>
+              <a:t>REST API </a:t>
+            </a:r>
+            <a:r>
               <a:rPr lang="zh-CN" altLang="en-US" dirty="0"/>
-              <a:t>生产环境如何使用 </a:t>
+              <a:t>不好用</a:t>
+            </a:r>
+            <a:r>
+              <a:rPr lang="zh-TW" altLang="en-US" dirty="0" smtClean="0"/>
+              <a:t>？</a:t>
+            </a:r>
+            <a:endParaRPr lang="zh-TW" altLang="en-US" dirty="0"/>
+          </a:p>
+        </p:txBody>
+      </p:sp>
+      <p:sp>
+        <p:nvSpPr>
+          <p:cNvPr id="3" name="內容版面配置區 2"/>
+          <p:cNvSpPr>
+            <a:spLocks noGrp="1"/>
+          </p:cNvSpPr>
+          <p:nvPr>
+            <p:ph sz="quarter" idx="13"/>
+          </p:nvPr>
+        </p:nvSpPr>
+        <p:spPr/>
+        <p:txBody>
+          <a:bodyPr/>
+          <a:lstStyle/>
+          <a:p>
+            <a:endParaRPr lang="zh-TW" altLang="en-US"/>
+          </a:p>
+        </p:txBody>
+      </p:sp>
+      <p:sp>
+        <p:nvSpPr>
+          <p:cNvPr id="4" name="內容版面配置區 3"/>
+          <p:cNvSpPr>
+            <a:spLocks noGrp="1"/>
+          </p:cNvSpPr>
+          <p:nvPr>
+            <p:ph sz="half" idx="1"/>
+          </p:nvPr>
+        </p:nvSpPr>
+        <p:spPr/>
+        <p:txBody>
+          <a:bodyPr/>
+          <a:lstStyle/>
+          <a:p>
+            <a:pPr marL="457200" indent="-457200">
+              <a:buFont typeface="Arial" panose="020B0604020202020204" pitchFamily="34" charset="0"/>
+              <a:buChar char="•"/>
+            </a:pPr>
+            <a:r>
+              <a:rPr lang="zh-CN" altLang="en-US" dirty="0" smtClean="0"/>
+              <a:t>實現</a:t>
+            </a:r>
+            <a:r>
+              <a:rPr lang="en-US" altLang="zh-CN" dirty="0" smtClean="0"/>
+              <a:t>Stream</a:t>
+            </a:r>
+            <a:r>
+              <a:rPr lang="zh-CN" altLang="en-US" dirty="0" smtClean="0"/>
+              <a:t>太難了</a:t>
+            </a:r>
+            <a:endParaRPr lang="en-US" altLang="zh-CN" dirty="0" smtClean="0"/>
+          </a:p>
+          <a:p>
+            <a:pPr marL="457200" indent="-457200">
+              <a:buFont typeface="Arial" panose="020B0604020202020204" pitchFamily="34" charset="0"/>
+              <a:buChar char="•"/>
+            </a:pPr>
+            <a:r>
+              <a:rPr lang="zh-CN" altLang="en-US" dirty="0" smtClean="0"/>
+              <a:t>雙向的流（</a:t>
             </a:r>
             <a:r>
               <a:rPr lang="en-US" altLang="zh-CN" dirty="0" err="1" smtClean="0"/>
-              <a:t>gRPC</a:t>
-            </a:r>
+              <a:t>WebSocket</a:t>
+            </a:r>
+            <a:r>
+              <a:rPr lang="zh-CN" altLang="en-US" dirty="0" smtClean="0"/>
+              <a:t>）根本不可能</a:t>
+            </a:r>
+            <a:endParaRPr lang="en-US" altLang="zh-CN" dirty="0" smtClean="0"/>
+          </a:p>
+          <a:p>
+            <a:pPr marL="457200" indent="-457200">
+              <a:buFont typeface="Arial" panose="020B0604020202020204" pitchFamily="34" charset="0"/>
+              <a:buChar char="•"/>
+            </a:pPr>
+            <a:r>
+              <a:rPr lang="zh-CN" altLang="en-US" dirty="0" smtClean="0"/>
+              <a:t>很難對操作建立模型</a:t>
+            </a:r>
+            <a:r>
+              <a:rPr lang="en-US" altLang="zh-CN" dirty="0" smtClean="0"/>
+              <a:t>(</a:t>
+            </a:r>
+            <a:r>
+              <a:rPr lang="zh-CN" altLang="en-US" dirty="0" smtClean="0"/>
+              <a:t>不會有規範的文件</a:t>
+            </a:r>
+            <a:r>
+              <a:rPr lang="en-US" altLang="zh-CN" dirty="0" smtClean="0"/>
+              <a:t>)</a:t>
+            </a:r>
+          </a:p>
+          <a:p>
+            <a:pPr marL="457200" indent="-457200">
+              <a:buFont typeface="Arial" panose="020B0604020202020204" pitchFamily="34" charset="0"/>
+              <a:buChar char="•"/>
+            </a:pPr>
+            <a:r>
+              <a:rPr lang="zh-CN" altLang="en-US" dirty="0"/>
+              <a:t>很</a:t>
+            </a:r>
+            <a:r>
+              <a:rPr lang="zh-CN" altLang="en-US" dirty="0" smtClean="0"/>
+              <a:t>難再一個請求中取得多個資源數據</a:t>
+            </a:r>
+            <a:r>
+              <a:rPr lang="en-US" altLang="zh-CN" dirty="0" smtClean="0"/>
+              <a:t>(</a:t>
+            </a:r>
+            <a:r>
+              <a:rPr lang="zh-CN" altLang="en-US" dirty="0" smtClean="0"/>
+              <a:t>從兩個</a:t>
+            </a:r>
+            <a:r>
+              <a:rPr lang="en-US" altLang="zh-CN" dirty="0" smtClean="0"/>
+              <a:t>server</a:t>
+            </a:r>
+            <a:r>
+              <a:rPr lang="zh-CN" altLang="en-US" dirty="0" smtClean="0"/>
+              <a:t>取資料</a:t>
+            </a:r>
+            <a:r>
+              <a:rPr lang="en-US" altLang="zh-CN" dirty="0" smtClean="0"/>
+              <a:t>)</a:t>
+            </a:r>
+          </a:p>
+          <a:p>
+            <a:pPr marL="457200" indent="-457200">
+              <a:buFont typeface="Arial" panose="020B0604020202020204" pitchFamily="34" charset="0"/>
+              <a:buChar char="•"/>
+            </a:pPr>
+            <a:r>
+              <a:rPr lang="zh-CN" altLang="en-US" dirty="0" smtClean="0"/>
+              <a:t>沒有正式的</a:t>
+            </a:r>
+            <a:r>
+              <a:rPr lang="en-US" altLang="zh-CN" dirty="0" smtClean="0"/>
+              <a:t>(</a:t>
+            </a:r>
+            <a:r>
+              <a:rPr lang="zh-CN" altLang="en-US" dirty="0" smtClean="0"/>
+              <a:t>機械可讀</a:t>
+            </a:r>
+            <a:r>
+              <a:rPr lang="en-US" altLang="zh-CN" dirty="0" smtClean="0"/>
+              <a:t>)</a:t>
+            </a:r>
+            <a:r>
+              <a:rPr lang="zh-CN" altLang="en-US" dirty="0" smtClean="0"/>
+              <a:t>的</a:t>
+            </a:r>
+            <a:r>
+              <a:rPr lang="en-US" altLang="zh-CN" dirty="0" smtClean="0"/>
+              <a:t>API</a:t>
+            </a:r>
+            <a:r>
+              <a:rPr lang="zh-CN" altLang="en-US" dirty="0"/>
+              <a:t>文件</a:t>
+            </a:r>
+            <a:endParaRPr lang="en-US" altLang="zh-CN" dirty="0" smtClean="0"/>
+          </a:p>
+          <a:p>
+            <a:pPr marL="457200" indent="-457200">
+              <a:buFont typeface="Arial" panose="020B0604020202020204" pitchFamily="34" charset="0"/>
+              <a:buChar char="•"/>
+            </a:pPr>
             <a:endParaRPr lang="zh-TW" altLang="en-US" dirty="0"/>
-          </a:p>
-        </p:txBody>
-      </p:sp>
-      <p:sp>
-        <p:nvSpPr>
-          <p:cNvPr id="3" name="內容版面配置區 2"/>
-          <p:cNvSpPr>
-            <a:spLocks noGrp="1"/>
-          </p:cNvSpPr>
-          <p:nvPr>
-            <p:ph sz="quarter" idx="13"/>
-          </p:nvPr>
-        </p:nvSpPr>
-        <p:spPr/>
-        <p:txBody>
-          <a:bodyPr/>
-          <a:lstStyle/>
-          <a:p>
-            <a:endParaRPr lang="zh-TW" altLang="en-US"/>
-          </a:p>
-        </p:txBody>
-      </p:sp>
-      <p:sp>
-        <p:nvSpPr>
-          <p:cNvPr id="4" name="內容版面配置區 3"/>
-          <p:cNvSpPr>
-            <a:spLocks noGrp="1"/>
-          </p:cNvSpPr>
-          <p:nvPr>
-            <p:ph sz="half" idx="1"/>
-          </p:nvPr>
-        </p:nvSpPr>
-        <p:spPr/>
-        <p:txBody>
-          <a:bodyPr/>
-          <a:lstStyle/>
-          <a:p>
-            <a:r>
-              <a:rPr lang="en-US" altLang="zh-TW" dirty="0"/>
-              <a:t>HTTP/2 </a:t>
-            </a:r>
-            <a:r>
-              <a:rPr lang="en-US" altLang="zh-TW" dirty="0" err="1"/>
-              <a:t>protobuf</a:t>
-            </a:r>
-            <a:r>
-              <a:rPr lang="en-US" altLang="zh-TW" dirty="0"/>
-              <a:t> serialization (pluggable) </a:t>
-            </a:r>
-            <a:r>
-              <a:rPr lang="zh-TW" altLang="en-US" dirty="0"/>
-              <a:t>客户端会和 </a:t>
-            </a:r>
-            <a:r>
-              <a:rPr lang="en-US" altLang="zh-TW" dirty="0" err="1"/>
-              <a:t>grpc</a:t>
-            </a:r>
-            <a:r>
-              <a:rPr lang="en-US" altLang="zh-TW" dirty="0"/>
-              <a:t> </a:t>
-            </a:r>
-            <a:r>
-              <a:rPr lang="zh-TW" altLang="en-US" dirty="0"/>
-              <a:t>服务器打开一个长连接 对于每一个 </a:t>
-            </a:r>
-            <a:r>
-              <a:rPr lang="en-US" altLang="zh-TW" dirty="0"/>
-              <a:t>RPC </a:t>
-            </a:r>
-            <a:r>
-              <a:rPr lang="zh-TW" altLang="en-US" dirty="0"/>
-              <a:t>调用都将是一个新的 </a:t>
-            </a:r>
-            <a:r>
-              <a:rPr lang="en-US" altLang="zh-TW" dirty="0"/>
-              <a:t>HTTP/2 stream</a:t>
-            </a:r>
-          </a:p>
-          <a:p>
-            <a:r>
-              <a:rPr lang="zh-TW" altLang="en-US" dirty="0"/>
-              <a:t>允许模拟飞行模式的 </a:t>
-            </a:r>
-            <a:r>
-              <a:rPr lang="en-US" altLang="zh-TW" dirty="0"/>
-              <a:t>RPC </a:t>
-            </a:r>
-            <a:r>
-              <a:rPr lang="zh-TW" altLang="en-US" dirty="0"/>
-              <a:t>调用</a:t>
-            </a:r>
-          </a:p>
-          <a:p>
-            <a:r>
-              <a:rPr lang="zh-TW" altLang="en-US" dirty="0"/>
-              <a:t>允许客户端 和 服务端 </a:t>
-            </a:r>
-            <a:r>
-              <a:rPr lang="en-US" altLang="zh-TW" dirty="0" smtClean="0"/>
-              <a:t>Streaming</a:t>
-            </a:r>
-            <a:endParaRPr lang="en-US" altLang="zh-TW" dirty="0"/>
           </a:p>
         </p:txBody>
       </p:sp>
     </p:spTree>
     <p:extLst>
       <p:ext uri="{BB962C8B-B14F-4D97-AF65-F5344CB8AC3E}">
-        <p14:creationId xmlns:p14="http://schemas.microsoft.com/office/powerpoint/2010/main" val="1759547864"/>
+        <p14:creationId xmlns:p14="http://schemas.microsoft.com/office/powerpoint/2010/main" val="295187108"/>
       </p:ext>
     </p:extLst>
   </p:cSld>
@@ -16662,41 +17435,43 @@
       </p:grpSpPr>
       <p:sp>
         <p:nvSpPr>
-          <p:cNvPr id="4" name="標題 3"/>
-          <p:cNvSpPr>
-            <a:spLocks noGrp="1"/>
-          </p:cNvSpPr>
-          <p:nvPr>
-            <p:ph type="ctrTitle"/>
+          <p:cNvPr id="2" name="標題 1"/>
+          <p:cNvSpPr>
+            <a:spLocks noGrp="1"/>
+          </p:cNvSpPr>
+          <p:nvPr>
+            <p:ph type="title"/>
           </p:nvPr>
         </p:nvSpPr>
         <p:spPr/>
         <p:txBody>
-          <a:bodyPr>
-            <a:normAutofit/>
-          </a:bodyPr>
-          <a:lstStyle/>
-          <a:p>
-            <a:r>
-              <a:rPr lang="en-US" altLang="zh-TW" sz="6600" dirty="0">
-                <a:latin typeface="Tw Cen MT" pitchFamily="34" charset="0"/>
-              </a:rPr>
-              <a:t>Thank You</a:t>
-            </a:r>
-            <a:endParaRPr lang="zh-TW" altLang="en-US" sz="6600" dirty="0">
-              <a:latin typeface="Tw Cen MT" pitchFamily="34" charset="0"/>
-            </a:endParaRPr>
-          </a:p>
-        </p:txBody>
-      </p:sp>
-      <p:sp>
-        <p:nvSpPr>
-          <p:cNvPr id="6" name="副標題 5"/>
-          <p:cNvSpPr>
-            <a:spLocks noGrp="1"/>
-          </p:cNvSpPr>
-          <p:nvPr>
-            <p:ph type="subTitle" idx="1"/>
+          <a:bodyPr/>
+          <a:lstStyle/>
+          <a:p>
+            <a:r>
+              <a:rPr lang="zh-CN" altLang="en-US" dirty="0" smtClean="0"/>
+              <a:t>什麼是</a:t>
+            </a:r>
+            <a:r>
+              <a:rPr lang="en-US" altLang="zh-CN" dirty="0" err="1" smtClean="0"/>
+              <a:t>gRPC</a:t>
+            </a:r>
+            <a:r>
+              <a:rPr lang="zh-CN" altLang="en-US" dirty="0" smtClean="0"/>
+              <a:t>？</a:t>
+            </a:r>
+            <a:endParaRPr lang="zh-TW" altLang="en-US" dirty="0"/>
+          </a:p>
+        </p:txBody>
+      </p:sp>
+      <p:sp>
+        <p:nvSpPr>
+          <p:cNvPr id="3" name="內容版面配置區 2"/>
+          <p:cNvSpPr>
+            <a:spLocks noGrp="1"/>
+          </p:cNvSpPr>
+          <p:nvPr>
+            <p:ph sz="quarter" idx="13"/>
           </p:nvPr>
         </p:nvSpPr>
         <p:spPr/>
@@ -16704,66 +17479,122 @@
           <a:bodyPr/>
           <a:lstStyle/>
           <a:p>
-            <a:r>
-              <a:rPr lang="en-US" altLang="zh-TW" sz="2800" b="0" dirty="0" smtClean="0">
-                <a:latin typeface="Tw Cen MT" pitchFamily="34" charset="0"/>
-              </a:rPr>
-              <a:t>Q</a:t>
-            </a:r>
-            <a:r>
-              <a:rPr lang="zh-TW" altLang="en-US" sz="2800" b="0" dirty="0" smtClean="0">
-                <a:latin typeface="Tw Cen MT" pitchFamily="34" charset="0"/>
-              </a:rPr>
-              <a:t> </a:t>
-            </a:r>
-            <a:r>
-              <a:rPr lang="en-US" altLang="zh-TW" sz="2800" b="0" dirty="0">
-                <a:latin typeface="Tw Cen MT" pitchFamily="34" charset="0"/>
-              </a:rPr>
-              <a:t>&amp;</a:t>
-            </a:r>
-            <a:r>
-              <a:rPr lang="zh-TW" altLang="en-US" sz="2800" b="0" dirty="0">
-                <a:latin typeface="Tw Cen MT" pitchFamily="34" charset="0"/>
-              </a:rPr>
-              <a:t> </a:t>
-            </a:r>
-            <a:r>
-              <a:rPr lang="en-US" altLang="zh-TW" sz="2800" b="0" dirty="0">
-                <a:latin typeface="Tw Cen MT" pitchFamily="34" charset="0"/>
-              </a:rPr>
-              <a:t>A</a:t>
-            </a:r>
-            <a:endParaRPr lang="zh-TW" altLang="en-US" b="0" dirty="0">
-              <a:latin typeface="Tw Cen MT" pitchFamily="34" charset="0"/>
-            </a:endParaRPr>
-          </a:p>
-        </p:txBody>
-      </p:sp>
-      <p:sp>
-        <p:nvSpPr>
-          <p:cNvPr id="7" name="文字版面配置區 6"/>
-          <p:cNvSpPr>
-            <a:spLocks noGrp="1"/>
-          </p:cNvSpPr>
-          <p:nvPr>
-            <p:ph type="body" sz="quarter" idx="13"/>
+            <a:endParaRPr lang="zh-TW" altLang="en-US"/>
+          </a:p>
+        </p:txBody>
+      </p:sp>
+      <p:sp>
+        <p:nvSpPr>
+          <p:cNvPr id="4" name="內容版面配置區 3"/>
+          <p:cNvSpPr>
+            <a:spLocks noGrp="1"/>
+          </p:cNvSpPr>
+          <p:nvPr>
+            <p:ph sz="half" idx="1"/>
           </p:nvPr>
         </p:nvSpPr>
         <p:spPr/>
         <p:txBody>
-          <a:bodyPr>
-            <a:normAutofit lnSpcReduction="10000"/>
-          </a:bodyPr>
-          <a:lstStyle/>
-          <a:p>
-            <a:r>
-              <a:rPr lang="en-US" altLang="zh-TW" dirty="0"/>
-              <a:t>By </a:t>
-            </a:r>
+          <a:bodyPr/>
+          <a:lstStyle/>
+          <a:p>
+            <a:r>
+              <a:rPr lang="en-US" altLang="zh-CN" dirty="0" err="1" smtClean="0"/>
+              <a:t>gRPC</a:t>
+            </a:r>
+            <a:r>
+              <a:rPr lang="zh-CN" altLang="en-US" dirty="0" smtClean="0"/>
+              <a:t>是高性能的、開源、通用的</a:t>
+            </a:r>
+            <a:r>
+              <a:rPr lang="en-US" altLang="zh-CN" dirty="0" smtClean="0"/>
+              <a:t>RPC</a:t>
+            </a:r>
+            <a:r>
+              <a:rPr lang="zh-CN" altLang="en-US" dirty="0" smtClean="0"/>
+              <a:t>框架</a:t>
+            </a:r>
+            <a:endParaRPr lang="en-US" altLang="zh-CN" dirty="0" smtClean="0"/>
+          </a:p>
+          <a:p>
+            <a:endParaRPr lang="en-US" altLang="zh-TW" dirty="0"/>
+          </a:p>
+          <a:p>
+            <a:r>
+              <a:rPr lang="zh-CN" altLang="en-US" dirty="0"/>
+              <a:t>第一</a:t>
+            </a:r>
+            <a:r>
+              <a:rPr lang="zh-CN" altLang="en-US" dirty="0" smtClean="0"/>
+              <a:t>步</a:t>
+            </a:r>
+            <a:r>
+              <a:rPr lang="en-US" altLang="zh-CN" dirty="0" smtClean="0"/>
+              <a:t>—</a:t>
+            </a:r>
+            <a:r>
+              <a:rPr lang="zh-CN" altLang="en-US" dirty="0" smtClean="0"/>
+              <a:t>我們</a:t>
+            </a:r>
+            <a:r>
+              <a:rPr lang="zh-CN" altLang="en-US" dirty="0" smtClean="0"/>
+              <a:t>從寫</a:t>
+            </a:r>
+            <a:r>
+              <a:rPr lang="en-US" altLang="zh-CN" dirty="0" err="1" smtClean="0"/>
+              <a:t>gRPC</a:t>
+            </a:r>
+            <a:r>
+              <a:rPr lang="zh-CN" altLang="en-US" dirty="0" smtClean="0"/>
+              <a:t>的</a:t>
+            </a:r>
+            <a:r>
+              <a:rPr lang="en-US" altLang="zh-CN" dirty="0" smtClean="0"/>
+              <a:t>IDL(</a:t>
+            </a:r>
+            <a:r>
+              <a:rPr lang="en-US" altLang="zh-TW" b="0" dirty="0"/>
+              <a:t>Interface description language</a:t>
+            </a:r>
+            <a:r>
+              <a:rPr lang="en-US" altLang="zh-CN" dirty="0" smtClean="0"/>
+              <a:t>)</a:t>
+            </a:r>
+            <a:r>
+              <a:rPr lang="zh-CN" altLang="en-US" dirty="0" smtClean="0"/>
+              <a:t>開始</a:t>
+            </a:r>
+            <a:r>
+              <a:rPr lang="zh-CN" altLang="en-US" dirty="0" smtClean="0"/>
+              <a:t>。</a:t>
+            </a:r>
+            <a:endParaRPr lang="en-US" altLang="zh-CN" dirty="0" smtClean="0"/>
+          </a:p>
+          <a:p>
+            <a:endParaRPr lang="en-US" altLang="zh-TW" dirty="0"/>
+          </a:p>
+          <a:p>
+            <a:endParaRPr lang="en-US" altLang="zh-TW" dirty="0" smtClean="0"/>
+          </a:p>
+          <a:p>
+            <a:endParaRPr lang="en-US" altLang="zh-TW" dirty="0"/>
+          </a:p>
+          <a:p>
             <a:r>
               <a:rPr lang="en-US" altLang="zh-TW" dirty="0" smtClean="0"/>
-              <a:t>Beer</a:t>
+              <a:t>#IDL </a:t>
+            </a:r>
+            <a:r>
+              <a:rPr lang="zh-CN" altLang="en-US" dirty="0" smtClean="0"/>
+              <a:t>類似於</a:t>
+            </a:r>
+            <a:r>
+              <a:rPr lang="en-US" altLang="zh-CN" dirty="0" err="1" smtClean="0"/>
+              <a:t>Struct</a:t>
+            </a:r>
+            <a:r>
+              <a:rPr lang="zh-CN" altLang="en-US" dirty="0" smtClean="0"/>
+              <a:t>的資料架構。</a:t>
             </a:r>
             <a:endParaRPr lang="zh-TW" altLang="en-US" dirty="0"/>
           </a:p>
@@ -16772,7 +17603,7 @@
     </p:spTree>
     <p:extLst>
       <p:ext uri="{BB962C8B-B14F-4D97-AF65-F5344CB8AC3E}">
-        <p14:creationId xmlns:p14="http://schemas.microsoft.com/office/powerpoint/2010/main" val="3310412145"/>
+        <p14:creationId xmlns:p14="http://schemas.microsoft.com/office/powerpoint/2010/main" val="745161297"/>
       </p:ext>
     </p:extLst>
   </p:cSld>
@@ -17098,7 +17929,7 @@
   <a:extraClrSchemeLst/>
   <a:extLst>
     <a:ext uri="{05A4C25C-085E-4340-85A3-A5531E510DB2}">
-      <thm15:themeFamily xmlns:thm15="http://schemas.microsoft.com/office/thememl/2012/main" xmlns="" name="Office Theme" id="{62F939B6-93AF-4DB8-9C6B-D6C7DFDC589F}" vid="{4A3C46E8-61CC-4603-A589-7422A47A8E4A}"/>
+      <thm15:themeFamily xmlns="" xmlns:thm15="http://schemas.microsoft.com/office/thememl/2012/main" name="Office Theme" id="{62F939B6-93AF-4DB8-9C6B-D6C7DFDC589F}" vid="{4A3C46E8-61CC-4603-A589-7422A47A8E4A}"/>
     </a:ext>
   </a:extLst>
 </a:theme>

</xml_diff>

<commit_message>
datatest complate | gRPC javascript complate | config ppt no complate 2/12
</commit_message>
<xml_diff>
--- a/空白PPT.pptx
+++ b/空白PPT.pptx
@@ -5,7 +5,7 @@
     <p:sldMasterId id="2147483648" r:id="rId1"/>
   </p:sldMasterIdLst>
   <p:notesMasterIdLst>
-    <p:notesMasterId r:id="rId14"/>
+    <p:notesMasterId r:id="rId17"/>
   </p:notesMasterIdLst>
   <p:sldIdLst>
     <p:sldId id="256" r:id="rId2"/>
@@ -17,9 +17,12 @@
     <p:sldId id="389" r:id="rId8"/>
     <p:sldId id="383" r:id="rId9"/>
     <p:sldId id="384" r:id="rId10"/>
-    <p:sldId id="385" r:id="rId11"/>
-    <p:sldId id="386" r:id="rId12"/>
-    <p:sldId id="286" r:id="rId13"/>
+    <p:sldId id="390" r:id="rId11"/>
+    <p:sldId id="385" r:id="rId12"/>
+    <p:sldId id="386" r:id="rId13"/>
+    <p:sldId id="391" r:id="rId14"/>
+    <p:sldId id="392" r:id="rId15"/>
+    <p:sldId id="286" r:id="rId16"/>
   </p:sldIdLst>
   <p:sldSz cx="12192000" cy="6858000"/>
   <p:notesSz cx="6858000" cy="9144000"/>
@@ -132,15 +135,18 @@
             <p14:sldId id="389"/>
             <p14:sldId id="383"/>
             <p14:sldId id="384"/>
+            <p14:sldId id="390"/>
             <p14:sldId id="385"/>
             <p14:sldId id="386"/>
+            <p14:sldId id="391"/>
+            <p14:sldId id="392"/>
             <p14:sldId id="286"/>
           </p14:sldIdLst>
         </p14:section>
       </p14:sectionLst>
     </p:ext>
     <p:ext uri="{EFAFB233-063F-42B5-8137-9DF3F51BA10A}">
-      <p15:sldGuideLst xmlns="" xmlns:p15="http://schemas.microsoft.com/office/powerpoint/2012/main">
+      <p15:sldGuideLst xmlns:p15="http://schemas.microsoft.com/office/powerpoint/2012/main" xmlns="">
         <p15:guide id="1" orient="horz" pos="2160">
           <p15:clr>
             <a:srgbClr val="A4A3A4"/>
@@ -239,7 +245,7 @@
           <a:p>
             <a:fld id="{1BA5755D-7932-44A5-A2C7-C8A2CBF288E8}" type="datetimeFigureOut">
               <a:rPr lang="zh-TW" altLang="en-US" smtClean="0"/>
-              <a:t>2020/2/6</a:t>
+              <a:t>2020/2/12</a:t>
             </a:fld>
             <a:endParaRPr lang="zh-TW" altLang="en-US"/>
           </a:p>
@@ -1417,7 +1423,7 @@
           <a:p>
             <a:fld id="{EEBFCD98-6B9E-4D19-9C43-11FCDEF19DFC}" type="slidenum">
               <a:rPr lang="zh-TW" altLang="en-US" smtClean="0"/>
-              <a:t>12</a:t>
+              <a:t>15</a:t>
             </a:fld>
             <a:endParaRPr lang="zh-TW" altLang="en-US"/>
           </a:p>
@@ -1458,7 +1464,7 @@
           <p:cNvPr id="2" name="標題 1">
             <a:extLst>
               <a:ext uri="{FF2B5EF4-FFF2-40B4-BE49-F238E27FC236}">
-                <a16:creationId xmlns:a16="http://schemas.microsoft.com/office/drawing/2014/main" xmlns="" id="{6A1C7254-695B-1F42-AC59-34E8D858E936}"/>
+                <a16:creationId xmlns="" xmlns:a16="http://schemas.microsoft.com/office/drawing/2014/main" id="{6A1C7254-695B-1F42-AC59-34E8D858E936}"/>
               </a:ext>
             </a:extLst>
           </p:cNvPr>
@@ -1501,7 +1507,7 @@
           <p:cNvPr id="3" name="文字版面配置區 2">
             <a:extLst>
               <a:ext uri="{FF2B5EF4-FFF2-40B4-BE49-F238E27FC236}">
-                <a16:creationId xmlns:a16="http://schemas.microsoft.com/office/drawing/2014/main" xmlns="" id="{1D19DA3B-2013-E14B-A941-CC519B76AD6F}"/>
+                <a16:creationId xmlns="" xmlns:a16="http://schemas.microsoft.com/office/drawing/2014/main" id="{1D19DA3B-2013-E14B-A941-CC519B76AD6F}"/>
               </a:ext>
             </a:extLst>
           </p:cNvPr>
@@ -1626,7 +1632,7 @@
           <p:cNvPr id="4" name="日期版面配置區 3">
             <a:extLst>
               <a:ext uri="{FF2B5EF4-FFF2-40B4-BE49-F238E27FC236}">
-                <a16:creationId xmlns:a16="http://schemas.microsoft.com/office/drawing/2014/main" xmlns="" id="{BC7211D9-290C-574E-B682-764110BB9BAF}"/>
+                <a16:creationId xmlns="" xmlns:a16="http://schemas.microsoft.com/office/drawing/2014/main" id="{BC7211D9-290C-574E-B682-764110BB9BAF}"/>
               </a:ext>
             </a:extLst>
           </p:cNvPr>
@@ -1644,7 +1650,7 @@
           <a:p>
             <a:fld id="{75F8934F-7F83-1046-9341-02CE27D9104D}" type="datetimeFigureOut">
               <a:rPr kumimoji="1" lang="zh-TW" altLang="en-US" smtClean="0"/>
-              <a:t>2020/2/6</a:t>
+              <a:t>2020/2/12</a:t>
             </a:fld>
             <a:endParaRPr kumimoji="1" lang="zh-TW" altLang="en-US" dirty="0"/>
           </a:p>
@@ -1655,7 +1661,7 @@
           <p:cNvPr id="5" name="頁尾版面配置區 4">
             <a:extLst>
               <a:ext uri="{FF2B5EF4-FFF2-40B4-BE49-F238E27FC236}">
-                <a16:creationId xmlns:a16="http://schemas.microsoft.com/office/drawing/2014/main" xmlns="" id="{D4D4BDD1-0BFA-0645-8197-068191AAF54C}"/>
+                <a16:creationId xmlns="" xmlns:a16="http://schemas.microsoft.com/office/drawing/2014/main" id="{D4D4BDD1-0BFA-0645-8197-068191AAF54C}"/>
               </a:ext>
             </a:extLst>
           </p:cNvPr>
@@ -1680,7 +1686,7 @@
           <p:cNvPr id="6" name="投影片編號版面配置區 5">
             <a:extLst>
               <a:ext uri="{FF2B5EF4-FFF2-40B4-BE49-F238E27FC236}">
-                <a16:creationId xmlns:a16="http://schemas.microsoft.com/office/drawing/2014/main" xmlns="" id="{F592E68C-AEE0-D84B-8844-7CF5E83647F7}"/>
+                <a16:creationId xmlns="" xmlns:a16="http://schemas.microsoft.com/office/drawing/2014/main" id="{F592E68C-AEE0-D84B-8844-7CF5E83647F7}"/>
               </a:ext>
             </a:extLst>
           </p:cNvPr>
@@ -1709,7 +1715,7 @@
           <p:cNvPr id="7" name="圖片 6">
             <a:extLst>
               <a:ext uri="{FF2B5EF4-FFF2-40B4-BE49-F238E27FC236}">
-                <a16:creationId xmlns:a16="http://schemas.microsoft.com/office/drawing/2014/main" xmlns="" id="{CFC0D688-7C0C-F240-82D7-136060E3079C}"/>
+                <a16:creationId xmlns="" xmlns:a16="http://schemas.microsoft.com/office/drawing/2014/main" id="{CFC0D688-7C0C-F240-82D7-136060E3079C}"/>
               </a:ext>
             </a:extLst>
           </p:cNvPr>
@@ -1877,7 +1883,7 @@
           <a:p>
             <a:fld id="{75F8934F-7F83-1046-9341-02CE27D9104D}" type="datetimeFigureOut">
               <a:rPr kumimoji="1" lang="zh-TW" altLang="en-US" smtClean="0"/>
-              <a:t>2020/2/6</a:t>
+              <a:t>2020/2/12</a:t>
             </a:fld>
             <a:endParaRPr kumimoji="1" lang="zh-TW" altLang="en-US"/>
           </a:p>
@@ -1999,7 +2005,7 @@
           <p:cNvPr id="10" name="圖片 9">
             <a:extLst>
               <a:ext uri="{FF2B5EF4-FFF2-40B4-BE49-F238E27FC236}">
-                <a16:creationId xmlns:a16="http://schemas.microsoft.com/office/drawing/2014/main" xmlns="" id="{5E0EAD78-AEC6-AB45-A710-DD47E43CBB16}"/>
+                <a16:creationId xmlns="" xmlns:a16="http://schemas.microsoft.com/office/drawing/2014/main" id="{5E0EAD78-AEC6-AB45-A710-DD47E43CBB16}"/>
               </a:ext>
             </a:extLst>
           </p:cNvPr>
@@ -2118,7 +2124,7 @@
           <a:p>
             <a:fld id="{75F8934F-7F83-1046-9341-02CE27D9104D}" type="datetimeFigureOut">
               <a:rPr kumimoji="1" lang="zh-TW" altLang="en-US" smtClean="0"/>
-              <a:t>2020/2/6</a:t>
+              <a:t>2020/2/12</a:t>
             </a:fld>
             <a:endParaRPr kumimoji="1" lang="zh-TW" altLang="en-US"/>
           </a:p>
@@ -2542,7 +2548,7 @@
           <p:cNvPr id="17" name="內容版面配置區 2">
             <a:extLst>
               <a:ext uri="{FF2B5EF4-FFF2-40B4-BE49-F238E27FC236}">
-                <a16:creationId xmlns:a16="http://schemas.microsoft.com/office/drawing/2014/main" xmlns="" id="{DB7FC4C6-C26F-214E-B2D6-C9ED5E2BD195}"/>
+                <a16:creationId xmlns="" xmlns:a16="http://schemas.microsoft.com/office/drawing/2014/main" id="{DB7FC4C6-C26F-214E-B2D6-C9ED5E2BD195}"/>
               </a:ext>
             </a:extLst>
           </p:cNvPr>
@@ -2634,7 +2640,7 @@
           <p:cNvPr id="18" name="內容版面配置區 2">
             <a:extLst>
               <a:ext uri="{FF2B5EF4-FFF2-40B4-BE49-F238E27FC236}">
-                <a16:creationId xmlns:a16="http://schemas.microsoft.com/office/drawing/2014/main" xmlns="" id="{DB7FC4C6-C26F-214E-B2D6-C9ED5E2BD195}"/>
+                <a16:creationId xmlns="" xmlns:a16="http://schemas.microsoft.com/office/drawing/2014/main" id="{DB7FC4C6-C26F-214E-B2D6-C9ED5E2BD195}"/>
               </a:ext>
             </a:extLst>
           </p:cNvPr>
@@ -2726,7 +2732,7 @@
           <p:cNvPr id="19" name="內容版面配置區 2">
             <a:extLst>
               <a:ext uri="{FF2B5EF4-FFF2-40B4-BE49-F238E27FC236}">
-                <a16:creationId xmlns:a16="http://schemas.microsoft.com/office/drawing/2014/main" xmlns="" id="{DB7FC4C6-C26F-214E-B2D6-C9ED5E2BD195}"/>
+                <a16:creationId xmlns="" xmlns:a16="http://schemas.microsoft.com/office/drawing/2014/main" id="{DB7FC4C6-C26F-214E-B2D6-C9ED5E2BD195}"/>
               </a:ext>
             </a:extLst>
           </p:cNvPr>
@@ -2818,7 +2824,7 @@
           <p:cNvPr id="20" name="內容版面配置區 2">
             <a:extLst>
               <a:ext uri="{FF2B5EF4-FFF2-40B4-BE49-F238E27FC236}">
-                <a16:creationId xmlns:a16="http://schemas.microsoft.com/office/drawing/2014/main" xmlns="" id="{DB7FC4C6-C26F-214E-B2D6-C9ED5E2BD195}"/>
+                <a16:creationId xmlns="" xmlns:a16="http://schemas.microsoft.com/office/drawing/2014/main" id="{DB7FC4C6-C26F-214E-B2D6-C9ED5E2BD195}"/>
               </a:ext>
             </a:extLst>
           </p:cNvPr>
@@ -2910,7 +2916,7 @@
           <p:cNvPr id="21" name="內容版面配置區 2">
             <a:extLst>
               <a:ext uri="{FF2B5EF4-FFF2-40B4-BE49-F238E27FC236}">
-                <a16:creationId xmlns:a16="http://schemas.microsoft.com/office/drawing/2014/main" xmlns="" id="{DB7FC4C6-C26F-214E-B2D6-C9ED5E2BD195}"/>
+                <a16:creationId xmlns="" xmlns:a16="http://schemas.microsoft.com/office/drawing/2014/main" id="{DB7FC4C6-C26F-214E-B2D6-C9ED5E2BD195}"/>
               </a:ext>
             </a:extLst>
           </p:cNvPr>
@@ -3002,7 +3008,7 @@
           <p:cNvPr id="22" name="內容版面配置區 2">
             <a:extLst>
               <a:ext uri="{FF2B5EF4-FFF2-40B4-BE49-F238E27FC236}">
-                <a16:creationId xmlns:a16="http://schemas.microsoft.com/office/drawing/2014/main" xmlns="" id="{DB7FC4C6-C26F-214E-B2D6-C9ED5E2BD195}"/>
+                <a16:creationId xmlns="" xmlns:a16="http://schemas.microsoft.com/office/drawing/2014/main" id="{DB7FC4C6-C26F-214E-B2D6-C9ED5E2BD195}"/>
               </a:ext>
             </a:extLst>
           </p:cNvPr>
@@ -3217,7 +3223,7 @@
           <a:p>
             <a:fld id="{75F8934F-7F83-1046-9341-02CE27D9104D}" type="datetimeFigureOut">
               <a:rPr kumimoji="1" lang="zh-TW" altLang="en-US" smtClean="0"/>
-              <a:t>2020/2/6</a:t>
+              <a:t>2020/2/12</a:t>
             </a:fld>
             <a:endParaRPr kumimoji="1" lang="zh-TW" altLang="en-US"/>
           </a:p>
@@ -3606,7 +3612,7 @@
           <p:cNvPr id="13" name="內容版面配置區 2">
             <a:extLst>
               <a:ext uri="{FF2B5EF4-FFF2-40B4-BE49-F238E27FC236}">
-                <a16:creationId xmlns:a16="http://schemas.microsoft.com/office/drawing/2014/main" xmlns="" id="{DB7FC4C6-C26F-214E-B2D6-C9ED5E2BD195}"/>
+                <a16:creationId xmlns="" xmlns:a16="http://schemas.microsoft.com/office/drawing/2014/main" id="{DB7FC4C6-C26F-214E-B2D6-C9ED5E2BD195}"/>
               </a:ext>
             </a:extLst>
           </p:cNvPr>
@@ -3698,7 +3704,7 @@
           <p:cNvPr id="15" name="內容版面配置區 2">
             <a:extLst>
               <a:ext uri="{FF2B5EF4-FFF2-40B4-BE49-F238E27FC236}">
-                <a16:creationId xmlns:a16="http://schemas.microsoft.com/office/drawing/2014/main" xmlns="" id="{DB7FC4C6-C26F-214E-B2D6-C9ED5E2BD195}"/>
+                <a16:creationId xmlns="" xmlns:a16="http://schemas.microsoft.com/office/drawing/2014/main" id="{DB7FC4C6-C26F-214E-B2D6-C9ED5E2BD195}"/>
               </a:ext>
             </a:extLst>
           </p:cNvPr>
@@ -3790,7 +3796,7 @@
           <p:cNvPr id="16" name="內容版面配置區 2">
             <a:extLst>
               <a:ext uri="{FF2B5EF4-FFF2-40B4-BE49-F238E27FC236}">
-                <a16:creationId xmlns:a16="http://schemas.microsoft.com/office/drawing/2014/main" xmlns="" id="{DB7FC4C6-C26F-214E-B2D6-C9ED5E2BD195}"/>
+                <a16:creationId xmlns="" xmlns:a16="http://schemas.microsoft.com/office/drawing/2014/main" id="{DB7FC4C6-C26F-214E-B2D6-C9ED5E2BD195}"/>
               </a:ext>
             </a:extLst>
           </p:cNvPr>
@@ -3882,7 +3888,7 @@
           <p:cNvPr id="17" name="內容版面配置區 2">
             <a:extLst>
               <a:ext uri="{FF2B5EF4-FFF2-40B4-BE49-F238E27FC236}">
-                <a16:creationId xmlns:a16="http://schemas.microsoft.com/office/drawing/2014/main" xmlns="" id="{DB7FC4C6-C26F-214E-B2D6-C9ED5E2BD195}"/>
+                <a16:creationId xmlns="" xmlns:a16="http://schemas.microsoft.com/office/drawing/2014/main" id="{DB7FC4C6-C26F-214E-B2D6-C9ED5E2BD195}"/>
               </a:ext>
             </a:extLst>
           </p:cNvPr>
@@ -3974,7 +3980,7 @@
           <p:cNvPr id="18" name="內容版面配置區 2">
             <a:extLst>
               <a:ext uri="{FF2B5EF4-FFF2-40B4-BE49-F238E27FC236}">
-                <a16:creationId xmlns:a16="http://schemas.microsoft.com/office/drawing/2014/main" xmlns="" id="{DB7FC4C6-C26F-214E-B2D6-C9ED5E2BD195}"/>
+                <a16:creationId xmlns="" xmlns:a16="http://schemas.microsoft.com/office/drawing/2014/main" id="{DB7FC4C6-C26F-214E-B2D6-C9ED5E2BD195}"/>
               </a:ext>
             </a:extLst>
           </p:cNvPr>
@@ -4066,7 +4072,7 @@
           <p:cNvPr id="19" name="內容版面配置區 2">
             <a:extLst>
               <a:ext uri="{FF2B5EF4-FFF2-40B4-BE49-F238E27FC236}">
-                <a16:creationId xmlns:a16="http://schemas.microsoft.com/office/drawing/2014/main" xmlns="" id="{DB7FC4C6-C26F-214E-B2D6-C9ED5E2BD195}"/>
+                <a16:creationId xmlns="" xmlns:a16="http://schemas.microsoft.com/office/drawing/2014/main" id="{DB7FC4C6-C26F-214E-B2D6-C9ED5E2BD195}"/>
               </a:ext>
             </a:extLst>
           </p:cNvPr>
@@ -4188,7 +4194,7 @@
           <p:cNvPr id="2" name="標題 1">
             <a:extLst>
               <a:ext uri="{FF2B5EF4-FFF2-40B4-BE49-F238E27FC236}">
-                <a16:creationId xmlns:a16="http://schemas.microsoft.com/office/drawing/2014/main" xmlns="" id="{AA60FC08-DB42-1443-B1D9-594B0DFFD819}"/>
+                <a16:creationId xmlns="" xmlns:a16="http://schemas.microsoft.com/office/drawing/2014/main" id="{AA60FC08-DB42-1443-B1D9-594B0DFFD819}"/>
               </a:ext>
             </a:extLst>
           </p:cNvPr>
@@ -4233,7 +4239,7 @@
           <p:cNvPr id="3" name="內容版面配置區 2">
             <a:extLst>
               <a:ext uri="{FF2B5EF4-FFF2-40B4-BE49-F238E27FC236}">
-                <a16:creationId xmlns:a16="http://schemas.microsoft.com/office/drawing/2014/main" xmlns="" id="{71BB2DE9-F9EC-0747-8110-57B6F42C6240}"/>
+                <a16:creationId xmlns="" xmlns:a16="http://schemas.microsoft.com/office/drawing/2014/main" id="{71BB2DE9-F9EC-0747-8110-57B6F42C6240}"/>
               </a:ext>
             </a:extLst>
           </p:cNvPr>
@@ -4341,7 +4347,7 @@
           <p:cNvPr id="4" name="日期版面配置區 3">
             <a:extLst>
               <a:ext uri="{FF2B5EF4-FFF2-40B4-BE49-F238E27FC236}">
-                <a16:creationId xmlns:a16="http://schemas.microsoft.com/office/drawing/2014/main" xmlns="" id="{6BA98535-4AD5-2846-9F28-9D341D2CBD82}"/>
+                <a16:creationId xmlns="" xmlns:a16="http://schemas.microsoft.com/office/drawing/2014/main" id="{6BA98535-4AD5-2846-9F28-9D341D2CBD82}"/>
               </a:ext>
             </a:extLst>
           </p:cNvPr>
@@ -4359,7 +4365,7 @@
           <a:p>
             <a:fld id="{75F8934F-7F83-1046-9341-02CE27D9104D}" type="datetimeFigureOut">
               <a:rPr kumimoji="1" lang="zh-TW" altLang="en-US" smtClean="0"/>
-              <a:t>2020/2/6</a:t>
+              <a:t>2020/2/12</a:t>
             </a:fld>
             <a:endParaRPr kumimoji="1" lang="zh-TW" altLang="en-US"/>
           </a:p>
@@ -4370,7 +4376,7 @@
           <p:cNvPr id="5" name="頁尾版面配置區 4">
             <a:extLst>
               <a:ext uri="{FF2B5EF4-FFF2-40B4-BE49-F238E27FC236}">
-                <a16:creationId xmlns:a16="http://schemas.microsoft.com/office/drawing/2014/main" xmlns="" id="{E4EAEED7-0802-7145-8C6C-66F66C8C1782}"/>
+                <a16:creationId xmlns="" xmlns:a16="http://schemas.microsoft.com/office/drawing/2014/main" id="{E4EAEED7-0802-7145-8C6C-66F66C8C1782}"/>
               </a:ext>
             </a:extLst>
           </p:cNvPr>
@@ -4395,7 +4401,7 @@
           <p:cNvPr id="6" name="投影片編號版面配置區 5">
             <a:extLst>
               <a:ext uri="{FF2B5EF4-FFF2-40B4-BE49-F238E27FC236}">
-                <a16:creationId xmlns:a16="http://schemas.microsoft.com/office/drawing/2014/main" xmlns="" id="{7D332B7E-1F76-A041-B6C6-AB635087BAB3}"/>
+                <a16:creationId xmlns="" xmlns:a16="http://schemas.microsoft.com/office/drawing/2014/main" id="{7D332B7E-1F76-A041-B6C6-AB635087BAB3}"/>
               </a:ext>
             </a:extLst>
           </p:cNvPr>
@@ -4424,7 +4430,7 @@
           <p:cNvPr id="7" name="矩形 6">
             <a:extLst>
               <a:ext uri="{FF2B5EF4-FFF2-40B4-BE49-F238E27FC236}">
-                <a16:creationId xmlns:a16="http://schemas.microsoft.com/office/drawing/2014/main" xmlns="" id="{C21960D3-0AC5-EE41-A19C-696161A1572E}"/>
+                <a16:creationId xmlns="" xmlns:a16="http://schemas.microsoft.com/office/drawing/2014/main" id="{C21960D3-0AC5-EE41-A19C-696161A1572E}"/>
               </a:ext>
             </a:extLst>
           </p:cNvPr>
@@ -4480,7 +4486,7 @@
           <p:cNvPr id="8" name="圖片 7">
             <a:extLst>
               <a:ext uri="{FF2B5EF4-FFF2-40B4-BE49-F238E27FC236}">
-                <a16:creationId xmlns:a16="http://schemas.microsoft.com/office/drawing/2014/main" xmlns="" id="{5E0EAD78-AEC6-AB45-A710-DD47E43CBB16}"/>
+                <a16:creationId xmlns="" xmlns:a16="http://schemas.microsoft.com/office/drawing/2014/main" id="{5E0EAD78-AEC6-AB45-A710-DD47E43CBB16}"/>
               </a:ext>
             </a:extLst>
           </p:cNvPr>
@@ -4516,7 +4522,7 @@
           <p:cNvPr id="9" name="矩形 8">
             <a:extLst>
               <a:ext uri="{FF2B5EF4-FFF2-40B4-BE49-F238E27FC236}">
-                <a16:creationId xmlns:a16="http://schemas.microsoft.com/office/drawing/2014/main" xmlns="" id="{387A2BAD-7558-A944-B806-7AEF1C4243D0}"/>
+                <a16:creationId xmlns="" xmlns:a16="http://schemas.microsoft.com/office/drawing/2014/main" id="{387A2BAD-7558-A944-B806-7AEF1C4243D0}"/>
               </a:ext>
             </a:extLst>
           </p:cNvPr>
@@ -4598,7 +4604,7 @@
           <p:cNvPr id="2" name="標題 1">
             <a:extLst>
               <a:ext uri="{FF2B5EF4-FFF2-40B4-BE49-F238E27FC236}">
-                <a16:creationId xmlns:a16="http://schemas.microsoft.com/office/drawing/2014/main" xmlns="" id="{AA60FC08-DB42-1443-B1D9-594B0DFFD819}"/>
+                <a16:creationId xmlns="" xmlns:a16="http://schemas.microsoft.com/office/drawing/2014/main" id="{AA60FC08-DB42-1443-B1D9-594B0DFFD819}"/>
               </a:ext>
             </a:extLst>
           </p:cNvPr>
@@ -4643,7 +4649,7 @@
           <p:cNvPr id="3" name="內容版面配置區 2">
             <a:extLst>
               <a:ext uri="{FF2B5EF4-FFF2-40B4-BE49-F238E27FC236}">
-                <a16:creationId xmlns:a16="http://schemas.microsoft.com/office/drawing/2014/main" xmlns="" id="{71BB2DE9-F9EC-0747-8110-57B6F42C6240}"/>
+                <a16:creationId xmlns="" xmlns:a16="http://schemas.microsoft.com/office/drawing/2014/main" id="{71BB2DE9-F9EC-0747-8110-57B6F42C6240}"/>
               </a:ext>
             </a:extLst>
           </p:cNvPr>
@@ -4754,7 +4760,7 @@
           <p:cNvPr id="4" name="日期版面配置區 3">
             <a:extLst>
               <a:ext uri="{FF2B5EF4-FFF2-40B4-BE49-F238E27FC236}">
-                <a16:creationId xmlns:a16="http://schemas.microsoft.com/office/drawing/2014/main" xmlns="" id="{6BA98535-4AD5-2846-9F28-9D341D2CBD82}"/>
+                <a16:creationId xmlns="" xmlns:a16="http://schemas.microsoft.com/office/drawing/2014/main" id="{6BA98535-4AD5-2846-9F28-9D341D2CBD82}"/>
               </a:ext>
             </a:extLst>
           </p:cNvPr>
@@ -4772,7 +4778,7 @@
           <a:p>
             <a:fld id="{75F8934F-7F83-1046-9341-02CE27D9104D}" type="datetimeFigureOut">
               <a:rPr kumimoji="1" lang="zh-TW" altLang="en-US" smtClean="0"/>
-              <a:t>2020/2/6</a:t>
+              <a:t>2020/2/12</a:t>
             </a:fld>
             <a:endParaRPr kumimoji="1" lang="zh-TW" altLang="en-US"/>
           </a:p>
@@ -4783,7 +4789,7 @@
           <p:cNvPr id="5" name="頁尾版面配置區 4">
             <a:extLst>
               <a:ext uri="{FF2B5EF4-FFF2-40B4-BE49-F238E27FC236}">
-                <a16:creationId xmlns:a16="http://schemas.microsoft.com/office/drawing/2014/main" xmlns="" id="{E4EAEED7-0802-7145-8C6C-66F66C8C1782}"/>
+                <a16:creationId xmlns="" xmlns:a16="http://schemas.microsoft.com/office/drawing/2014/main" id="{E4EAEED7-0802-7145-8C6C-66F66C8C1782}"/>
               </a:ext>
             </a:extLst>
           </p:cNvPr>
@@ -4808,7 +4814,7 @@
           <p:cNvPr id="6" name="投影片編號版面配置區 5">
             <a:extLst>
               <a:ext uri="{FF2B5EF4-FFF2-40B4-BE49-F238E27FC236}">
-                <a16:creationId xmlns:a16="http://schemas.microsoft.com/office/drawing/2014/main" xmlns="" id="{7D332B7E-1F76-A041-B6C6-AB635087BAB3}"/>
+                <a16:creationId xmlns="" xmlns:a16="http://schemas.microsoft.com/office/drawing/2014/main" id="{7D332B7E-1F76-A041-B6C6-AB635087BAB3}"/>
               </a:ext>
             </a:extLst>
           </p:cNvPr>
@@ -4837,7 +4843,7 @@
           <p:cNvPr id="7" name="矩形 6">
             <a:extLst>
               <a:ext uri="{FF2B5EF4-FFF2-40B4-BE49-F238E27FC236}">
-                <a16:creationId xmlns:a16="http://schemas.microsoft.com/office/drawing/2014/main" xmlns="" id="{C21960D3-0AC5-EE41-A19C-696161A1572E}"/>
+                <a16:creationId xmlns="" xmlns:a16="http://schemas.microsoft.com/office/drawing/2014/main" id="{C21960D3-0AC5-EE41-A19C-696161A1572E}"/>
               </a:ext>
             </a:extLst>
           </p:cNvPr>
@@ -4893,7 +4899,7 @@
           <p:cNvPr id="8" name="圖片 7">
             <a:extLst>
               <a:ext uri="{FF2B5EF4-FFF2-40B4-BE49-F238E27FC236}">
-                <a16:creationId xmlns:a16="http://schemas.microsoft.com/office/drawing/2014/main" xmlns="" id="{5E0EAD78-AEC6-AB45-A710-DD47E43CBB16}"/>
+                <a16:creationId xmlns="" xmlns:a16="http://schemas.microsoft.com/office/drawing/2014/main" id="{5E0EAD78-AEC6-AB45-A710-DD47E43CBB16}"/>
               </a:ext>
             </a:extLst>
           </p:cNvPr>
@@ -4929,7 +4935,7 @@
           <p:cNvPr id="9" name="矩形 8">
             <a:extLst>
               <a:ext uri="{FF2B5EF4-FFF2-40B4-BE49-F238E27FC236}">
-                <a16:creationId xmlns:a16="http://schemas.microsoft.com/office/drawing/2014/main" xmlns="" id="{387A2BAD-7558-A944-B806-7AEF1C4243D0}"/>
+                <a16:creationId xmlns="" xmlns:a16="http://schemas.microsoft.com/office/drawing/2014/main" id="{387A2BAD-7558-A944-B806-7AEF1C4243D0}"/>
               </a:ext>
             </a:extLst>
           </p:cNvPr>
@@ -5011,7 +5017,7 @@
           <p:cNvPr id="2" name="標題 1">
             <a:extLst>
               <a:ext uri="{FF2B5EF4-FFF2-40B4-BE49-F238E27FC236}">
-                <a16:creationId xmlns:a16="http://schemas.microsoft.com/office/drawing/2014/main" xmlns="" id="{AA60FC08-DB42-1443-B1D9-594B0DFFD819}"/>
+                <a16:creationId xmlns="" xmlns:a16="http://schemas.microsoft.com/office/drawing/2014/main" id="{AA60FC08-DB42-1443-B1D9-594B0DFFD819}"/>
               </a:ext>
             </a:extLst>
           </p:cNvPr>
@@ -5056,7 +5062,7 @@
           <p:cNvPr id="3" name="內容版面配置區 2">
             <a:extLst>
               <a:ext uri="{FF2B5EF4-FFF2-40B4-BE49-F238E27FC236}">
-                <a16:creationId xmlns:a16="http://schemas.microsoft.com/office/drawing/2014/main" xmlns="" id="{71BB2DE9-F9EC-0747-8110-57B6F42C6240}"/>
+                <a16:creationId xmlns="" xmlns:a16="http://schemas.microsoft.com/office/drawing/2014/main" id="{71BB2DE9-F9EC-0747-8110-57B6F42C6240}"/>
               </a:ext>
             </a:extLst>
           </p:cNvPr>
@@ -5155,7 +5161,7 @@
           <p:cNvPr id="4" name="日期版面配置區 3">
             <a:extLst>
               <a:ext uri="{FF2B5EF4-FFF2-40B4-BE49-F238E27FC236}">
-                <a16:creationId xmlns:a16="http://schemas.microsoft.com/office/drawing/2014/main" xmlns="" id="{6BA98535-4AD5-2846-9F28-9D341D2CBD82}"/>
+                <a16:creationId xmlns="" xmlns:a16="http://schemas.microsoft.com/office/drawing/2014/main" id="{6BA98535-4AD5-2846-9F28-9D341D2CBD82}"/>
               </a:ext>
             </a:extLst>
           </p:cNvPr>
@@ -5173,7 +5179,7 @@
           <a:p>
             <a:fld id="{75F8934F-7F83-1046-9341-02CE27D9104D}" type="datetimeFigureOut">
               <a:rPr kumimoji="1" lang="zh-TW" altLang="en-US" smtClean="0"/>
-              <a:t>2020/2/6</a:t>
+              <a:t>2020/2/12</a:t>
             </a:fld>
             <a:endParaRPr kumimoji="1" lang="zh-TW" altLang="en-US"/>
           </a:p>
@@ -5184,7 +5190,7 @@
           <p:cNvPr id="5" name="頁尾版面配置區 4">
             <a:extLst>
               <a:ext uri="{FF2B5EF4-FFF2-40B4-BE49-F238E27FC236}">
-                <a16:creationId xmlns:a16="http://schemas.microsoft.com/office/drawing/2014/main" xmlns="" id="{E4EAEED7-0802-7145-8C6C-66F66C8C1782}"/>
+                <a16:creationId xmlns="" xmlns:a16="http://schemas.microsoft.com/office/drawing/2014/main" id="{E4EAEED7-0802-7145-8C6C-66F66C8C1782}"/>
               </a:ext>
             </a:extLst>
           </p:cNvPr>
@@ -5209,7 +5215,7 @@
           <p:cNvPr id="6" name="投影片編號版面配置區 5">
             <a:extLst>
               <a:ext uri="{FF2B5EF4-FFF2-40B4-BE49-F238E27FC236}">
-                <a16:creationId xmlns:a16="http://schemas.microsoft.com/office/drawing/2014/main" xmlns="" id="{7D332B7E-1F76-A041-B6C6-AB635087BAB3}"/>
+                <a16:creationId xmlns="" xmlns:a16="http://schemas.microsoft.com/office/drawing/2014/main" id="{7D332B7E-1F76-A041-B6C6-AB635087BAB3}"/>
               </a:ext>
             </a:extLst>
           </p:cNvPr>
@@ -5238,7 +5244,7 @@
           <p:cNvPr id="7" name="矩形 6">
             <a:extLst>
               <a:ext uri="{FF2B5EF4-FFF2-40B4-BE49-F238E27FC236}">
-                <a16:creationId xmlns:a16="http://schemas.microsoft.com/office/drawing/2014/main" xmlns="" id="{C21960D3-0AC5-EE41-A19C-696161A1572E}"/>
+                <a16:creationId xmlns="" xmlns:a16="http://schemas.microsoft.com/office/drawing/2014/main" id="{C21960D3-0AC5-EE41-A19C-696161A1572E}"/>
               </a:ext>
             </a:extLst>
           </p:cNvPr>
@@ -5294,7 +5300,7 @@
           <p:cNvPr id="8" name="圖片 7">
             <a:extLst>
               <a:ext uri="{FF2B5EF4-FFF2-40B4-BE49-F238E27FC236}">
-                <a16:creationId xmlns:a16="http://schemas.microsoft.com/office/drawing/2014/main" xmlns="" id="{5E0EAD78-AEC6-AB45-A710-DD47E43CBB16}"/>
+                <a16:creationId xmlns="" xmlns:a16="http://schemas.microsoft.com/office/drawing/2014/main" id="{5E0EAD78-AEC6-AB45-A710-DD47E43CBB16}"/>
               </a:ext>
             </a:extLst>
           </p:cNvPr>
@@ -5330,7 +5336,7 @@
           <p:cNvPr id="9" name="矩形 8">
             <a:extLst>
               <a:ext uri="{FF2B5EF4-FFF2-40B4-BE49-F238E27FC236}">
-                <a16:creationId xmlns:a16="http://schemas.microsoft.com/office/drawing/2014/main" xmlns="" id="{387A2BAD-7558-A944-B806-7AEF1C4243D0}"/>
+                <a16:creationId xmlns="" xmlns:a16="http://schemas.microsoft.com/office/drawing/2014/main" id="{387A2BAD-7558-A944-B806-7AEF1C4243D0}"/>
               </a:ext>
             </a:extLst>
           </p:cNvPr>
@@ -5412,7 +5418,7 @@
           <p:cNvPr id="2" name="標題 1">
             <a:extLst>
               <a:ext uri="{FF2B5EF4-FFF2-40B4-BE49-F238E27FC236}">
-                <a16:creationId xmlns:a16="http://schemas.microsoft.com/office/drawing/2014/main" xmlns="" id="{AA60FC08-DB42-1443-B1D9-594B0DFFD819}"/>
+                <a16:creationId xmlns="" xmlns:a16="http://schemas.microsoft.com/office/drawing/2014/main" id="{AA60FC08-DB42-1443-B1D9-594B0DFFD819}"/>
               </a:ext>
             </a:extLst>
           </p:cNvPr>
@@ -5457,7 +5463,7 @@
           <p:cNvPr id="3" name="內容版面配置區 2">
             <a:extLst>
               <a:ext uri="{FF2B5EF4-FFF2-40B4-BE49-F238E27FC236}">
-                <a16:creationId xmlns:a16="http://schemas.microsoft.com/office/drawing/2014/main" xmlns="" id="{71BB2DE9-F9EC-0747-8110-57B6F42C6240}"/>
+                <a16:creationId xmlns="" xmlns:a16="http://schemas.microsoft.com/office/drawing/2014/main" id="{71BB2DE9-F9EC-0747-8110-57B6F42C6240}"/>
               </a:ext>
             </a:extLst>
           </p:cNvPr>
@@ -5565,7 +5571,7 @@
           <p:cNvPr id="4" name="日期版面配置區 3">
             <a:extLst>
               <a:ext uri="{FF2B5EF4-FFF2-40B4-BE49-F238E27FC236}">
-                <a16:creationId xmlns:a16="http://schemas.microsoft.com/office/drawing/2014/main" xmlns="" id="{6BA98535-4AD5-2846-9F28-9D341D2CBD82}"/>
+                <a16:creationId xmlns="" xmlns:a16="http://schemas.microsoft.com/office/drawing/2014/main" id="{6BA98535-4AD5-2846-9F28-9D341D2CBD82}"/>
               </a:ext>
             </a:extLst>
           </p:cNvPr>
@@ -5583,7 +5589,7 @@
           <a:p>
             <a:fld id="{75F8934F-7F83-1046-9341-02CE27D9104D}" type="datetimeFigureOut">
               <a:rPr kumimoji="1" lang="zh-TW" altLang="en-US" smtClean="0"/>
-              <a:t>2020/2/6</a:t>
+              <a:t>2020/2/12</a:t>
             </a:fld>
             <a:endParaRPr kumimoji="1" lang="zh-TW" altLang="en-US"/>
           </a:p>
@@ -5594,7 +5600,7 @@
           <p:cNvPr id="5" name="頁尾版面配置區 4">
             <a:extLst>
               <a:ext uri="{FF2B5EF4-FFF2-40B4-BE49-F238E27FC236}">
-                <a16:creationId xmlns:a16="http://schemas.microsoft.com/office/drawing/2014/main" xmlns="" id="{E4EAEED7-0802-7145-8C6C-66F66C8C1782}"/>
+                <a16:creationId xmlns="" xmlns:a16="http://schemas.microsoft.com/office/drawing/2014/main" id="{E4EAEED7-0802-7145-8C6C-66F66C8C1782}"/>
               </a:ext>
             </a:extLst>
           </p:cNvPr>
@@ -5619,7 +5625,7 @@
           <p:cNvPr id="6" name="投影片編號版面配置區 5">
             <a:extLst>
               <a:ext uri="{FF2B5EF4-FFF2-40B4-BE49-F238E27FC236}">
-                <a16:creationId xmlns:a16="http://schemas.microsoft.com/office/drawing/2014/main" xmlns="" id="{7D332B7E-1F76-A041-B6C6-AB635087BAB3}"/>
+                <a16:creationId xmlns="" xmlns:a16="http://schemas.microsoft.com/office/drawing/2014/main" id="{7D332B7E-1F76-A041-B6C6-AB635087BAB3}"/>
               </a:ext>
             </a:extLst>
           </p:cNvPr>
@@ -5648,7 +5654,7 @@
           <p:cNvPr id="7" name="矩形 6">
             <a:extLst>
               <a:ext uri="{FF2B5EF4-FFF2-40B4-BE49-F238E27FC236}">
-                <a16:creationId xmlns:a16="http://schemas.microsoft.com/office/drawing/2014/main" xmlns="" id="{C21960D3-0AC5-EE41-A19C-696161A1572E}"/>
+                <a16:creationId xmlns="" xmlns:a16="http://schemas.microsoft.com/office/drawing/2014/main" id="{C21960D3-0AC5-EE41-A19C-696161A1572E}"/>
               </a:ext>
             </a:extLst>
           </p:cNvPr>
@@ -5704,7 +5710,7 @@
           <p:cNvPr id="8" name="圖片 7">
             <a:extLst>
               <a:ext uri="{FF2B5EF4-FFF2-40B4-BE49-F238E27FC236}">
-                <a16:creationId xmlns:a16="http://schemas.microsoft.com/office/drawing/2014/main" xmlns="" id="{5E0EAD78-AEC6-AB45-A710-DD47E43CBB16}"/>
+                <a16:creationId xmlns="" xmlns:a16="http://schemas.microsoft.com/office/drawing/2014/main" id="{5E0EAD78-AEC6-AB45-A710-DD47E43CBB16}"/>
               </a:ext>
             </a:extLst>
           </p:cNvPr>
@@ -5740,7 +5746,7 @@
           <p:cNvPr id="9" name="矩形 8">
             <a:extLst>
               <a:ext uri="{FF2B5EF4-FFF2-40B4-BE49-F238E27FC236}">
-                <a16:creationId xmlns:a16="http://schemas.microsoft.com/office/drawing/2014/main" xmlns="" id="{387A2BAD-7558-A944-B806-7AEF1C4243D0}"/>
+                <a16:creationId xmlns="" xmlns:a16="http://schemas.microsoft.com/office/drawing/2014/main" id="{387A2BAD-7558-A944-B806-7AEF1C4243D0}"/>
               </a:ext>
             </a:extLst>
           </p:cNvPr>
@@ -5792,7 +5798,7 @@
           <p:cNvPr id="10" name="內容版面配置區 2">
             <a:extLst>
               <a:ext uri="{FF2B5EF4-FFF2-40B4-BE49-F238E27FC236}">
-                <a16:creationId xmlns:a16="http://schemas.microsoft.com/office/drawing/2014/main" xmlns="" id="{71BB2DE9-F9EC-0747-8110-57B6F42C6240}"/>
+                <a16:creationId xmlns="" xmlns:a16="http://schemas.microsoft.com/office/drawing/2014/main" id="{71BB2DE9-F9EC-0747-8110-57B6F42C6240}"/>
               </a:ext>
             </a:extLst>
           </p:cNvPr>
@@ -5930,7 +5936,7 @@
           <p:cNvPr id="2" name="標題 1">
             <a:extLst>
               <a:ext uri="{FF2B5EF4-FFF2-40B4-BE49-F238E27FC236}">
-                <a16:creationId xmlns:a16="http://schemas.microsoft.com/office/drawing/2014/main" xmlns="" id="{AA60FC08-DB42-1443-B1D9-594B0DFFD819}"/>
+                <a16:creationId xmlns="" xmlns:a16="http://schemas.microsoft.com/office/drawing/2014/main" id="{AA60FC08-DB42-1443-B1D9-594B0DFFD819}"/>
               </a:ext>
             </a:extLst>
           </p:cNvPr>
@@ -5975,7 +5981,7 @@
           <p:cNvPr id="3" name="內容版面配置區 2">
             <a:extLst>
               <a:ext uri="{FF2B5EF4-FFF2-40B4-BE49-F238E27FC236}">
-                <a16:creationId xmlns:a16="http://schemas.microsoft.com/office/drawing/2014/main" xmlns="" id="{71BB2DE9-F9EC-0747-8110-57B6F42C6240}"/>
+                <a16:creationId xmlns="" xmlns:a16="http://schemas.microsoft.com/office/drawing/2014/main" id="{71BB2DE9-F9EC-0747-8110-57B6F42C6240}"/>
               </a:ext>
             </a:extLst>
           </p:cNvPr>
@@ -6086,7 +6092,7 @@
           <p:cNvPr id="4" name="日期版面配置區 3">
             <a:extLst>
               <a:ext uri="{FF2B5EF4-FFF2-40B4-BE49-F238E27FC236}">
-                <a16:creationId xmlns:a16="http://schemas.microsoft.com/office/drawing/2014/main" xmlns="" id="{6BA98535-4AD5-2846-9F28-9D341D2CBD82}"/>
+                <a16:creationId xmlns="" xmlns:a16="http://schemas.microsoft.com/office/drawing/2014/main" id="{6BA98535-4AD5-2846-9F28-9D341D2CBD82}"/>
               </a:ext>
             </a:extLst>
           </p:cNvPr>
@@ -6104,7 +6110,7 @@
           <a:p>
             <a:fld id="{75F8934F-7F83-1046-9341-02CE27D9104D}" type="datetimeFigureOut">
               <a:rPr kumimoji="1" lang="zh-TW" altLang="en-US" smtClean="0"/>
-              <a:t>2020/2/6</a:t>
+              <a:t>2020/2/12</a:t>
             </a:fld>
             <a:endParaRPr kumimoji="1" lang="zh-TW" altLang="en-US"/>
           </a:p>
@@ -6115,7 +6121,7 @@
           <p:cNvPr id="5" name="頁尾版面配置區 4">
             <a:extLst>
               <a:ext uri="{FF2B5EF4-FFF2-40B4-BE49-F238E27FC236}">
-                <a16:creationId xmlns:a16="http://schemas.microsoft.com/office/drawing/2014/main" xmlns="" id="{E4EAEED7-0802-7145-8C6C-66F66C8C1782}"/>
+                <a16:creationId xmlns="" xmlns:a16="http://schemas.microsoft.com/office/drawing/2014/main" id="{E4EAEED7-0802-7145-8C6C-66F66C8C1782}"/>
               </a:ext>
             </a:extLst>
           </p:cNvPr>
@@ -6140,7 +6146,7 @@
           <p:cNvPr id="6" name="投影片編號版面配置區 5">
             <a:extLst>
               <a:ext uri="{FF2B5EF4-FFF2-40B4-BE49-F238E27FC236}">
-                <a16:creationId xmlns:a16="http://schemas.microsoft.com/office/drawing/2014/main" xmlns="" id="{7D332B7E-1F76-A041-B6C6-AB635087BAB3}"/>
+                <a16:creationId xmlns="" xmlns:a16="http://schemas.microsoft.com/office/drawing/2014/main" id="{7D332B7E-1F76-A041-B6C6-AB635087BAB3}"/>
               </a:ext>
             </a:extLst>
           </p:cNvPr>
@@ -6169,7 +6175,7 @@
           <p:cNvPr id="7" name="矩形 6">
             <a:extLst>
               <a:ext uri="{FF2B5EF4-FFF2-40B4-BE49-F238E27FC236}">
-                <a16:creationId xmlns:a16="http://schemas.microsoft.com/office/drawing/2014/main" xmlns="" id="{C21960D3-0AC5-EE41-A19C-696161A1572E}"/>
+                <a16:creationId xmlns="" xmlns:a16="http://schemas.microsoft.com/office/drawing/2014/main" id="{C21960D3-0AC5-EE41-A19C-696161A1572E}"/>
               </a:ext>
             </a:extLst>
           </p:cNvPr>
@@ -6225,7 +6231,7 @@
           <p:cNvPr id="8" name="圖片 7">
             <a:extLst>
               <a:ext uri="{FF2B5EF4-FFF2-40B4-BE49-F238E27FC236}">
-                <a16:creationId xmlns:a16="http://schemas.microsoft.com/office/drawing/2014/main" xmlns="" id="{5E0EAD78-AEC6-AB45-A710-DD47E43CBB16}"/>
+                <a16:creationId xmlns="" xmlns:a16="http://schemas.microsoft.com/office/drawing/2014/main" id="{5E0EAD78-AEC6-AB45-A710-DD47E43CBB16}"/>
               </a:ext>
             </a:extLst>
           </p:cNvPr>
@@ -6261,7 +6267,7 @@
           <p:cNvPr id="9" name="矩形 8">
             <a:extLst>
               <a:ext uri="{FF2B5EF4-FFF2-40B4-BE49-F238E27FC236}">
-                <a16:creationId xmlns:a16="http://schemas.microsoft.com/office/drawing/2014/main" xmlns="" id="{387A2BAD-7558-A944-B806-7AEF1C4243D0}"/>
+                <a16:creationId xmlns="" xmlns:a16="http://schemas.microsoft.com/office/drawing/2014/main" id="{387A2BAD-7558-A944-B806-7AEF1C4243D0}"/>
               </a:ext>
             </a:extLst>
           </p:cNvPr>
@@ -6313,7 +6319,7 @@
           <p:cNvPr id="10" name="內容版面配置區 2">
             <a:extLst>
               <a:ext uri="{FF2B5EF4-FFF2-40B4-BE49-F238E27FC236}">
-                <a16:creationId xmlns:a16="http://schemas.microsoft.com/office/drawing/2014/main" xmlns="" id="{71BB2DE9-F9EC-0747-8110-57B6F42C6240}"/>
+                <a16:creationId xmlns="" xmlns:a16="http://schemas.microsoft.com/office/drawing/2014/main" id="{71BB2DE9-F9EC-0747-8110-57B6F42C6240}"/>
               </a:ext>
             </a:extLst>
           </p:cNvPr>
@@ -6454,7 +6460,7 @@
           <p:cNvPr id="2" name="標題 1">
             <a:extLst>
               <a:ext uri="{FF2B5EF4-FFF2-40B4-BE49-F238E27FC236}">
-                <a16:creationId xmlns:a16="http://schemas.microsoft.com/office/drawing/2014/main" xmlns="" id="{AA60FC08-DB42-1443-B1D9-594B0DFFD819}"/>
+                <a16:creationId xmlns="" xmlns:a16="http://schemas.microsoft.com/office/drawing/2014/main" id="{AA60FC08-DB42-1443-B1D9-594B0DFFD819}"/>
               </a:ext>
             </a:extLst>
           </p:cNvPr>
@@ -6499,7 +6505,7 @@
           <p:cNvPr id="3" name="內容版面配置區 2">
             <a:extLst>
               <a:ext uri="{FF2B5EF4-FFF2-40B4-BE49-F238E27FC236}">
-                <a16:creationId xmlns:a16="http://schemas.microsoft.com/office/drawing/2014/main" xmlns="" id="{71BB2DE9-F9EC-0747-8110-57B6F42C6240}"/>
+                <a16:creationId xmlns="" xmlns:a16="http://schemas.microsoft.com/office/drawing/2014/main" id="{71BB2DE9-F9EC-0747-8110-57B6F42C6240}"/>
               </a:ext>
             </a:extLst>
           </p:cNvPr>
@@ -6598,7 +6604,7 @@
           <p:cNvPr id="4" name="日期版面配置區 3">
             <a:extLst>
               <a:ext uri="{FF2B5EF4-FFF2-40B4-BE49-F238E27FC236}">
-                <a16:creationId xmlns:a16="http://schemas.microsoft.com/office/drawing/2014/main" xmlns="" id="{6BA98535-4AD5-2846-9F28-9D341D2CBD82}"/>
+                <a16:creationId xmlns="" xmlns:a16="http://schemas.microsoft.com/office/drawing/2014/main" id="{6BA98535-4AD5-2846-9F28-9D341D2CBD82}"/>
               </a:ext>
             </a:extLst>
           </p:cNvPr>
@@ -6616,7 +6622,7 @@
           <a:p>
             <a:fld id="{75F8934F-7F83-1046-9341-02CE27D9104D}" type="datetimeFigureOut">
               <a:rPr kumimoji="1" lang="zh-TW" altLang="en-US" smtClean="0"/>
-              <a:t>2020/2/6</a:t>
+              <a:t>2020/2/12</a:t>
             </a:fld>
             <a:endParaRPr kumimoji="1" lang="zh-TW" altLang="en-US"/>
           </a:p>
@@ -6627,7 +6633,7 @@
           <p:cNvPr id="5" name="頁尾版面配置區 4">
             <a:extLst>
               <a:ext uri="{FF2B5EF4-FFF2-40B4-BE49-F238E27FC236}">
-                <a16:creationId xmlns:a16="http://schemas.microsoft.com/office/drawing/2014/main" xmlns="" id="{E4EAEED7-0802-7145-8C6C-66F66C8C1782}"/>
+                <a16:creationId xmlns="" xmlns:a16="http://schemas.microsoft.com/office/drawing/2014/main" id="{E4EAEED7-0802-7145-8C6C-66F66C8C1782}"/>
               </a:ext>
             </a:extLst>
           </p:cNvPr>
@@ -6652,7 +6658,7 @@
           <p:cNvPr id="6" name="投影片編號版面配置區 5">
             <a:extLst>
               <a:ext uri="{FF2B5EF4-FFF2-40B4-BE49-F238E27FC236}">
-                <a16:creationId xmlns:a16="http://schemas.microsoft.com/office/drawing/2014/main" xmlns="" id="{7D332B7E-1F76-A041-B6C6-AB635087BAB3}"/>
+                <a16:creationId xmlns="" xmlns:a16="http://schemas.microsoft.com/office/drawing/2014/main" id="{7D332B7E-1F76-A041-B6C6-AB635087BAB3}"/>
               </a:ext>
             </a:extLst>
           </p:cNvPr>
@@ -6681,7 +6687,7 @@
           <p:cNvPr id="7" name="矩形 6">
             <a:extLst>
               <a:ext uri="{FF2B5EF4-FFF2-40B4-BE49-F238E27FC236}">
-                <a16:creationId xmlns:a16="http://schemas.microsoft.com/office/drawing/2014/main" xmlns="" id="{C21960D3-0AC5-EE41-A19C-696161A1572E}"/>
+                <a16:creationId xmlns="" xmlns:a16="http://schemas.microsoft.com/office/drawing/2014/main" id="{C21960D3-0AC5-EE41-A19C-696161A1572E}"/>
               </a:ext>
             </a:extLst>
           </p:cNvPr>
@@ -6737,7 +6743,7 @@
           <p:cNvPr id="8" name="圖片 7">
             <a:extLst>
               <a:ext uri="{FF2B5EF4-FFF2-40B4-BE49-F238E27FC236}">
-                <a16:creationId xmlns:a16="http://schemas.microsoft.com/office/drawing/2014/main" xmlns="" id="{5E0EAD78-AEC6-AB45-A710-DD47E43CBB16}"/>
+                <a16:creationId xmlns="" xmlns:a16="http://schemas.microsoft.com/office/drawing/2014/main" id="{5E0EAD78-AEC6-AB45-A710-DD47E43CBB16}"/>
               </a:ext>
             </a:extLst>
           </p:cNvPr>
@@ -6773,7 +6779,7 @@
           <p:cNvPr id="9" name="矩形 8">
             <a:extLst>
               <a:ext uri="{FF2B5EF4-FFF2-40B4-BE49-F238E27FC236}">
-                <a16:creationId xmlns:a16="http://schemas.microsoft.com/office/drawing/2014/main" xmlns="" id="{387A2BAD-7558-A944-B806-7AEF1C4243D0}"/>
+                <a16:creationId xmlns="" xmlns:a16="http://schemas.microsoft.com/office/drawing/2014/main" id="{387A2BAD-7558-A944-B806-7AEF1C4243D0}"/>
               </a:ext>
             </a:extLst>
           </p:cNvPr>
@@ -6825,7 +6831,7 @@
           <p:cNvPr id="10" name="內容版面配置區 2">
             <a:extLst>
               <a:ext uri="{FF2B5EF4-FFF2-40B4-BE49-F238E27FC236}">
-                <a16:creationId xmlns:a16="http://schemas.microsoft.com/office/drawing/2014/main" xmlns="" id="{71BB2DE9-F9EC-0747-8110-57B6F42C6240}"/>
+                <a16:creationId xmlns="" xmlns:a16="http://schemas.microsoft.com/office/drawing/2014/main" id="{71BB2DE9-F9EC-0747-8110-57B6F42C6240}"/>
               </a:ext>
             </a:extLst>
           </p:cNvPr>
@@ -6954,7 +6960,7 @@
           <p:cNvPr id="2" name="標題 1">
             <a:extLst>
               <a:ext uri="{FF2B5EF4-FFF2-40B4-BE49-F238E27FC236}">
-                <a16:creationId xmlns:a16="http://schemas.microsoft.com/office/drawing/2014/main" xmlns="" id="{AA60FC08-DB42-1443-B1D9-594B0DFFD819}"/>
+                <a16:creationId xmlns="" xmlns:a16="http://schemas.microsoft.com/office/drawing/2014/main" id="{AA60FC08-DB42-1443-B1D9-594B0DFFD819}"/>
               </a:ext>
             </a:extLst>
           </p:cNvPr>
@@ -6999,7 +7005,7 @@
           <p:cNvPr id="3" name="內容版面配置區 2">
             <a:extLst>
               <a:ext uri="{FF2B5EF4-FFF2-40B4-BE49-F238E27FC236}">
-                <a16:creationId xmlns:a16="http://schemas.microsoft.com/office/drawing/2014/main" xmlns="" id="{71BB2DE9-F9EC-0747-8110-57B6F42C6240}"/>
+                <a16:creationId xmlns="" xmlns:a16="http://schemas.microsoft.com/office/drawing/2014/main" id="{71BB2DE9-F9EC-0747-8110-57B6F42C6240}"/>
               </a:ext>
             </a:extLst>
           </p:cNvPr>
@@ -7107,7 +7113,7 @@
           <p:cNvPr id="4" name="日期版面配置區 3">
             <a:extLst>
               <a:ext uri="{FF2B5EF4-FFF2-40B4-BE49-F238E27FC236}">
-                <a16:creationId xmlns:a16="http://schemas.microsoft.com/office/drawing/2014/main" xmlns="" id="{6BA98535-4AD5-2846-9F28-9D341D2CBD82}"/>
+                <a16:creationId xmlns="" xmlns:a16="http://schemas.microsoft.com/office/drawing/2014/main" id="{6BA98535-4AD5-2846-9F28-9D341D2CBD82}"/>
               </a:ext>
             </a:extLst>
           </p:cNvPr>
@@ -7125,7 +7131,7 @@
           <a:p>
             <a:fld id="{75F8934F-7F83-1046-9341-02CE27D9104D}" type="datetimeFigureOut">
               <a:rPr kumimoji="1" lang="zh-TW" altLang="en-US" smtClean="0"/>
-              <a:t>2020/2/6</a:t>
+              <a:t>2020/2/12</a:t>
             </a:fld>
             <a:endParaRPr kumimoji="1" lang="zh-TW" altLang="en-US"/>
           </a:p>
@@ -7136,7 +7142,7 @@
           <p:cNvPr id="5" name="頁尾版面配置區 4">
             <a:extLst>
               <a:ext uri="{FF2B5EF4-FFF2-40B4-BE49-F238E27FC236}">
-                <a16:creationId xmlns:a16="http://schemas.microsoft.com/office/drawing/2014/main" xmlns="" id="{E4EAEED7-0802-7145-8C6C-66F66C8C1782}"/>
+                <a16:creationId xmlns="" xmlns:a16="http://schemas.microsoft.com/office/drawing/2014/main" id="{E4EAEED7-0802-7145-8C6C-66F66C8C1782}"/>
               </a:ext>
             </a:extLst>
           </p:cNvPr>
@@ -7161,7 +7167,7 @@
           <p:cNvPr id="6" name="投影片編號版面配置區 5">
             <a:extLst>
               <a:ext uri="{FF2B5EF4-FFF2-40B4-BE49-F238E27FC236}">
-                <a16:creationId xmlns:a16="http://schemas.microsoft.com/office/drawing/2014/main" xmlns="" id="{7D332B7E-1F76-A041-B6C6-AB635087BAB3}"/>
+                <a16:creationId xmlns="" xmlns:a16="http://schemas.microsoft.com/office/drawing/2014/main" id="{7D332B7E-1F76-A041-B6C6-AB635087BAB3}"/>
               </a:ext>
             </a:extLst>
           </p:cNvPr>
@@ -7190,7 +7196,7 @@
           <p:cNvPr id="7" name="矩形 6">
             <a:extLst>
               <a:ext uri="{FF2B5EF4-FFF2-40B4-BE49-F238E27FC236}">
-                <a16:creationId xmlns:a16="http://schemas.microsoft.com/office/drawing/2014/main" xmlns="" id="{C21960D3-0AC5-EE41-A19C-696161A1572E}"/>
+                <a16:creationId xmlns="" xmlns:a16="http://schemas.microsoft.com/office/drawing/2014/main" id="{C21960D3-0AC5-EE41-A19C-696161A1572E}"/>
               </a:ext>
             </a:extLst>
           </p:cNvPr>
@@ -7246,7 +7252,7 @@
           <p:cNvPr id="8" name="圖片 7">
             <a:extLst>
               <a:ext uri="{FF2B5EF4-FFF2-40B4-BE49-F238E27FC236}">
-                <a16:creationId xmlns:a16="http://schemas.microsoft.com/office/drawing/2014/main" xmlns="" id="{5E0EAD78-AEC6-AB45-A710-DD47E43CBB16}"/>
+                <a16:creationId xmlns="" xmlns:a16="http://schemas.microsoft.com/office/drawing/2014/main" id="{5E0EAD78-AEC6-AB45-A710-DD47E43CBB16}"/>
               </a:ext>
             </a:extLst>
           </p:cNvPr>
@@ -7282,7 +7288,7 @@
           <p:cNvPr id="9" name="矩形 8">
             <a:extLst>
               <a:ext uri="{FF2B5EF4-FFF2-40B4-BE49-F238E27FC236}">
-                <a16:creationId xmlns:a16="http://schemas.microsoft.com/office/drawing/2014/main" xmlns="" id="{387A2BAD-7558-A944-B806-7AEF1C4243D0}"/>
+                <a16:creationId xmlns="" xmlns:a16="http://schemas.microsoft.com/office/drawing/2014/main" id="{387A2BAD-7558-A944-B806-7AEF1C4243D0}"/>
               </a:ext>
             </a:extLst>
           </p:cNvPr>
@@ -7334,7 +7340,7 @@
           <p:cNvPr id="10" name="內容版面配置區 2">
             <a:extLst>
               <a:ext uri="{FF2B5EF4-FFF2-40B4-BE49-F238E27FC236}">
-                <a16:creationId xmlns:a16="http://schemas.microsoft.com/office/drawing/2014/main" xmlns="" id="{71BB2DE9-F9EC-0747-8110-57B6F42C6240}"/>
+                <a16:creationId xmlns="" xmlns:a16="http://schemas.microsoft.com/office/drawing/2014/main" id="{71BB2DE9-F9EC-0747-8110-57B6F42C6240}"/>
               </a:ext>
             </a:extLst>
           </p:cNvPr>
@@ -7442,7 +7448,7 @@
           <p:cNvPr id="11" name="內容版面配置區 2">
             <a:extLst>
               <a:ext uri="{FF2B5EF4-FFF2-40B4-BE49-F238E27FC236}">
-                <a16:creationId xmlns:a16="http://schemas.microsoft.com/office/drawing/2014/main" xmlns="" id="{71BB2DE9-F9EC-0747-8110-57B6F42C6240}"/>
+                <a16:creationId xmlns="" xmlns:a16="http://schemas.microsoft.com/office/drawing/2014/main" id="{71BB2DE9-F9EC-0747-8110-57B6F42C6240}"/>
               </a:ext>
             </a:extLst>
           </p:cNvPr>
@@ -7550,7 +7556,7 @@
           <p:cNvPr id="12" name="內容版面配置區 2">
             <a:extLst>
               <a:ext uri="{FF2B5EF4-FFF2-40B4-BE49-F238E27FC236}">
-                <a16:creationId xmlns:a16="http://schemas.microsoft.com/office/drawing/2014/main" xmlns="" id="{71BB2DE9-F9EC-0747-8110-57B6F42C6240}"/>
+                <a16:creationId xmlns="" xmlns:a16="http://schemas.microsoft.com/office/drawing/2014/main" id="{71BB2DE9-F9EC-0747-8110-57B6F42C6240}"/>
               </a:ext>
             </a:extLst>
           </p:cNvPr>
@@ -7688,7 +7694,7 @@
           <p:cNvPr id="7" name="矩形 6">
             <a:extLst>
               <a:ext uri="{FF2B5EF4-FFF2-40B4-BE49-F238E27FC236}">
-                <a16:creationId xmlns:a16="http://schemas.microsoft.com/office/drawing/2014/main" xmlns="" id="{8A770271-AB73-DA4C-9664-09A28120DA97}"/>
+                <a16:creationId xmlns="" xmlns:a16="http://schemas.microsoft.com/office/drawing/2014/main" id="{8A770271-AB73-DA4C-9664-09A28120DA97}"/>
               </a:ext>
             </a:extLst>
           </p:cNvPr>
@@ -7740,7 +7746,7 @@
           <p:cNvPr id="2" name="標題 1">
             <a:extLst>
               <a:ext uri="{FF2B5EF4-FFF2-40B4-BE49-F238E27FC236}">
-                <a16:creationId xmlns:a16="http://schemas.microsoft.com/office/drawing/2014/main" xmlns="" id="{155A4563-E84E-2143-94D2-868ECA667901}"/>
+                <a16:creationId xmlns="" xmlns:a16="http://schemas.microsoft.com/office/drawing/2014/main" id="{155A4563-E84E-2143-94D2-868ECA667901}"/>
               </a:ext>
             </a:extLst>
           </p:cNvPr>
@@ -7785,7 +7791,7 @@
           <p:cNvPr id="3" name="副標題 2">
             <a:extLst>
               <a:ext uri="{FF2B5EF4-FFF2-40B4-BE49-F238E27FC236}">
-                <a16:creationId xmlns:a16="http://schemas.microsoft.com/office/drawing/2014/main" xmlns="" id="{01C11A57-485A-7843-90B7-CE4D3710822E}"/>
+                <a16:creationId xmlns="" xmlns:a16="http://schemas.microsoft.com/office/drawing/2014/main" id="{01C11A57-485A-7843-90B7-CE4D3710822E}"/>
               </a:ext>
             </a:extLst>
           </p:cNvPr>
@@ -7861,7 +7867,7 @@
           <p:cNvPr id="4" name="日期版面配置區 3">
             <a:extLst>
               <a:ext uri="{FF2B5EF4-FFF2-40B4-BE49-F238E27FC236}">
-                <a16:creationId xmlns:a16="http://schemas.microsoft.com/office/drawing/2014/main" xmlns="" id="{6FF04DFD-F863-024F-AB15-7DEB6ABDA713}"/>
+                <a16:creationId xmlns="" xmlns:a16="http://schemas.microsoft.com/office/drawing/2014/main" id="{6FF04DFD-F863-024F-AB15-7DEB6ABDA713}"/>
               </a:ext>
             </a:extLst>
           </p:cNvPr>
@@ -7879,7 +7885,7 @@
           <a:p>
             <a:fld id="{75F8934F-7F83-1046-9341-02CE27D9104D}" type="datetimeFigureOut">
               <a:rPr kumimoji="1" lang="zh-TW" altLang="en-US" smtClean="0"/>
-              <a:t>2020/2/6</a:t>
+              <a:t>2020/2/12</a:t>
             </a:fld>
             <a:endParaRPr kumimoji="1" lang="zh-TW" altLang="en-US"/>
           </a:p>
@@ -7890,7 +7896,7 @@
           <p:cNvPr id="5" name="頁尾版面配置區 4">
             <a:extLst>
               <a:ext uri="{FF2B5EF4-FFF2-40B4-BE49-F238E27FC236}">
-                <a16:creationId xmlns:a16="http://schemas.microsoft.com/office/drawing/2014/main" xmlns="" id="{C42252C1-473D-124E-AAFE-BBC473106861}"/>
+                <a16:creationId xmlns="" xmlns:a16="http://schemas.microsoft.com/office/drawing/2014/main" id="{C42252C1-473D-124E-AAFE-BBC473106861}"/>
               </a:ext>
             </a:extLst>
           </p:cNvPr>
@@ -7915,7 +7921,7 @@
           <p:cNvPr id="6" name="投影片編號版面配置區 5">
             <a:extLst>
               <a:ext uri="{FF2B5EF4-FFF2-40B4-BE49-F238E27FC236}">
-                <a16:creationId xmlns:a16="http://schemas.microsoft.com/office/drawing/2014/main" xmlns="" id="{871B4E1C-D0B1-194C-8D0D-EEB67A6B5AFE}"/>
+                <a16:creationId xmlns="" xmlns:a16="http://schemas.microsoft.com/office/drawing/2014/main" id="{871B4E1C-D0B1-194C-8D0D-EEB67A6B5AFE}"/>
               </a:ext>
             </a:extLst>
           </p:cNvPr>
@@ -7944,7 +7950,7 @@
           <p:cNvPr id="8" name="圖片 7">
             <a:extLst>
               <a:ext uri="{FF2B5EF4-FFF2-40B4-BE49-F238E27FC236}">
-                <a16:creationId xmlns:a16="http://schemas.microsoft.com/office/drawing/2014/main" xmlns="" id="{CFC0D688-7C0C-F240-82D7-136060E3079C}"/>
+                <a16:creationId xmlns="" xmlns:a16="http://schemas.microsoft.com/office/drawing/2014/main" id="{CFC0D688-7C0C-F240-82D7-136060E3079C}"/>
               </a:ext>
             </a:extLst>
           </p:cNvPr>
@@ -7980,7 +7986,7 @@
           <p:cNvPr id="10" name="文字版面配置區 9">
             <a:extLst>
               <a:ext uri="{FF2B5EF4-FFF2-40B4-BE49-F238E27FC236}">
-                <a16:creationId xmlns:a16="http://schemas.microsoft.com/office/drawing/2014/main" xmlns="" id="{541677EC-052B-1741-B92F-902A83DB4CDB}"/>
+                <a16:creationId xmlns="" xmlns:a16="http://schemas.microsoft.com/office/drawing/2014/main" id="{541677EC-052B-1741-B92F-902A83DB4CDB}"/>
               </a:ext>
             </a:extLst>
           </p:cNvPr>
@@ -8061,7 +8067,7 @@
           <p:cNvPr id="2" name="標題 1">
             <a:extLst>
               <a:ext uri="{FF2B5EF4-FFF2-40B4-BE49-F238E27FC236}">
-                <a16:creationId xmlns:a16="http://schemas.microsoft.com/office/drawing/2014/main" xmlns="" id="{AA60FC08-DB42-1443-B1D9-594B0DFFD819}"/>
+                <a16:creationId xmlns="" xmlns:a16="http://schemas.microsoft.com/office/drawing/2014/main" id="{AA60FC08-DB42-1443-B1D9-594B0DFFD819}"/>
               </a:ext>
             </a:extLst>
           </p:cNvPr>
@@ -8106,7 +8112,7 @@
           <p:cNvPr id="3" name="內容版面配置區 2">
             <a:extLst>
               <a:ext uri="{FF2B5EF4-FFF2-40B4-BE49-F238E27FC236}">
-                <a16:creationId xmlns:a16="http://schemas.microsoft.com/office/drawing/2014/main" xmlns="" id="{71BB2DE9-F9EC-0747-8110-57B6F42C6240}"/>
+                <a16:creationId xmlns="" xmlns:a16="http://schemas.microsoft.com/office/drawing/2014/main" id="{71BB2DE9-F9EC-0747-8110-57B6F42C6240}"/>
               </a:ext>
             </a:extLst>
           </p:cNvPr>
@@ -8217,7 +8223,7 @@
           <p:cNvPr id="4" name="日期版面配置區 3">
             <a:extLst>
               <a:ext uri="{FF2B5EF4-FFF2-40B4-BE49-F238E27FC236}">
-                <a16:creationId xmlns:a16="http://schemas.microsoft.com/office/drawing/2014/main" xmlns="" id="{6BA98535-4AD5-2846-9F28-9D341D2CBD82}"/>
+                <a16:creationId xmlns="" xmlns:a16="http://schemas.microsoft.com/office/drawing/2014/main" id="{6BA98535-4AD5-2846-9F28-9D341D2CBD82}"/>
               </a:ext>
             </a:extLst>
           </p:cNvPr>
@@ -8235,7 +8241,7 @@
           <a:p>
             <a:fld id="{75F8934F-7F83-1046-9341-02CE27D9104D}" type="datetimeFigureOut">
               <a:rPr kumimoji="1" lang="zh-TW" altLang="en-US" smtClean="0"/>
-              <a:t>2020/2/6</a:t>
+              <a:t>2020/2/12</a:t>
             </a:fld>
             <a:endParaRPr kumimoji="1" lang="zh-TW" altLang="en-US"/>
           </a:p>
@@ -8246,7 +8252,7 @@
           <p:cNvPr id="5" name="頁尾版面配置區 4">
             <a:extLst>
               <a:ext uri="{FF2B5EF4-FFF2-40B4-BE49-F238E27FC236}">
-                <a16:creationId xmlns:a16="http://schemas.microsoft.com/office/drawing/2014/main" xmlns="" id="{E4EAEED7-0802-7145-8C6C-66F66C8C1782}"/>
+                <a16:creationId xmlns="" xmlns:a16="http://schemas.microsoft.com/office/drawing/2014/main" id="{E4EAEED7-0802-7145-8C6C-66F66C8C1782}"/>
               </a:ext>
             </a:extLst>
           </p:cNvPr>
@@ -8271,7 +8277,7 @@
           <p:cNvPr id="6" name="投影片編號版面配置區 5">
             <a:extLst>
               <a:ext uri="{FF2B5EF4-FFF2-40B4-BE49-F238E27FC236}">
-                <a16:creationId xmlns:a16="http://schemas.microsoft.com/office/drawing/2014/main" xmlns="" id="{7D332B7E-1F76-A041-B6C6-AB635087BAB3}"/>
+                <a16:creationId xmlns="" xmlns:a16="http://schemas.microsoft.com/office/drawing/2014/main" id="{7D332B7E-1F76-A041-B6C6-AB635087BAB3}"/>
               </a:ext>
             </a:extLst>
           </p:cNvPr>
@@ -8300,7 +8306,7 @@
           <p:cNvPr id="7" name="矩形 6">
             <a:extLst>
               <a:ext uri="{FF2B5EF4-FFF2-40B4-BE49-F238E27FC236}">
-                <a16:creationId xmlns:a16="http://schemas.microsoft.com/office/drawing/2014/main" xmlns="" id="{C21960D3-0AC5-EE41-A19C-696161A1572E}"/>
+                <a16:creationId xmlns="" xmlns:a16="http://schemas.microsoft.com/office/drawing/2014/main" id="{C21960D3-0AC5-EE41-A19C-696161A1572E}"/>
               </a:ext>
             </a:extLst>
           </p:cNvPr>
@@ -8356,7 +8362,7 @@
           <p:cNvPr id="8" name="圖片 7">
             <a:extLst>
               <a:ext uri="{FF2B5EF4-FFF2-40B4-BE49-F238E27FC236}">
-                <a16:creationId xmlns:a16="http://schemas.microsoft.com/office/drawing/2014/main" xmlns="" id="{5E0EAD78-AEC6-AB45-A710-DD47E43CBB16}"/>
+                <a16:creationId xmlns="" xmlns:a16="http://schemas.microsoft.com/office/drawing/2014/main" id="{5E0EAD78-AEC6-AB45-A710-DD47E43CBB16}"/>
               </a:ext>
             </a:extLst>
           </p:cNvPr>
@@ -8392,7 +8398,7 @@
           <p:cNvPr id="9" name="矩形 8">
             <a:extLst>
               <a:ext uri="{FF2B5EF4-FFF2-40B4-BE49-F238E27FC236}">
-                <a16:creationId xmlns:a16="http://schemas.microsoft.com/office/drawing/2014/main" xmlns="" id="{387A2BAD-7558-A944-B806-7AEF1C4243D0}"/>
+                <a16:creationId xmlns="" xmlns:a16="http://schemas.microsoft.com/office/drawing/2014/main" id="{387A2BAD-7558-A944-B806-7AEF1C4243D0}"/>
               </a:ext>
             </a:extLst>
           </p:cNvPr>
@@ -8444,7 +8450,7 @@
           <p:cNvPr id="10" name="內容版面配置區 2">
             <a:extLst>
               <a:ext uri="{FF2B5EF4-FFF2-40B4-BE49-F238E27FC236}">
-                <a16:creationId xmlns:a16="http://schemas.microsoft.com/office/drawing/2014/main" xmlns="" id="{71BB2DE9-F9EC-0747-8110-57B6F42C6240}"/>
+                <a16:creationId xmlns="" xmlns:a16="http://schemas.microsoft.com/office/drawing/2014/main" id="{71BB2DE9-F9EC-0747-8110-57B6F42C6240}"/>
               </a:ext>
             </a:extLst>
           </p:cNvPr>
@@ -8555,7 +8561,7 @@
           <p:cNvPr id="11" name="內容版面配置區 2">
             <a:extLst>
               <a:ext uri="{FF2B5EF4-FFF2-40B4-BE49-F238E27FC236}">
-                <a16:creationId xmlns:a16="http://schemas.microsoft.com/office/drawing/2014/main" xmlns="" id="{71BB2DE9-F9EC-0747-8110-57B6F42C6240}"/>
+                <a16:creationId xmlns="" xmlns:a16="http://schemas.microsoft.com/office/drawing/2014/main" id="{71BB2DE9-F9EC-0747-8110-57B6F42C6240}"/>
               </a:ext>
             </a:extLst>
           </p:cNvPr>
@@ -8666,7 +8672,7 @@
           <p:cNvPr id="12" name="內容版面配置區 2">
             <a:extLst>
               <a:ext uri="{FF2B5EF4-FFF2-40B4-BE49-F238E27FC236}">
-                <a16:creationId xmlns:a16="http://schemas.microsoft.com/office/drawing/2014/main" xmlns="" id="{71BB2DE9-F9EC-0747-8110-57B6F42C6240}"/>
+                <a16:creationId xmlns="" xmlns:a16="http://schemas.microsoft.com/office/drawing/2014/main" id="{71BB2DE9-F9EC-0747-8110-57B6F42C6240}"/>
               </a:ext>
             </a:extLst>
           </p:cNvPr>
@@ -8807,7 +8813,7 @@
           <p:cNvPr id="2" name="標題 1">
             <a:extLst>
               <a:ext uri="{FF2B5EF4-FFF2-40B4-BE49-F238E27FC236}">
-                <a16:creationId xmlns:a16="http://schemas.microsoft.com/office/drawing/2014/main" xmlns="" id="{AA60FC08-DB42-1443-B1D9-594B0DFFD819}"/>
+                <a16:creationId xmlns="" xmlns:a16="http://schemas.microsoft.com/office/drawing/2014/main" id="{AA60FC08-DB42-1443-B1D9-594B0DFFD819}"/>
               </a:ext>
             </a:extLst>
           </p:cNvPr>
@@ -8852,7 +8858,7 @@
           <p:cNvPr id="3" name="內容版面配置區 2">
             <a:extLst>
               <a:ext uri="{FF2B5EF4-FFF2-40B4-BE49-F238E27FC236}">
-                <a16:creationId xmlns:a16="http://schemas.microsoft.com/office/drawing/2014/main" xmlns="" id="{71BB2DE9-F9EC-0747-8110-57B6F42C6240}"/>
+                <a16:creationId xmlns="" xmlns:a16="http://schemas.microsoft.com/office/drawing/2014/main" id="{71BB2DE9-F9EC-0747-8110-57B6F42C6240}"/>
               </a:ext>
             </a:extLst>
           </p:cNvPr>
@@ -8951,7 +8957,7 @@
           <p:cNvPr id="4" name="日期版面配置區 3">
             <a:extLst>
               <a:ext uri="{FF2B5EF4-FFF2-40B4-BE49-F238E27FC236}">
-                <a16:creationId xmlns:a16="http://schemas.microsoft.com/office/drawing/2014/main" xmlns="" id="{6BA98535-4AD5-2846-9F28-9D341D2CBD82}"/>
+                <a16:creationId xmlns="" xmlns:a16="http://schemas.microsoft.com/office/drawing/2014/main" id="{6BA98535-4AD5-2846-9F28-9D341D2CBD82}"/>
               </a:ext>
             </a:extLst>
           </p:cNvPr>
@@ -8969,7 +8975,7 @@
           <a:p>
             <a:fld id="{75F8934F-7F83-1046-9341-02CE27D9104D}" type="datetimeFigureOut">
               <a:rPr kumimoji="1" lang="zh-TW" altLang="en-US" smtClean="0"/>
-              <a:t>2020/2/6</a:t>
+              <a:t>2020/2/12</a:t>
             </a:fld>
             <a:endParaRPr kumimoji="1" lang="zh-TW" altLang="en-US"/>
           </a:p>
@@ -8980,7 +8986,7 @@
           <p:cNvPr id="5" name="頁尾版面配置區 4">
             <a:extLst>
               <a:ext uri="{FF2B5EF4-FFF2-40B4-BE49-F238E27FC236}">
-                <a16:creationId xmlns:a16="http://schemas.microsoft.com/office/drawing/2014/main" xmlns="" id="{E4EAEED7-0802-7145-8C6C-66F66C8C1782}"/>
+                <a16:creationId xmlns="" xmlns:a16="http://schemas.microsoft.com/office/drawing/2014/main" id="{E4EAEED7-0802-7145-8C6C-66F66C8C1782}"/>
               </a:ext>
             </a:extLst>
           </p:cNvPr>
@@ -9005,7 +9011,7 @@
           <p:cNvPr id="6" name="投影片編號版面配置區 5">
             <a:extLst>
               <a:ext uri="{FF2B5EF4-FFF2-40B4-BE49-F238E27FC236}">
-                <a16:creationId xmlns:a16="http://schemas.microsoft.com/office/drawing/2014/main" xmlns="" id="{7D332B7E-1F76-A041-B6C6-AB635087BAB3}"/>
+                <a16:creationId xmlns="" xmlns:a16="http://schemas.microsoft.com/office/drawing/2014/main" id="{7D332B7E-1F76-A041-B6C6-AB635087BAB3}"/>
               </a:ext>
             </a:extLst>
           </p:cNvPr>
@@ -9034,7 +9040,7 @@
           <p:cNvPr id="7" name="矩形 6">
             <a:extLst>
               <a:ext uri="{FF2B5EF4-FFF2-40B4-BE49-F238E27FC236}">
-                <a16:creationId xmlns:a16="http://schemas.microsoft.com/office/drawing/2014/main" xmlns="" id="{C21960D3-0AC5-EE41-A19C-696161A1572E}"/>
+                <a16:creationId xmlns="" xmlns:a16="http://schemas.microsoft.com/office/drawing/2014/main" id="{C21960D3-0AC5-EE41-A19C-696161A1572E}"/>
               </a:ext>
             </a:extLst>
           </p:cNvPr>
@@ -9090,7 +9096,7 @@
           <p:cNvPr id="8" name="圖片 7">
             <a:extLst>
               <a:ext uri="{FF2B5EF4-FFF2-40B4-BE49-F238E27FC236}">
-                <a16:creationId xmlns:a16="http://schemas.microsoft.com/office/drawing/2014/main" xmlns="" id="{5E0EAD78-AEC6-AB45-A710-DD47E43CBB16}"/>
+                <a16:creationId xmlns="" xmlns:a16="http://schemas.microsoft.com/office/drawing/2014/main" id="{5E0EAD78-AEC6-AB45-A710-DD47E43CBB16}"/>
               </a:ext>
             </a:extLst>
           </p:cNvPr>
@@ -9126,7 +9132,7 @@
           <p:cNvPr id="9" name="矩形 8">
             <a:extLst>
               <a:ext uri="{FF2B5EF4-FFF2-40B4-BE49-F238E27FC236}">
-                <a16:creationId xmlns:a16="http://schemas.microsoft.com/office/drawing/2014/main" xmlns="" id="{387A2BAD-7558-A944-B806-7AEF1C4243D0}"/>
+                <a16:creationId xmlns="" xmlns:a16="http://schemas.microsoft.com/office/drawing/2014/main" id="{387A2BAD-7558-A944-B806-7AEF1C4243D0}"/>
               </a:ext>
             </a:extLst>
           </p:cNvPr>
@@ -9178,7 +9184,7 @@
           <p:cNvPr id="10" name="內容版面配置區 2">
             <a:extLst>
               <a:ext uri="{FF2B5EF4-FFF2-40B4-BE49-F238E27FC236}">
-                <a16:creationId xmlns:a16="http://schemas.microsoft.com/office/drawing/2014/main" xmlns="" id="{71BB2DE9-F9EC-0747-8110-57B6F42C6240}"/>
+                <a16:creationId xmlns="" xmlns:a16="http://schemas.microsoft.com/office/drawing/2014/main" id="{71BB2DE9-F9EC-0747-8110-57B6F42C6240}"/>
               </a:ext>
             </a:extLst>
           </p:cNvPr>
@@ -9277,7 +9283,7 @@
           <p:cNvPr id="11" name="內容版面配置區 2">
             <a:extLst>
               <a:ext uri="{FF2B5EF4-FFF2-40B4-BE49-F238E27FC236}">
-                <a16:creationId xmlns:a16="http://schemas.microsoft.com/office/drawing/2014/main" xmlns="" id="{71BB2DE9-F9EC-0747-8110-57B6F42C6240}"/>
+                <a16:creationId xmlns="" xmlns:a16="http://schemas.microsoft.com/office/drawing/2014/main" id="{71BB2DE9-F9EC-0747-8110-57B6F42C6240}"/>
               </a:ext>
             </a:extLst>
           </p:cNvPr>
@@ -9376,7 +9382,7 @@
           <p:cNvPr id="12" name="內容版面配置區 2">
             <a:extLst>
               <a:ext uri="{FF2B5EF4-FFF2-40B4-BE49-F238E27FC236}">
-                <a16:creationId xmlns:a16="http://schemas.microsoft.com/office/drawing/2014/main" xmlns="" id="{71BB2DE9-F9EC-0747-8110-57B6F42C6240}"/>
+                <a16:creationId xmlns="" xmlns:a16="http://schemas.microsoft.com/office/drawing/2014/main" id="{71BB2DE9-F9EC-0747-8110-57B6F42C6240}"/>
               </a:ext>
             </a:extLst>
           </p:cNvPr>
@@ -9539,7 +9545,7 @@
           <a:p>
             <a:fld id="{75F8934F-7F83-1046-9341-02CE27D9104D}" type="datetimeFigureOut">
               <a:rPr kumimoji="1" lang="zh-TW" altLang="en-US" smtClean="0"/>
-              <a:t>2020/2/6</a:t>
+              <a:t>2020/2/12</a:t>
             </a:fld>
             <a:endParaRPr kumimoji="1" lang="zh-TW" altLang="en-US"/>
           </a:p>
@@ -9592,7 +9598,7 @@
           <p:cNvPr id="7" name="內容版面配置區 2">
             <a:extLst>
               <a:ext uri="{FF2B5EF4-FFF2-40B4-BE49-F238E27FC236}">
-                <a16:creationId xmlns:a16="http://schemas.microsoft.com/office/drawing/2014/main" xmlns="" id="{DB7FC4C6-C26F-214E-B2D6-C9ED5E2BD195}"/>
+                <a16:creationId xmlns="" xmlns:a16="http://schemas.microsoft.com/office/drawing/2014/main" id="{DB7FC4C6-C26F-214E-B2D6-C9ED5E2BD195}"/>
               </a:ext>
             </a:extLst>
           </p:cNvPr>
@@ -9654,7 +9660,7 @@
           <p:cNvPr id="8" name="矩形 7">
             <a:extLst>
               <a:ext uri="{FF2B5EF4-FFF2-40B4-BE49-F238E27FC236}">
-                <a16:creationId xmlns:a16="http://schemas.microsoft.com/office/drawing/2014/main" xmlns="" id="{C21960D3-0AC5-EE41-A19C-696161A1572E}"/>
+                <a16:creationId xmlns="" xmlns:a16="http://schemas.microsoft.com/office/drawing/2014/main" id="{C21960D3-0AC5-EE41-A19C-696161A1572E}"/>
               </a:ext>
             </a:extLst>
           </p:cNvPr>
@@ -9710,7 +9716,7 @@
           <p:cNvPr id="9" name="矩形 8">
             <a:extLst>
               <a:ext uri="{FF2B5EF4-FFF2-40B4-BE49-F238E27FC236}">
-                <a16:creationId xmlns:a16="http://schemas.microsoft.com/office/drawing/2014/main" xmlns="" id="{387A2BAD-7558-A944-B806-7AEF1C4243D0}"/>
+                <a16:creationId xmlns="" xmlns:a16="http://schemas.microsoft.com/office/drawing/2014/main" id="{387A2BAD-7558-A944-B806-7AEF1C4243D0}"/>
               </a:ext>
             </a:extLst>
           </p:cNvPr>
@@ -9762,7 +9768,7 @@
           <p:cNvPr id="10" name="圖片 9">
             <a:extLst>
               <a:ext uri="{FF2B5EF4-FFF2-40B4-BE49-F238E27FC236}">
-                <a16:creationId xmlns:a16="http://schemas.microsoft.com/office/drawing/2014/main" xmlns="" id="{5E0EAD78-AEC6-AB45-A710-DD47E43CBB16}"/>
+                <a16:creationId xmlns="" xmlns:a16="http://schemas.microsoft.com/office/drawing/2014/main" id="{5E0EAD78-AEC6-AB45-A710-DD47E43CBB16}"/>
               </a:ext>
             </a:extLst>
           </p:cNvPr>
@@ -9828,7 +9834,7 @@
           <p:cNvPr id="2" name="標題 1">
             <a:extLst>
               <a:ext uri="{FF2B5EF4-FFF2-40B4-BE49-F238E27FC236}">
-                <a16:creationId xmlns:a16="http://schemas.microsoft.com/office/drawing/2014/main" xmlns="" id="{979C6CD6-89CE-E846-934F-01618F2F117C}"/>
+                <a16:creationId xmlns="" xmlns:a16="http://schemas.microsoft.com/office/drawing/2014/main" id="{979C6CD6-89CE-E846-934F-01618F2F117C}"/>
               </a:ext>
             </a:extLst>
           </p:cNvPr>
@@ -9856,7 +9862,7 @@
           <p:cNvPr id="3" name="內容版面配置區 2">
             <a:extLst>
               <a:ext uri="{FF2B5EF4-FFF2-40B4-BE49-F238E27FC236}">
-                <a16:creationId xmlns:a16="http://schemas.microsoft.com/office/drawing/2014/main" xmlns="" id="{DB7FC4C6-C26F-214E-B2D6-C9ED5E2BD195}"/>
+                <a16:creationId xmlns="" xmlns:a16="http://schemas.microsoft.com/office/drawing/2014/main" id="{DB7FC4C6-C26F-214E-B2D6-C9ED5E2BD195}"/>
               </a:ext>
             </a:extLst>
           </p:cNvPr>
@@ -9918,7 +9924,7 @@
           <p:cNvPr id="4" name="內容版面配置區 3">
             <a:extLst>
               <a:ext uri="{FF2B5EF4-FFF2-40B4-BE49-F238E27FC236}">
-                <a16:creationId xmlns:a16="http://schemas.microsoft.com/office/drawing/2014/main" xmlns="" id="{DBED84A6-8329-9742-B24D-788F26DEA102}"/>
+                <a16:creationId xmlns="" xmlns:a16="http://schemas.microsoft.com/office/drawing/2014/main" id="{DBED84A6-8329-9742-B24D-788F26DEA102}"/>
               </a:ext>
             </a:extLst>
           </p:cNvPr>
@@ -9980,7 +9986,7 @@
           <p:cNvPr id="5" name="日期版面配置區 4">
             <a:extLst>
               <a:ext uri="{FF2B5EF4-FFF2-40B4-BE49-F238E27FC236}">
-                <a16:creationId xmlns:a16="http://schemas.microsoft.com/office/drawing/2014/main" xmlns="" id="{B9046B7C-39BE-4A4E-B699-9748D6DA088D}"/>
+                <a16:creationId xmlns="" xmlns:a16="http://schemas.microsoft.com/office/drawing/2014/main" id="{B9046B7C-39BE-4A4E-B699-9748D6DA088D}"/>
               </a:ext>
             </a:extLst>
           </p:cNvPr>
@@ -9998,7 +10004,7 @@
           <a:p>
             <a:fld id="{75F8934F-7F83-1046-9341-02CE27D9104D}" type="datetimeFigureOut">
               <a:rPr kumimoji="1" lang="zh-TW" altLang="en-US" smtClean="0"/>
-              <a:t>2020/2/6</a:t>
+              <a:t>2020/2/12</a:t>
             </a:fld>
             <a:endParaRPr kumimoji="1" lang="zh-TW" altLang="en-US"/>
           </a:p>
@@ -10009,7 +10015,7 @@
           <p:cNvPr id="6" name="頁尾版面配置區 5">
             <a:extLst>
               <a:ext uri="{FF2B5EF4-FFF2-40B4-BE49-F238E27FC236}">
-                <a16:creationId xmlns:a16="http://schemas.microsoft.com/office/drawing/2014/main" xmlns="" id="{1AD5E07B-3935-B144-8CAF-5251EF861FDA}"/>
+                <a16:creationId xmlns="" xmlns:a16="http://schemas.microsoft.com/office/drawing/2014/main" id="{1AD5E07B-3935-B144-8CAF-5251EF861FDA}"/>
               </a:ext>
             </a:extLst>
           </p:cNvPr>
@@ -10034,7 +10040,7 @@
           <p:cNvPr id="7" name="投影片編號版面配置區 6">
             <a:extLst>
               <a:ext uri="{FF2B5EF4-FFF2-40B4-BE49-F238E27FC236}">
-                <a16:creationId xmlns:a16="http://schemas.microsoft.com/office/drawing/2014/main" xmlns="" id="{C9A0C168-E66B-E24E-B30C-62EBA9A41007}"/>
+                <a16:creationId xmlns="" xmlns:a16="http://schemas.microsoft.com/office/drawing/2014/main" id="{C9A0C168-E66B-E24E-B30C-62EBA9A41007}"/>
               </a:ext>
             </a:extLst>
           </p:cNvPr>
@@ -10063,7 +10069,7 @@
           <p:cNvPr id="8" name="圖片 7">
             <a:extLst>
               <a:ext uri="{FF2B5EF4-FFF2-40B4-BE49-F238E27FC236}">
-                <a16:creationId xmlns:a16="http://schemas.microsoft.com/office/drawing/2014/main" xmlns="" id="{5E0EAD78-AEC6-AB45-A710-DD47E43CBB16}"/>
+                <a16:creationId xmlns="" xmlns:a16="http://schemas.microsoft.com/office/drawing/2014/main" id="{5E0EAD78-AEC6-AB45-A710-DD47E43CBB16}"/>
               </a:ext>
             </a:extLst>
           </p:cNvPr>
@@ -10099,7 +10105,7 @@
           <p:cNvPr id="9" name="矩形 8">
             <a:extLst>
               <a:ext uri="{FF2B5EF4-FFF2-40B4-BE49-F238E27FC236}">
-                <a16:creationId xmlns:a16="http://schemas.microsoft.com/office/drawing/2014/main" xmlns="" id="{C21960D3-0AC5-EE41-A19C-696161A1572E}"/>
+                <a16:creationId xmlns="" xmlns:a16="http://schemas.microsoft.com/office/drawing/2014/main" id="{C21960D3-0AC5-EE41-A19C-696161A1572E}"/>
               </a:ext>
             </a:extLst>
           </p:cNvPr>
@@ -10155,7 +10161,7 @@
           <p:cNvPr id="10" name="矩形 9">
             <a:extLst>
               <a:ext uri="{FF2B5EF4-FFF2-40B4-BE49-F238E27FC236}">
-                <a16:creationId xmlns:a16="http://schemas.microsoft.com/office/drawing/2014/main" xmlns="" id="{387A2BAD-7558-A944-B806-7AEF1C4243D0}"/>
+                <a16:creationId xmlns="" xmlns:a16="http://schemas.microsoft.com/office/drawing/2014/main" id="{387A2BAD-7558-A944-B806-7AEF1C4243D0}"/>
               </a:ext>
             </a:extLst>
           </p:cNvPr>
@@ -10264,7 +10270,7 @@
           <p:cNvPr id="3" name="日期版面配置區 2">
             <a:extLst>
               <a:ext uri="{FF2B5EF4-FFF2-40B4-BE49-F238E27FC236}">
-                <a16:creationId xmlns:a16="http://schemas.microsoft.com/office/drawing/2014/main" xmlns="" id="{F7C17A4E-EBA6-E34A-A86C-76416798A0B8}"/>
+                <a16:creationId xmlns="" xmlns:a16="http://schemas.microsoft.com/office/drawing/2014/main" id="{F7C17A4E-EBA6-E34A-A86C-76416798A0B8}"/>
               </a:ext>
             </a:extLst>
           </p:cNvPr>
@@ -10282,7 +10288,7 @@
           <a:p>
             <a:fld id="{75F8934F-7F83-1046-9341-02CE27D9104D}" type="datetimeFigureOut">
               <a:rPr kumimoji="1" lang="zh-TW" altLang="en-US" smtClean="0"/>
-              <a:t>2020/2/6</a:t>
+              <a:t>2020/2/12</a:t>
             </a:fld>
             <a:endParaRPr kumimoji="1" lang="zh-TW" altLang="en-US"/>
           </a:p>
@@ -10293,7 +10299,7 @@
           <p:cNvPr id="4" name="頁尾版面配置區 3">
             <a:extLst>
               <a:ext uri="{FF2B5EF4-FFF2-40B4-BE49-F238E27FC236}">
-                <a16:creationId xmlns:a16="http://schemas.microsoft.com/office/drawing/2014/main" xmlns="" id="{CA1C1E17-1A60-0144-B993-55C5B1B81E94}"/>
+                <a16:creationId xmlns="" xmlns:a16="http://schemas.microsoft.com/office/drawing/2014/main" id="{CA1C1E17-1A60-0144-B993-55C5B1B81E94}"/>
               </a:ext>
             </a:extLst>
           </p:cNvPr>
@@ -10318,7 +10324,7 @@
           <p:cNvPr id="5" name="投影片編號版面配置區 4">
             <a:extLst>
               <a:ext uri="{FF2B5EF4-FFF2-40B4-BE49-F238E27FC236}">
-                <a16:creationId xmlns:a16="http://schemas.microsoft.com/office/drawing/2014/main" xmlns="" id="{6E191D9A-D235-9D49-814E-DCBBB84DC544}"/>
+                <a16:creationId xmlns="" xmlns:a16="http://schemas.microsoft.com/office/drawing/2014/main" id="{6E191D9A-D235-9D49-814E-DCBBB84DC544}"/>
               </a:ext>
             </a:extLst>
           </p:cNvPr>
@@ -10347,7 +10353,7 @@
           <p:cNvPr id="7" name="圖片 6">
             <a:extLst>
               <a:ext uri="{FF2B5EF4-FFF2-40B4-BE49-F238E27FC236}">
-                <a16:creationId xmlns:a16="http://schemas.microsoft.com/office/drawing/2014/main" xmlns="" id="{5E0EAD78-AEC6-AB45-A710-DD47E43CBB16}"/>
+                <a16:creationId xmlns="" xmlns:a16="http://schemas.microsoft.com/office/drawing/2014/main" id="{5E0EAD78-AEC6-AB45-A710-DD47E43CBB16}"/>
               </a:ext>
             </a:extLst>
           </p:cNvPr>
@@ -10427,7 +10433,7 @@
           <p:cNvPr id="12" name="內容版面配置區 2">
             <a:extLst>
               <a:ext uri="{FF2B5EF4-FFF2-40B4-BE49-F238E27FC236}">
-                <a16:creationId xmlns:a16="http://schemas.microsoft.com/office/drawing/2014/main" xmlns="" id="{DB7FC4C6-C26F-214E-B2D6-C9ED5E2BD195}"/>
+                <a16:creationId xmlns="" xmlns:a16="http://schemas.microsoft.com/office/drawing/2014/main" id="{DB7FC4C6-C26F-214E-B2D6-C9ED5E2BD195}"/>
               </a:ext>
             </a:extLst>
           </p:cNvPr>
@@ -10489,7 +10495,7 @@
           <p:cNvPr id="13" name="矩形 12">
             <a:extLst>
               <a:ext uri="{FF2B5EF4-FFF2-40B4-BE49-F238E27FC236}">
-                <a16:creationId xmlns:a16="http://schemas.microsoft.com/office/drawing/2014/main" xmlns="" id="{C21960D3-0AC5-EE41-A19C-696161A1572E}"/>
+                <a16:creationId xmlns="" xmlns:a16="http://schemas.microsoft.com/office/drawing/2014/main" id="{C21960D3-0AC5-EE41-A19C-696161A1572E}"/>
               </a:ext>
             </a:extLst>
           </p:cNvPr>
@@ -10545,7 +10551,7 @@
           <p:cNvPr id="15" name="矩形 14">
             <a:extLst>
               <a:ext uri="{FF2B5EF4-FFF2-40B4-BE49-F238E27FC236}">
-                <a16:creationId xmlns:a16="http://schemas.microsoft.com/office/drawing/2014/main" xmlns="" id="{387A2BAD-7558-A944-B806-7AEF1C4243D0}"/>
+                <a16:creationId xmlns="" xmlns:a16="http://schemas.microsoft.com/office/drawing/2014/main" id="{387A2BAD-7558-A944-B806-7AEF1C4243D0}"/>
               </a:ext>
             </a:extLst>
           </p:cNvPr>
@@ -10802,7 +10808,7 @@
           <a:p>
             <a:fld id="{58A8743F-B12E-458C-9EA7-7F147439A6EC}" type="datetimeFigureOut">
               <a:rPr lang="zh-TW" altLang="en-US" smtClean="0"/>
-              <a:t>2020/2/6</a:t>
+              <a:t>2020/2/12</a:t>
             </a:fld>
             <a:endParaRPr lang="zh-TW" altLang="en-US"/>
           </a:p>
@@ -10855,7 +10861,7 @@
           <p:cNvPr id="8" name="矩形 7">
             <a:extLst>
               <a:ext uri="{FF2B5EF4-FFF2-40B4-BE49-F238E27FC236}">
-                <a16:creationId xmlns:a16="http://schemas.microsoft.com/office/drawing/2014/main" xmlns="" id="{C21960D3-0AC5-EE41-A19C-696161A1572E}"/>
+                <a16:creationId xmlns="" xmlns:a16="http://schemas.microsoft.com/office/drawing/2014/main" id="{C21960D3-0AC5-EE41-A19C-696161A1572E}"/>
               </a:ext>
             </a:extLst>
           </p:cNvPr>
@@ -11069,7 +11075,7 @@
           <p:cNvPr id="2" name="標題 1">
             <a:extLst>
               <a:ext uri="{FF2B5EF4-FFF2-40B4-BE49-F238E27FC236}">
-                <a16:creationId xmlns:a16="http://schemas.microsoft.com/office/drawing/2014/main" xmlns="" id="{6A1C7254-695B-1F42-AC59-34E8D858E936}"/>
+                <a16:creationId xmlns="" xmlns:a16="http://schemas.microsoft.com/office/drawing/2014/main" id="{6A1C7254-695B-1F42-AC59-34E8D858E936}"/>
               </a:ext>
             </a:extLst>
           </p:cNvPr>
@@ -11112,7 +11118,7 @@
           <p:cNvPr id="3" name="文字版面配置區 2">
             <a:extLst>
               <a:ext uri="{FF2B5EF4-FFF2-40B4-BE49-F238E27FC236}">
-                <a16:creationId xmlns:a16="http://schemas.microsoft.com/office/drawing/2014/main" xmlns="" id="{1D19DA3B-2013-E14B-A941-CC519B76AD6F}"/>
+                <a16:creationId xmlns="" xmlns:a16="http://schemas.microsoft.com/office/drawing/2014/main" id="{1D19DA3B-2013-E14B-A941-CC519B76AD6F}"/>
               </a:ext>
             </a:extLst>
           </p:cNvPr>
@@ -11237,7 +11243,7 @@
           <p:cNvPr id="4" name="日期版面配置區 3">
             <a:extLst>
               <a:ext uri="{FF2B5EF4-FFF2-40B4-BE49-F238E27FC236}">
-                <a16:creationId xmlns:a16="http://schemas.microsoft.com/office/drawing/2014/main" xmlns="" id="{BC7211D9-290C-574E-B682-764110BB9BAF}"/>
+                <a16:creationId xmlns="" xmlns:a16="http://schemas.microsoft.com/office/drawing/2014/main" id="{BC7211D9-290C-574E-B682-764110BB9BAF}"/>
               </a:ext>
             </a:extLst>
           </p:cNvPr>
@@ -11255,7 +11261,7 @@
           <a:p>
             <a:fld id="{75F8934F-7F83-1046-9341-02CE27D9104D}" type="datetimeFigureOut">
               <a:rPr kumimoji="1" lang="zh-TW" altLang="en-US" smtClean="0"/>
-              <a:t>2020/2/6</a:t>
+              <a:t>2020/2/12</a:t>
             </a:fld>
             <a:endParaRPr kumimoji="1" lang="zh-TW" altLang="en-US" dirty="0"/>
           </a:p>
@@ -11266,7 +11272,7 @@
           <p:cNvPr id="5" name="頁尾版面配置區 4">
             <a:extLst>
               <a:ext uri="{FF2B5EF4-FFF2-40B4-BE49-F238E27FC236}">
-                <a16:creationId xmlns:a16="http://schemas.microsoft.com/office/drawing/2014/main" xmlns="" id="{D4D4BDD1-0BFA-0645-8197-068191AAF54C}"/>
+                <a16:creationId xmlns="" xmlns:a16="http://schemas.microsoft.com/office/drawing/2014/main" id="{D4D4BDD1-0BFA-0645-8197-068191AAF54C}"/>
               </a:ext>
             </a:extLst>
           </p:cNvPr>
@@ -11291,7 +11297,7 @@
           <p:cNvPr id="6" name="投影片編號版面配置區 5">
             <a:extLst>
               <a:ext uri="{FF2B5EF4-FFF2-40B4-BE49-F238E27FC236}">
-                <a16:creationId xmlns:a16="http://schemas.microsoft.com/office/drawing/2014/main" xmlns="" id="{F592E68C-AEE0-D84B-8844-7CF5E83647F7}"/>
+                <a16:creationId xmlns="" xmlns:a16="http://schemas.microsoft.com/office/drawing/2014/main" id="{F592E68C-AEE0-D84B-8844-7CF5E83647F7}"/>
               </a:ext>
             </a:extLst>
           </p:cNvPr>
@@ -11396,7 +11402,7 @@
           <p:cNvPr id="2" name="標題 1">
             <a:extLst>
               <a:ext uri="{FF2B5EF4-FFF2-40B4-BE49-F238E27FC236}">
-                <a16:creationId xmlns:a16="http://schemas.microsoft.com/office/drawing/2014/main" xmlns="" id="{6A1C7254-695B-1F42-AC59-34E8D858E936}"/>
+                <a16:creationId xmlns="" xmlns:a16="http://schemas.microsoft.com/office/drawing/2014/main" id="{6A1C7254-695B-1F42-AC59-34E8D858E936}"/>
               </a:ext>
             </a:extLst>
           </p:cNvPr>
@@ -11439,7 +11445,7 @@
           <p:cNvPr id="3" name="文字版面配置區 2">
             <a:extLst>
               <a:ext uri="{FF2B5EF4-FFF2-40B4-BE49-F238E27FC236}">
-                <a16:creationId xmlns:a16="http://schemas.microsoft.com/office/drawing/2014/main" xmlns="" id="{1D19DA3B-2013-E14B-A941-CC519B76AD6F}"/>
+                <a16:creationId xmlns="" xmlns:a16="http://schemas.microsoft.com/office/drawing/2014/main" id="{1D19DA3B-2013-E14B-A941-CC519B76AD6F}"/>
               </a:ext>
             </a:extLst>
           </p:cNvPr>
@@ -11564,7 +11570,7 @@
           <p:cNvPr id="4" name="日期版面配置區 3">
             <a:extLst>
               <a:ext uri="{FF2B5EF4-FFF2-40B4-BE49-F238E27FC236}">
-                <a16:creationId xmlns:a16="http://schemas.microsoft.com/office/drawing/2014/main" xmlns="" id="{BC7211D9-290C-574E-B682-764110BB9BAF}"/>
+                <a16:creationId xmlns="" xmlns:a16="http://schemas.microsoft.com/office/drawing/2014/main" id="{BC7211D9-290C-574E-B682-764110BB9BAF}"/>
               </a:ext>
             </a:extLst>
           </p:cNvPr>
@@ -11582,7 +11588,7 @@
           <a:p>
             <a:fld id="{75F8934F-7F83-1046-9341-02CE27D9104D}" type="datetimeFigureOut">
               <a:rPr kumimoji="1" lang="zh-TW" altLang="en-US" smtClean="0"/>
-              <a:t>2020/2/6</a:t>
+              <a:t>2020/2/12</a:t>
             </a:fld>
             <a:endParaRPr kumimoji="1" lang="zh-TW" altLang="en-US" dirty="0"/>
           </a:p>
@@ -11593,7 +11599,7 @@
           <p:cNvPr id="5" name="頁尾版面配置區 4">
             <a:extLst>
               <a:ext uri="{FF2B5EF4-FFF2-40B4-BE49-F238E27FC236}">
-                <a16:creationId xmlns:a16="http://schemas.microsoft.com/office/drawing/2014/main" xmlns="" id="{D4D4BDD1-0BFA-0645-8197-068191AAF54C}"/>
+                <a16:creationId xmlns="" xmlns:a16="http://schemas.microsoft.com/office/drawing/2014/main" id="{D4D4BDD1-0BFA-0645-8197-068191AAF54C}"/>
               </a:ext>
             </a:extLst>
           </p:cNvPr>
@@ -11618,7 +11624,7 @@
           <p:cNvPr id="6" name="投影片編號版面配置區 5">
             <a:extLst>
               <a:ext uri="{FF2B5EF4-FFF2-40B4-BE49-F238E27FC236}">
-                <a16:creationId xmlns:a16="http://schemas.microsoft.com/office/drawing/2014/main" xmlns="" id="{F592E68C-AEE0-D84B-8844-7CF5E83647F7}"/>
+                <a16:creationId xmlns="" xmlns:a16="http://schemas.microsoft.com/office/drawing/2014/main" id="{F592E68C-AEE0-D84B-8844-7CF5E83647F7}"/>
               </a:ext>
             </a:extLst>
           </p:cNvPr>
@@ -11647,7 +11653,7 @@
           <p:cNvPr id="7" name="圖片 6">
             <a:extLst>
               <a:ext uri="{FF2B5EF4-FFF2-40B4-BE49-F238E27FC236}">
-                <a16:creationId xmlns:a16="http://schemas.microsoft.com/office/drawing/2014/main" xmlns="" id="{CFC0D688-7C0C-F240-82D7-136060E3079C}"/>
+                <a16:creationId xmlns="" xmlns:a16="http://schemas.microsoft.com/office/drawing/2014/main" id="{CFC0D688-7C0C-F240-82D7-136060E3079C}"/>
               </a:ext>
             </a:extLst>
           </p:cNvPr>
@@ -11846,7 +11852,7 @@
           <p:cNvPr id="2" name="標題 1">
             <a:extLst>
               <a:ext uri="{FF2B5EF4-FFF2-40B4-BE49-F238E27FC236}">
-                <a16:creationId xmlns:a16="http://schemas.microsoft.com/office/drawing/2014/main" xmlns="" id="{6A1C7254-695B-1F42-AC59-34E8D858E936}"/>
+                <a16:creationId xmlns="" xmlns:a16="http://schemas.microsoft.com/office/drawing/2014/main" id="{6A1C7254-695B-1F42-AC59-34E8D858E936}"/>
               </a:ext>
             </a:extLst>
           </p:cNvPr>
@@ -11889,7 +11895,7 @@
           <p:cNvPr id="3" name="文字版面配置區 2">
             <a:extLst>
               <a:ext uri="{FF2B5EF4-FFF2-40B4-BE49-F238E27FC236}">
-                <a16:creationId xmlns:a16="http://schemas.microsoft.com/office/drawing/2014/main" xmlns="" id="{1D19DA3B-2013-E14B-A941-CC519B76AD6F}"/>
+                <a16:creationId xmlns="" xmlns:a16="http://schemas.microsoft.com/office/drawing/2014/main" id="{1D19DA3B-2013-E14B-A941-CC519B76AD6F}"/>
               </a:ext>
             </a:extLst>
           </p:cNvPr>
@@ -12014,7 +12020,7 @@
           <p:cNvPr id="4" name="日期版面配置區 3">
             <a:extLst>
               <a:ext uri="{FF2B5EF4-FFF2-40B4-BE49-F238E27FC236}">
-                <a16:creationId xmlns:a16="http://schemas.microsoft.com/office/drawing/2014/main" xmlns="" id="{BC7211D9-290C-574E-B682-764110BB9BAF}"/>
+                <a16:creationId xmlns="" xmlns:a16="http://schemas.microsoft.com/office/drawing/2014/main" id="{BC7211D9-290C-574E-B682-764110BB9BAF}"/>
               </a:ext>
             </a:extLst>
           </p:cNvPr>
@@ -12032,7 +12038,7 @@
           <a:p>
             <a:fld id="{75F8934F-7F83-1046-9341-02CE27D9104D}" type="datetimeFigureOut">
               <a:rPr kumimoji="1" lang="zh-TW" altLang="en-US" smtClean="0"/>
-              <a:t>2020/2/6</a:t>
+              <a:t>2020/2/12</a:t>
             </a:fld>
             <a:endParaRPr kumimoji="1" lang="zh-TW" altLang="en-US" dirty="0"/>
           </a:p>
@@ -12043,7 +12049,7 @@
           <p:cNvPr id="5" name="頁尾版面配置區 4">
             <a:extLst>
               <a:ext uri="{FF2B5EF4-FFF2-40B4-BE49-F238E27FC236}">
-                <a16:creationId xmlns:a16="http://schemas.microsoft.com/office/drawing/2014/main" xmlns="" id="{D4D4BDD1-0BFA-0645-8197-068191AAF54C}"/>
+                <a16:creationId xmlns="" xmlns:a16="http://schemas.microsoft.com/office/drawing/2014/main" id="{D4D4BDD1-0BFA-0645-8197-068191AAF54C}"/>
               </a:ext>
             </a:extLst>
           </p:cNvPr>
@@ -12068,7 +12074,7 @@
           <p:cNvPr id="6" name="投影片編號版面配置區 5">
             <a:extLst>
               <a:ext uri="{FF2B5EF4-FFF2-40B4-BE49-F238E27FC236}">
-                <a16:creationId xmlns:a16="http://schemas.microsoft.com/office/drawing/2014/main" xmlns="" id="{F592E68C-AEE0-D84B-8844-7CF5E83647F7}"/>
+                <a16:creationId xmlns="" xmlns:a16="http://schemas.microsoft.com/office/drawing/2014/main" id="{F592E68C-AEE0-D84B-8844-7CF5E83647F7}"/>
               </a:ext>
             </a:extLst>
           </p:cNvPr>
@@ -12177,7 +12183,7 @@
           <p:cNvPr id="3" name="內容版面配置區 2">
             <a:extLst>
               <a:ext uri="{FF2B5EF4-FFF2-40B4-BE49-F238E27FC236}">
-                <a16:creationId xmlns:a16="http://schemas.microsoft.com/office/drawing/2014/main" xmlns="" id="{DB7FC4C6-C26F-214E-B2D6-C9ED5E2BD195}"/>
+                <a16:creationId xmlns="" xmlns:a16="http://schemas.microsoft.com/office/drawing/2014/main" id="{DB7FC4C6-C26F-214E-B2D6-C9ED5E2BD195}"/>
               </a:ext>
             </a:extLst>
           </p:cNvPr>
@@ -12269,7 +12275,7 @@
           <p:cNvPr id="5" name="日期版面配置區 4">
             <a:extLst>
               <a:ext uri="{FF2B5EF4-FFF2-40B4-BE49-F238E27FC236}">
-                <a16:creationId xmlns:a16="http://schemas.microsoft.com/office/drawing/2014/main" xmlns="" id="{B9046B7C-39BE-4A4E-B699-9748D6DA088D}"/>
+                <a16:creationId xmlns="" xmlns:a16="http://schemas.microsoft.com/office/drawing/2014/main" id="{B9046B7C-39BE-4A4E-B699-9748D6DA088D}"/>
               </a:ext>
             </a:extLst>
           </p:cNvPr>
@@ -12287,7 +12293,7 @@
           <a:p>
             <a:fld id="{75F8934F-7F83-1046-9341-02CE27D9104D}" type="datetimeFigureOut">
               <a:rPr kumimoji="1" lang="zh-TW" altLang="en-US" smtClean="0"/>
-              <a:t>2020/2/6</a:t>
+              <a:t>2020/2/12</a:t>
             </a:fld>
             <a:endParaRPr kumimoji="1" lang="zh-TW" altLang="en-US"/>
           </a:p>
@@ -12298,7 +12304,7 @@
           <p:cNvPr id="6" name="頁尾版面配置區 5">
             <a:extLst>
               <a:ext uri="{FF2B5EF4-FFF2-40B4-BE49-F238E27FC236}">
-                <a16:creationId xmlns:a16="http://schemas.microsoft.com/office/drawing/2014/main" xmlns="" id="{1AD5E07B-3935-B144-8CAF-5251EF861FDA}"/>
+                <a16:creationId xmlns="" xmlns:a16="http://schemas.microsoft.com/office/drawing/2014/main" id="{1AD5E07B-3935-B144-8CAF-5251EF861FDA}"/>
               </a:ext>
             </a:extLst>
           </p:cNvPr>
@@ -12323,7 +12329,7 @@
           <p:cNvPr id="7" name="投影片編號版面配置區 6">
             <a:extLst>
               <a:ext uri="{FF2B5EF4-FFF2-40B4-BE49-F238E27FC236}">
-                <a16:creationId xmlns:a16="http://schemas.microsoft.com/office/drawing/2014/main" xmlns="" id="{C9A0C168-E66B-E24E-B30C-62EBA9A41007}"/>
+                <a16:creationId xmlns="" xmlns:a16="http://schemas.microsoft.com/office/drawing/2014/main" id="{C9A0C168-E66B-E24E-B30C-62EBA9A41007}"/>
               </a:ext>
             </a:extLst>
           </p:cNvPr>
@@ -12352,7 +12358,7 @@
           <p:cNvPr id="8" name="圖片 7">
             <a:extLst>
               <a:ext uri="{FF2B5EF4-FFF2-40B4-BE49-F238E27FC236}">
-                <a16:creationId xmlns:a16="http://schemas.microsoft.com/office/drawing/2014/main" xmlns="" id="{5E0EAD78-AEC6-AB45-A710-DD47E43CBB16}"/>
+                <a16:creationId xmlns="" xmlns:a16="http://schemas.microsoft.com/office/drawing/2014/main" id="{5E0EAD78-AEC6-AB45-A710-DD47E43CBB16}"/>
               </a:ext>
             </a:extLst>
           </p:cNvPr>
@@ -12388,7 +12394,7 @@
           <p:cNvPr id="10" name="矩形 9">
             <a:extLst>
               <a:ext uri="{FF2B5EF4-FFF2-40B4-BE49-F238E27FC236}">
-                <a16:creationId xmlns:a16="http://schemas.microsoft.com/office/drawing/2014/main" xmlns="" id="{387A2BAD-7558-A944-B806-7AEF1C4243D0}"/>
+                <a16:creationId xmlns="" xmlns:a16="http://schemas.microsoft.com/office/drawing/2014/main" id="{387A2BAD-7558-A944-B806-7AEF1C4243D0}"/>
               </a:ext>
             </a:extLst>
           </p:cNvPr>
@@ -12440,7 +12446,7 @@
           <p:cNvPr id="11" name="標題 1">
             <a:extLst>
               <a:ext uri="{FF2B5EF4-FFF2-40B4-BE49-F238E27FC236}">
-                <a16:creationId xmlns:a16="http://schemas.microsoft.com/office/drawing/2014/main" xmlns="" id="{AA60FC08-DB42-1443-B1D9-594B0DFFD819}"/>
+                <a16:creationId xmlns="" xmlns:a16="http://schemas.microsoft.com/office/drawing/2014/main" id="{AA60FC08-DB42-1443-B1D9-594B0DFFD819}"/>
               </a:ext>
             </a:extLst>
           </p:cNvPr>
@@ -12485,7 +12491,7 @@
           <p:cNvPr id="13" name="矩形 12">
             <a:extLst>
               <a:ext uri="{FF2B5EF4-FFF2-40B4-BE49-F238E27FC236}">
-                <a16:creationId xmlns:a16="http://schemas.microsoft.com/office/drawing/2014/main" xmlns="" id="{C21960D3-0AC5-EE41-A19C-696161A1572E}"/>
+                <a16:creationId xmlns="" xmlns:a16="http://schemas.microsoft.com/office/drawing/2014/main" id="{C21960D3-0AC5-EE41-A19C-696161A1572E}"/>
               </a:ext>
             </a:extLst>
           </p:cNvPr>
@@ -12595,7 +12601,7 @@
           <p:cNvPr id="12" name="矩形 11">
             <a:extLst>
               <a:ext uri="{FF2B5EF4-FFF2-40B4-BE49-F238E27FC236}">
-                <a16:creationId xmlns:a16="http://schemas.microsoft.com/office/drawing/2014/main" xmlns="" id="{387A2BAD-7558-A944-B806-7AEF1C4243D0}"/>
+                <a16:creationId xmlns="" xmlns:a16="http://schemas.microsoft.com/office/drawing/2014/main" id="{387A2BAD-7558-A944-B806-7AEF1C4243D0}"/>
               </a:ext>
             </a:extLst>
           </p:cNvPr>
@@ -12744,7 +12750,7 @@
           <p:cNvPr id="2" name="標題 1">
             <a:extLst>
               <a:ext uri="{FF2B5EF4-FFF2-40B4-BE49-F238E27FC236}">
-                <a16:creationId xmlns:a16="http://schemas.microsoft.com/office/drawing/2014/main" xmlns="" id="{979C6CD6-89CE-E846-934F-01618F2F117C}"/>
+                <a16:creationId xmlns="" xmlns:a16="http://schemas.microsoft.com/office/drawing/2014/main" id="{979C6CD6-89CE-E846-934F-01618F2F117C}"/>
               </a:ext>
             </a:extLst>
           </p:cNvPr>
@@ -12785,7 +12791,7 @@
           <p:cNvPr id="3" name="內容版面配置區 2">
             <a:extLst>
               <a:ext uri="{FF2B5EF4-FFF2-40B4-BE49-F238E27FC236}">
-                <a16:creationId xmlns:a16="http://schemas.microsoft.com/office/drawing/2014/main" xmlns="" id="{DB7FC4C6-C26F-214E-B2D6-C9ED5E2BD195}"/>
+                <a16:creationId xmlns="" xmlns:a16="http://schemas.microsoft.com/office/drawing/2014/main" id="{DB7FC4C6-C26F-214E-B2D6-C9ED5E2BD195}"/>
               </a:ext>
             </a:extLst>
           </p:cNvPr>
@@ -12877,7 +12883,7 @@
           <p:cNvPr id="5" name="日期版面配置區 4">
             <a:extLst>
               <a:ext uri="{FF2B5EF4-FFF2-40B4-BE49-F238E27FC236}">
-                <a16:creationId xmlns:a16="http://schemas.microsoft.com/office/drawing/2014/main" xmlns="" id="{B9046B7C-39BE-4A4E-B699-9748D6DA088D}"/>
+                <a16:creationId xmlns="" xmlns:a16="http://schemas.microsoft.com/office/drawing/2014/main" id="{B9046B7C-39BE-4A4E-B699-9748D6DA088D}"/>
               </a:ext>
             </a:extLst>
           </p:cNvPr>
@@ -12895,7 +12901,7 @@
           <a:p>
             <a:fld id="{75F8934F-7F83-1046-9341-02CE27D9104D}" type="datetimeFigureOut">
               <a:rPr kumimoji="1" lang="zh-TW" altLang="en-US" smtClean="0"/>
-              <a:t>2020/2/6</a:t>
+              <a:t>2020/2/12</a:t>
             </a:fld>
             <a:endParaRPr kumimoji="1" lang="zh-TW" altLang="en-US"/>
           </a:p>
@@ -12906,7 +12912,7 @@
           <p:cNvPr id="6" name="頁尾版面配置區 5">
             <a:extLst>
               <a:ext uri="{FF2B5EF4-FFF2-40B4-BE49-F238E27FC236}">
-                <a16:creationId xmlns:a16="http://schemas.microsoft.com/office/drawing/2014/main" xmlns="" id="{1AD5E07B-3935-B144-8CAF-5251EF861FDA}"/>
+                <a16:creationId xmlns="" xmlns:a16="http://schemas.microsoft.com/office/drawing/2014/main" id="{1AD5E07B-3935-B144-8CAF-5251EF861FDA}"/>
               </a:ext>
             </a:extLst>
           </p:cNvPr>
@@ -12931,7 +12937,7 @@
           <p:cNvPr id="7" name="投影片編號版面配置區 6">
             <a:extLst>
               <a:ext uri="{FF2B5EF4-FFF2-40B4-BE49-F238E27FC236}">
-                <a16:creationId xmlns:a16="http://schemas.microsoft.com/office/drawing/2014/main" xmlns="" id="{C9A0C168-E66B-E24E-B30C-62EBA9A41007}"/>
+                <a16:creationId xmlns="" xmlns:a16="http://schemas.microsoft.com/office/drawing/2014/main" id="{C9A0C168-E66B-E24E-B30C-62EBA9A41007}"/>
               </a:ext>
             </a:extLst>
           </p:cNvPr>
@@ -12960,7 +12966,7 @@
           <p:cNvPr id="8" name="圖片 7">
             <a:extLst>
               <a:ext uri="{FF2B5EF4-FFF2-40B4-BE49-F238E27FC236}">
-                <a16:creationId xmlns:a16="http://schemas.microsoft.com/office/drawing/2014/main" xmlns="" id="{5E0EAD78-AEC6-AB45-A710-DD47E43CBB16}"/>
+                <a16:creationId xmlns="" xmlns:a16="http://schemas.microsoft.com/office/drawing/2014/main" id="{5E0EAD78-AEC6-AB45-A710-DD47E43CBB16}"/>
               </a:ext>
             </a:extLst>
           </p:cNvPr>
@@ -12996,7 +13002,7 @@
           <p:cNvPr id="17" name="內容版面配置區 2">
             <a:extLst>
               <a:ext uri="{FF2B5EF4-FFF2-40B4-BE49-F238E27FC236}">
-                <a16:creationId xmlns:a16="http://schemas.microsoft.com/office/drawing/2014/main" xmlns="" id="{DB7FC4C6-C26F-214E-B2D6-C9ED5E2BD195}"/>
+                <a16:creationId xmlns="" xmlns:a16="http://schemas.microsoft.com/office/drawing/2014/main" id="{DB7FC4C6-C26F-214E-B2D6-C9ED5E2BD195}"/>
               </a:ext>
             </a:extLst>
           </p:cNvPr>
@@ -13088,7 +13094,7 @@
           <p:cNvPr id="24" name="內容版面配置區 2">
             <a:extLst>
               <a:ext uri="{FF2B5EF4-FFF2-40B4-BE49-F238E27FC236}">
-                <a16:creationId xmlns:a16="http://schemas.microsoft.com/office/drawing/2014/main" xmlns="" id="{DB7FC4C6-C26F-214E-B2D6-C9ED5E2BD195}"/>
+                <a16:creationId xmlns="" xmlns:a16="http://schemas.microsoft.com/office/drawing/2014/main" id="{DB7FC4C6-C26F-214E-B2D6-C9ED5E2BD195}"/>
               </a:ext>
             </a:extLst>
           </p:cNvPr>
@@ -13180,7 +13186,7 @@
           <p:cNvPr id="26" name="內容版面配置區 2">
             <a:extLst>
               <a:ext uri="{FF2B5EF4-FFF2-40B4-BE49-F238E27FC236}">
-                <a16:creationId xmlns:a16="http://schemas.microsoft.com/office/drawing/2014/main" xmlns="" id="{DB7FC4C6-C26F-214E-B2D6-C9ED5E2BD195}"/>
+                <a16:creationId xmlns="" xmlns:a16="http://schemas.microsoft.com/office/drawing/2014/main" id="{DB7FC4C6-C26F-214E-B2D6-C9ED5E2BD195}"/>
               </a:ext>
             </a:extLst>
           </p:cNvPr>
@@ -13272,7 +13278,7 @@
           <p:cNvPr id="27" name="內容版面配置區 2">
             <a:extLst>
               <a:ext uri="{FF2B5EF4-FFF2-40B4-BE49-F238E27FC236}">
-                <a16:creationId xmlns:a16="http://schemas.microsoft.com/office/drawing/2014/main" xmlns="" id="{DB7FC4C6-C26F-214E-B2D6-C9ED5E2BD195}"/>
+                <a16:creationId xmlns="" xmlns:a16="http://schemas.microsoft.com/office/drawing/2014/main" id="{DB7FC4C6-C26F-214E-B2D6-C9ED5E2BD195}"/>
               </a:ext>
             </a:extLst>
           </p:cNvPr>
@@ -13364,7 +13370,7 @@
           <p:cNvPr id="28" name="內容版面配置區 2">
             <a:extLst>
               <a:ext uri="{FF2B5EF4-FFF2-40B4-BE49-F238E27FC236}">
-                <a16:creationId xmlns:a16="http://schemas.microsoft.com/office/drawing/2014/main" xmlns="" id="{DB7FC4C6-C26F-214E-B2D6-C9ED5E2BD195}"/>
+                <a16:creationId xmlns="" xmlns:a16="http://schemas.microsoft.com/office/drawing/2014/main" id="{DB7FC4C6-C26F-214E-B2D6-C9ED5E2BD195}"/>
               </a:ext>
             </a:extLst>
           </p:cNvPr>
@@ -13456,7 +13462,7 @@
           <p:cNvPr id="29" name="內容版面配置區 2">
             <a:extLst>
               <a:ext uri="{FF2B5EF4-FFF2-40B4-BE49-F238E27FC236}">
-                <a16:creationId xmlns:a16="http://schemas.microsoft.com/office/drawing/2014/main" xmlns="" id="{DB7FC4C6-C26F-214E-B2D6-C9ED5E2BD195}"/>
+                <a16:creationId xmlns="" xmlns:a16="http://schemas.microsoft.com/office/drawing/2014/main" id="{DB7FC4C6-C26F-214E-B2D6-C9ED5E2BD195}"/>
               </a:ext>
             </a:extLst>
           </p:cNvPr>
@@ -13548,7 +13554,7 @@
           <p:cNvPr id="30" name="內容版面配置區 2">
             <a:extLst>
               <a:ext uri="{FF2B5EF4-FFF2-40B4-BE49-F238E27FC236}">
-                <a16:creationId xmlns:a16="http://schemas.microsoft.com/office/drawing/2014/main" xmlns="" id="{DB7FC4C6-C26F-214E-B2D6-C9ED5E2BD195}"/>
+                <a16:creationId xmlns="" xmlns:a16="http://schemas.microsoft.com/office/drawing/2014/main" id="{DB7FC4C6-C26F-214E-B2D6-C9ED5E2BD195}"/>
               </a:ext>
             </a:extLst>
           </p:cNvPr>
@@ -13640,7 +13646,7 @@
           <p:cNvPr id="31" name="內容版面配置區 2">
             <a:extLst>
               <a:ext uri="{FF2B5EF4-FFF2-40B4-BE49-F238E27FC236}">
-                <a16:creationId xmlns:a16="http://schemas.microsoft.com/office/drawing/2014/main" xmlns="" id="{DB7FC4C6-C26F-214E-B2D6-C9ED5E2BD195}"/>
+                <a16:creationId xmlns="" xmlns:a16="http://schemas.microsoft.com/office/drawing/2014/main" id="{DB7FC4C6-C26F-214E-B2D6-C9ED5E2BD195}"/>
               </a:ext>
             </a:extLst>
           </p:cNvPr>
@@ -13805,7 +13811,7 @@
           <a:p>
             <a:fld id="{75F8934F-7F83-1046-9341-02CE27D9104D}" type="datetimeFigureOut">
               <a:rPr kumimoji="1" lang="zh-TW" altLang="en-US" smtClean="0"/>
-              <a:t>2020/2/6</a:t>
+              <a:t>2020/2/12</a:t>
             </a:fld>
             <a:endParaRPr kumimoji="1" lang="zh-TW" altLang="en-US"/>
           </a:p>
@@ -13904,7 +13910,7 @@
           <p:cNvPr id="22" name="文字版面配置區 2">
             <a:extLst>
               <a:ext uri="{FF2B5EF4-FFF2-40B4-BE49-F238E27FC236}">
-                <a16:creationId xmlns:a16="http://schemas.microsoft.com/office/drawing/2014/main" xmlns="" id="{1D19DA3B-2013-E14B-A941-CC519B76AD6F}"/>
+                <a16:creationId xmlns="" xmlns:a16="http://schemas.microsoft.com/office/drawing/2014/main" id="{1D19DA3B-2013-E14B-A941-CC519B76AD6F}"/>
               </a:ext>
             </a:extLst>
           </p:cNvPr>
@@ -14309,7 +14315,7 @@
           <p:cNvPr id="28" name="文字版面配置區 2">
             <a:extLst>
               <a:ext uri="{FF2B5EF4-FFF2-40B4-BE49-F238E27FC236}">
-                <a16:creationId xmlns:a16="http://schemas.microsoft.com/office/drawing/2014/main" xmlns="" id="{1D19DA3B-2013-E14B-A941-CC519B76AD6F}"/>
+                <a16:creationId xmlns="" xmlns:a16="http://schemas.microsoft.com/office/drawing/2014/main" id="{1D19DA3B-2013-E14B-A941-CC519B76AD6F}"/>
               </a:ext>
             </a:extLst>
           </p:cNvPr>
@@ -14434,7 +14440,7 @@
           <p:cNvPr id="29" name="文字版面配置區 2">
             <a:extLst>
               <a:ext uri="{FF2B5EF4-FFF2-40B4-BE49-F238E27FC236}">
-                <a16:creationId xmlns:a16="http://schemas.microsoft.com/office/drawing/2014/main" xmlns="" id="{1D19DA3B-2013-E14B-A941-CC519B76AD6F}"/>
+                <a16:creationId xmlns="" xmlns:a16="http://schemas.microsoft.com/office/drawing/2014/main" id="{1D19DA3B-2013-E14B-A941-CC519B76AD6F}"/>
               </a:ext>
             </a:extLst>
           </p:cNvPr>
@@ -14559,7 +14565,7 @@
           <p:cNvPr id="30" name="文字版面配置區 2">
             <a:extLst>
               <a:ext uri="{FF2B5EF4-FFF2-40B4-BE49-F238E27FC236}">
-                <a16:creationId xmlns:a16="http://schemas.microsoft.com/office/drawing/2014/main" xmlns="" id="{1D19DA3B-2013-E14B-A941-CC519B76AD6F}"/>
+                <a16:creationId xmlns="" xmlns:a16="http://schemas.microsoft.com/office/drawing/2014/main" id="{1D19DA3B-2013-E14B-A941-CC519B76AD6F}"/>
               </a:ext>
             </a:extLst>
           </p:cNvPr>
@@ -14684,7 +14690,7 @@
           <p:cNvPr id="31" name="文字版面配置區 2">
             <a:extLst>
               <a:ext uri="{FF2B5EF4-FFF2-40B4-BE49-F238E27FC236}">
-                <a16:creationId xmlns:a16="http://schemas.microsoft.com/office/drawing/2014/main" xmlns="" id="{1D19DA3B-2013-E14B-A941-CC519B76AD6F}"/>
+                <a16:creationId xmlns="" xmlns:a16="http://schemas.microsoft.com/office/drawing/2014/main" id="{1D19DA3B-2013-E14B-A941-CC519B76AD6F}"/>
               </a:ext>
             </a:extLst>
           </p:cNvPr>
@@ -14809,7 +14815,7 @@
           <p:cNvPr id="32" name="圖片 31">
             <a:extLst>
               <a:ext uri="{FF2B5EF4-FFF2-40B4-BE49-F238E27FC236}">
-                <a16:creationId xmlns:a16="http://schemas.microsoft.com/office/drawing/2014/main" xmlns="" id="{5E0EAD78-AEC6-AB45-A710-DD47E43CBB16}"/>
+                <a16:creationId xmlns="" xmlns:a16="http://schemas.microsoft.com/office/drawing/2014/main" id="{5E0EAD78-AEC6-AB45-A710-DD47E43CBB16}"/>
               </a:ext>
             </a:extLst>
           </p:cNvPr>
@@ -14887,7 +14893,7 @@
           <a:p>
             <a:fld id="{75F8934F-7F83-1046-9341-02CE27D9104D}" type="datetimeFigureOut">
               <a:rPr kumimoji="1" lang="zh-TW" altLang="en-US" smtClean="0"/>
-              <a:t>2020/2/6</a:t>
+              <a:t>2020/2/12</a:t>
             </a:fld>
             <a:endParaRPr kumimoji="1" lang="zh-TW" altLang="en-US"/>
           </a:p>
@@ -14940,7 +14946,7 @@
           <p:cNvPr id="6" name="標題 1">
             <a:extLst>
               <a:ext uri="{FF2B5EF4-FFF2-40B4-BE49-F238E27FC236}">
-                <a16:creationId xmlns:a16="http://schemas.microsoft.com/office/drawing/2014/main" xmlns="" id="{AA60FC08-DB42-1443-B1D9-594B0DFFD819}"/>
+                <a16:creationId xmlns="" xmlns:a16="http://schemas.microsoft.com/office/drawing/2014/main" id="{AA60FC08-DB42-1443-B1D9-594B0DFFD819}"/>
               </a:ext>
             </a:extLst>
           </p:cNvPr>
@@ -15122,7 +15128,7 @@
           <p:cNvPr id="29" name="圖片 28">
             <a:extLst>
               <a:ext uri="{FF2B5EF4-FFF2-40B4-BE49-F238E27FC236}">
-                <a16:creationId xmlns:a16="http://schemas.microsoft.com/office/drawing/2014/main" xmlns="" id="{5E0EAD78-AEC6-AB45-A710-DD47E43CBB16}"/>
+                <a16:creationId xmlns="" xmlns:a16="http://schemas.microsoft.com/office/drawing/2014/main" id="{5E0EAD78-AEC6-AB45-A710-DD47E43CBB16}"/>
               </a:ext>
             </a:extLst>
           </p:cNvPr>
@@ -15193,7 +15199,7 @@
           <p:cNvPr id="2" name="標題版面配置區 1">
             <a:extLst>
               <a:ext uri="{FF2B5EF4-FFF2-40B4-BE49-F238E27FC236}">
-                <a16:creationId xmlns:a16="http://schemas.microsoft.com/office/drawing/2014/main" xmlns="" id="{94C8FF7A-2620-884D-9FB3-5AB36BFB548D}"/>
+                <a16:creationId xmlns="" xmlns:a16="http://schemas.microsoft.com/office/drawing/2014/main" id="{94C8FF7A-2620-884D-9FB3-5AB36BFB548D}"/>
               </a:ext>
             </a:extLst>
           </p:cNvPr>
@@ -15231,7 +15237,7 @@
           <p:cNvPr id="3" name="文字版面配置區 2">
             <a:extLst>
               <a:ext uri="{FF2B5EF4-FFF2-40B4-BE49-F238E27FC236}">
-                <a16:creationId xmlns:a16="http://schemas.microsoft.com/office/drawing/2014/main" xmlns="" id="{53B0CFF8-A290-1148-B62C-B24910D4324A}"/>
+                <a16:creationId xmlns="" xmlns:a16="http://schemas.microsoft.com/office/drawing/2014/main" id="{53B0CFF8-A290-1148-B62C-B24910D4324A}"/>
               </a:ext>
             </a:extLst>
           </p:cNvPr>
@@ -15298,7 +15304,7 @@
           <p:cNvPr id="4" name="日期版面配置區 3">
             <a:extLst>
               <a:ext uri="{FF2B5EF4-FFF2-40B4-BE49-F238E27FC236}">
-                <a16:creationId xmlns:a16="http://schemas.microsoft.com/office/drawing/2014/main" xmlns="" id="{6A059F25-1F05-934B-A3C3-A243C45024BD}"/>
+                <a16:creationId xmlns="" xmlns:a16="http://schemas.microsoft.com/office/drawing/2014/main" id="{6A059F25-1F05-934B-A3C3-A243C45024BD}"/>
               </a:ext>
             </a:extLst>
           </p:cNvPr>
@@ -15334,7 +15340,7 @@
           <a:p>
             <a:fld id="{75F8934F-7F83-1046-9341-02CE27D9104D}" type="datetimeFigureOut">
               <a:rPr kumimoji="1" lang="zh-TW" altLang="en-US" smtClean="0"/>
-              <a:t>2020/2/6</a:t>
+              <a:t>2020/2/12</a:t>
             </a:fld>
             <a:endParaRPr kumimoji="1" lang="zh-TW" altLang="en-US"/>
           </a:p>
@@ -15345,7 +15351,7 @@
           <p:cNvPr id="5" name="頁尾版面配置區 4">
             <a:extLst>
               <a:ext uri="{FF2B5EF4-FFF2-40B4-BE49-F238E27FC236}">
-                <a16:creationId xmlns:a16="http://schemas.microsoft.com/office/drawing/2014/main" xmlns="" id="{96F5D358-7817-1940-9383-7E6BF6DB94C4}"/>
+                <a16:creationId xmlns="" xmlns:a16="http://schemas.microsoft.com/office/drawing/2014/main" id="{96F5D358-7817-1940-9383-7E6BF6DB94C4}"/>
               </a:ext>
             </a:extLst>
           </p:cNvPr>
@@ -15388,7 +15394,7 @@
           <p:cNvPr id="6" name="投影片編號版面配置區 5">
             <a:extLst>
               <a:ext uri="{FF2B5EF4-FFF2-40B4-BE49-F238E27FC236}">
-                <a16:creationId xmlns:a16="http://schemas.microsoft.com/office/drawing/2014/main" xmlns="" id="{42AF2059-64BB-A041-B166-4ABAE4368C85}"/>
+                <a16:creationId xmlns="" xmlns:a16="http://schemas.microsoft.com/office/drawing/2014/main" id="{42AF2059-64BB-A041-B166-4ABAE4368C85}"/>
               </a:ext>
             </a:extLst>
           </p:cNvPr>
@@ -15770,7 +15776,7 @@
           <p:cNvPr id="2" name="標題 1">
             <a:extLst>
               <a:ext uri="{FF2B5EF4-FFF2-40B4-BE49-F238E27FC236}">
-                <a16:creationId xmlns:a16="http://schemas.microsoft.com/office/drawing/2014/main" xmlns="" id="{21D1F93B-0172-6544-80FA-8E4F07C59D60}"/>
+                <a16:creationId xmlns="" xmlns:a16="http://schemas.microsoft.com/office/drawing/2014/main" id="{21D1F93B-0172-6544-80FA-8E4F07C59D60}"/>
               </a:ext>
             </a:extLst>
           </p:cNvPr>
@@ -15795,7 +15801,7 @@
           <p:cNvPr id="3" name="副標題 2">
             <a:extLst>
               <a:ext uri="{FF2B5EF4-FFF2-40B4-BE49-F238E27FC236}">
-                <a16:creationId xmlns:a16="http://schemas.microsoft.com/office/drawing/2014/main" xmlns="" id="{EF107643-09F5-CF46-B8BB-0DC1151E4CD0}"/>
+                <a16:creationId xmlns="" xmlns:a16="http://schemas.microsoft.com/office/drawing/2014/main" id="{EF107643-09F5-CF46-B8BB-0DC1151E4CD0}"/>
               </a:ext>
             </a:extLst>
           </p:cNvPr>
@@ -15820,7 +15826,7 @@
           <p:cNvPr id="6" name="文字版面配置區 5">
             <a:extLst>
               <a:ext uri="{FF2B5EF4-FFF2-40B4-BE49-F238E27FC236}">
-                <a16:creationId xmlns:a16="http://schemas.microsoft.com/office/drawing/2014/main" xmlns="" id="{EC4C7251-0CC8-BC4A-A90C-9020762D8B31}"/>
+                <a16:creationId xmlns="" xmlns:a16="http://schemas.microsoft.com/office/drawing/2014/main" id="{EC4C7251-0CC8-BC4A-A90C-9020762D8B31}"/>
               </a:ext>
             </a:extLst>
           </p:cNvPr>
@@ -15891,18 +15897,45 @@
           <a:bodyPr/>
           <a:lstStyle/>
           <a:p>
+            <a:r>
+              <a:rPr lang="en-US" altLang="zh-CN" dirty="0" err="1" smtClean="0"/>
+              <a:t>gRPC</a:t>
+            </a:r>
+            <a:r>
+              <a:rPr lang="zh-CN" altLang="en-US" dirty="0" smtClean="0"/>
+              <a:t>傳輸過程</a:t>
+            </a:r>
+            <a:endParaRPr lang="zh-TW" altLang="en-US" dirty="0"/>
+          </a:p>
+        </p:txBody>
+      </p:sp>
+      <p:sp>
+        <p:nvSpPr>
+          <p:cNvPr id="3" name="內容版面配置區 2"/>
+          <p:cNvSpPr>
+            <a:spLocks noGrp="1"/>
+          </p:cNvSpPr>
+          <p:nvPr>
+            <p:ph sz="quarter" idx="13"/>
+          </p:nvPr>
+        </p:nvSpPr>
+        <p:spPr/>
+        <p:txBody>
+          <a:bodyPr/>
+          <a:lstStyle/>
+          <a:p>
             <a:endParaRPr lang="zh-TW" altLang="en-US"/>
           </a:p>
         </p:txBody>
       </p:sp>
       <p:sp>
         <p:nvSpPr>
-          <p:cNvPr id="3" name="內容版面配置區 2"/>
-          <p:cNvSpPr>
-            <a:spLocks noGrp="1"/>
-          </p:cNvSpPr>
-          <p:nvPr>
-            <p:ph sz="quarter" idx="13"/>
+          <p:cNvPr id="4" name="內容版面配置區 3"/>
+          <p:cNvSpPr>
+            <a:spLocks noGrp="1"/>
+          </p:cNvSpPr>
+          <p:nvPr>
+            <p:ph sz="half" idx="1"/>
           </p:nvPr>
         </p:nvSpPr>
         <p:spPr/>
@@ -15910,87 +15943,57 @@
           <a:bodyPr/>
           <a:lstStyle/>
           <a:p>
-            <a:endParaRPr lang="zh-TW" altLang="en-US"/>
-          </a:p>
-        </p:txBody>
-      </p:sp>
-      <p:sp>
-        <p:nvSpPr>
-          <p:cNvPr id="4" name="內容版面配置區 3"/>
-          <p:cNvSpPr>
-            <a:spLocks noGrp="1"/>
-          </p:cNvSpPr>
-          <p:nvPr>
-            <p:ph sz="half" idx="1"/>
-          </p:nvPr>
-        </p:nvSpPr>
-        <p:spPr/>
-        <p:txBody>
-          <a:bodyPr/>
-          <a:lstStyle/>
-          <a:p>
+            <a:pPr marL="514350" indent="-514350">
+              <a:buAutoNum type="arabicPeriod"/>
+            </a:pPr>
+            <a:r>
+              <a:rPr lang="en-US" altLang="zh-CN" dirty="0" smtClean="0"/>
+              <a:t>http2</a:t>
+            </a:r>
+          </a:p>
+          <a:p>
+            <a:pPr marL="514350" indent="-514350">
+              <a:buAutoNum type="arabicPeriod"/>
+            </a:pPr>
+            <a:r>
+              <a:rPr lang="en-US" altLang="zh-CN" dirty="0" smtClean="0"/>
+              <a:t>Proto</a:t>
+            </a:r>
+          </a:p>
+          <a:p>
+            <a:pPr marL="514350" indent="-514350">
+              <a:buAutoNum type="arabicPeriod"/>
+            </a:pPr>
+            <a:r>
+              <a:rPr lang="en-US" altLang="zh-TW" dirty="0" smtClean="0"/>
+              <a:t>2</a:t>
+            </a:r>
+            <a:r>
+              <a:rPr lang="zh-CN" altLang="en-US" dirty="0" smtClean="0"/>
+              <a:t>進制封裝</a:t>
+            </a:r>
+            <a:endParaRPr lang="en-US" altLang="zh-CN" dirty="0" smtClean="0"/>
+          </a:p>
+          <a:p>
+            <a:pPr marL="514350" indent="-514350">
+              <a:buAutoNum type="arabicPeriod"/>
+            </a:pPr>
+            <a:r>
+              <a:rPr lang="en-US" altLang="zh-TW" dirty="0" smtClean="0"/>
+              <a:t>2</a:t>
+            </a:r>
+            <a:r>
+              <a:rPr lang="zh-CN" altLang="en-US" dirty="0" smtClean="0"/>
+              <a:t>進制拆裝</a:t>
+            </a:r>
             <a:endParaRPr lang="zh-TW" altLang="en-US" dirty="0"/>
           </a:p>
         </p:txBody>
       </p:sp>
-      <p:pic>
-        <p:nvPicPr>
-          <p:cNvPr id="1026" name="Picture 2"/>
-          <p:cNvPicPr>
-            <a:picLocks noChangeAspect="1" noChangeArrowheads="1"/>
-          </p:cNvPicPr>
-          <p:nvPr/>
-        </p:nvPicPr>
-        <p:blipFill>
-          <a:blip r:embed="rId2">
-            <a:extLst>
-              <a:ext uri="{28A0092B-C50C-407E-A947-70E740481C1C}">
-                <a14:useLocalDpi xmlns:a14="http://schemas.microsoft.com/office/drawing/2010/main" val="0"/>
-              </a:ext>
-            </a:extLst>
-          </a:blip>
-          <a:srcRect/>
-          <a:stretch>
-            <a:fillRect/>
-          </a:stretch>
-        </p:blipFill>
-        <p:spPr bwMode="auto">
-          <a:xfrm>
-            <a:off x="926833" y="1930399"/>
-            <a:ext cx="6276975" cy="4467225"/>
-          </a:xfrm>
-          <a:prstGeom prst="rect">
-            <a:avLst/>
-          </a:prstGeom>
-          <a:noFill/>
-          <a:ln>
-            <a:noFill/>
-          </a:ln>
-          <a:extLst>
-            <a:ext uri="{909E8E84-426E-40DD-AFC4-6F175D3DCCD1}">
-              <a14:hiddenFill xmlns:a14="http://schemas.microsoft.com/office/drawing/2010/main">
-                <a:solidFill>
-                  <a:schemeClr val="accent1"/>
-                </a:solidFill>
-              </a14:hiddenFill>
-            </a:ext>
-            <a:ext uri="{91240B29-F687-4F45-9708-019B960494DF}">
-              <a14:hiddenLine xmlns:a14="http://schemas.microsoft.com/office/drawing/2010/main" w="9525">
-                <a:solidFill>
-                  <a:schemeClr val="tx1"/>
-                </a:solidFill>
-                <a:miter lim="800000"/>
-                <a:headEnd/>
-                <a:tailEnd/>
-              </a14:hiddenLine>
-            </a:ext>
-          </a:extLst>
-        </p:spPr>
-      </p:pic>
     </p:spTree>
     <p:extLst>
       <p:ext uri="{BB962C8B-B14F-4D97-AF65-F5344CB8AC3E}">
-        <p14:creationId xmlns:p14="http://schemas.microsoft.com/office/powerpoint/2010/main" val="2227107922"/>
+        <p14:creationId xmlns:p14="http://schemas.microsoft.com/office/powerpoint/2010/main" val="2793997708"/>
       </p:ext>
     </p:extLst>
   </p:cSld>
@@ -16032,6 +16035,147 @@
           <a:bodyPr/>
           <a:lstStyle/>
           <a:p>
+            <a:endParaRPr lang="zh-TW" altLang="en-US"/>
+          </a:p>
+        </p:txBody>
+      </p:sp>
+      <p:sp>
+        <p:nvSpPr>
+          <p:cNvPr id="3" name="內容版面配置區 2"/>
+          <p:cNvSpPr>
+            <a:spLocks noGrp="1"/>
+          </p:cNvSpPr>
+          <p:nvPr>
+            <p:ph sz="quarter" idx="13"/>
+          </p:nvPr>
+        </p:nvSpPr>
+        <p:spPr/>
+        <p:txBody>
+          <a:bodyPr/>
+          <a:lstStyle/>
+          <a:p>
+            <a:endParaRPr lang="zh-TW" altLang="en-US"/>
+          </a:p>
+        </p:txBody>
+      </p:sp>
+      <p:sp>
+        <p:nvSpPr>
+          <p:cNvPr id="4" name="內容版面配置區 3"/>
+          <p:cNvSpPr>
+            <a:spLocks noGrp="1"/>
+          </p:cNvSpPr>
+          <p:nvPr>
+            <p:ph sz="half" idx="1"/>
+          </p:nvPr>
+        </p:nvSpPr>
+        <p:spPr/>
+        <p:txBody>
+          <a:bodyPr/>
+          <a:lstStyle/>
+          <a:p>
+            <a:endParaRPr lang="zh-TW" altLang="en-US" dirty="0"/>
+          </a:p>
+        </p:txBody>
+      </p:sp>
+      <p:pic>
+        <p:nvPicPr>
+          <p:cNvPr id="1026" name="Picture 2"/>
+          <p:cNvPicPr>
+            <a:picLocks noChangeAspect="1" noChangeArrowheads="1"/>
+          </p:cNvPicPr>
+          <p:nvPr/>
+        </p:nvPicPr>
+        <p:blipFill>
+          <a:blip r:embed="rId2">
+            <a:extLst>
+              <a:ext uri="{28A0092B-C50C-407E-A947-70E740481C1C}">
+                <a14:useLocalDpi xmlns:a14="http://schemas.microsoft.com/office/drawing/2010/main" val="0"/>
+              </a:ext>
+            </a:extLst>
+          </a:blip>
+          <a:srcRect/>
+          <a:stretch>
+            <a:fillRect/>
+          </a:stretch>
+        </p:blipFill>
+        <p:spPr bwMode="auto">
+          <a:xfrm>
+            <a:off x="926833" y="1930399"/>
+            <a:ext cx="6276975" cy="4467225"/>
+          </a:xfrm>
+          <a:prstGeom prst="rect">
+            <a:avLst/>
+          </a:prstGeom>
+          <a:noFill/>
+          <a:ln>
+            <a:noFill/>
+          </a:ln>
+          <a:extLst>
+            <a:ext uri="{909E8E84-426E-40DD-AFC4-6F175D3DCCD1}">
+              <a14:hiddenFill xmlns:a14="http://schemas.microsoft.com/office/drawing/2010/main">
+                <a:solidFill>
+                  <a:schemeClr val="accent1"/>
+                </a:solidFill>
+              </a14:hiddenFill>
+            </a:ext>
+            <a:ext uri="{91240B29-F687-4F45-9708-019B960494DF}">
+              <a14:hiddenLine xmlns:a14="http://schemas.microsoft.com/office/drawing/2010/main" w="9525">
+                <a:solidFill>
+                  <a:schemeClr val="tx1"/>
+                </a:solidFill>
+                <a:miter lim="800000"/>
+                <a:headEnd/>
+                <a:tailEnd/>
+              </a14:hiddenLine>
+            </a:ext>
+          </a:extLst>
+        </p:spPr>
+      </p:pic>
+    </p:spTree>
+    <p:extLst>
+      <p:ext uri="{BB962C8B-B14F-4D97-AF65-F5344CB8AC3E}">
+        <p14:creationId xmlns:p14="http://schemas.microsoft.com/office/powerpoint/2010/main" val="2227107922"/>
+      </p:ext>
+    </p:extLst>
+  </p:cSld>
+  <p:clrMapOvr>
+    <a:masterClrMapping/>
+  </p:clrMapOvr>
+</p:sld>
+</file>
+
+<file path=ppt/slides/slide12.xml><?xml version="1.0" encoding="utf-8"?>
+<p:sld xmlns:a="http://schemas.openxmlformats.org/drawingml/2006/main" xmlns:r="http://schemas.openxmlformats.org/officeDocument/2006/relationships" xmlns:p="http://schemas.openxmlformats.org/presentationml/2006/main">
+  <p:cSld>
+    <p:spTree>
+      <p:nvGrpSpPr>
+        <p:cNvPr id="1" name=""/>
+        <p:cNvGrpSpPr/>
+        <p:nvPr/>
+      </p:nvGrpSpPr>
+      <p:grpSpPr>
+        <a:xfrm>
+          <a:off x="0" y="0"/>
+          <a:ext cx="0" cy="0"/>
+          <a:chOff x="0" y="0"/>
+          <a:chExt cx="0" cy="0"/>
+        </a:xfrm>
+      </p:grpSpPr>
+      <p:sp>
+        <p:nvSpPr>
+          <p:cNvPr id="2" name="標題 1"/>
+          <p:cNvSpPr>
+            <a:spLocks noGrp="1"/>
+          </p:cNvSpPr>
+          <p:nvPr>
+            <p:ph type="title"/>
+          </p:nvPr>
+        </p:nvSpPr>
+        <p:spPr/>
+        <p:txBody>
+          <a:bodyPr/>
+          <a:lstStyle/>
+          <a:p>
             <a:r>
               <a:rPr lang="zh-CN" altLang="en-US" dirty="0"/>
               <a:t>生产环境如何使用 </a:t>
@@ -16159,7 +16303,283 @@
 </p:sld>
 </file>
 
-<file path=ppt/slides/slide12.xml><?xml version="1.0" encoding="utf-8"?>
+<file path=ppt/slides/slide13.xml><?xml version="1.0" encoding="utf-8"?>
+<p:sld xmlns:a="http://schemas.openxmlformats.org/drawingml/2006/main" xmlns:r="http://schemas.openxmlformats.org/officeDocument/2006/relationships" xmlns:p="http://schemas.openxmlformats.org/presentationml/2006/main">
+  <p:cSld>
+    <p:spTree>
+      <p:nvGrpSpPr>
+        <p:cNvPr id="1" name=""/>
+        <p:cNvGrpSpPr/>
+        <p:nvPr/>
+      </p:nvGrpSpPr>
+      <p:grpSpPr>
+        <a:xfrm>
+          <a:off x="0" y="0"/>
+          <a:ext cx="0" cy="0"/>
+          <a:chOff x="0" y="0"/>
+          <a:chExt cx="0" cy="0"/>
+        </a:xfrm>
+      </p:grpSpPr>
+      <p:sp>
+        <p:nvSpPr>
+          <p:cNvPr id="2" name="標題 1"/>
+          <p:cNvSpPr>
+            <a:spLocks noGrp="1"/>
+          </p:cNvSpPr>
+          <p:nvPr>
+            <p:ph type="title"/>
+          </p:nvPr>
+        </p:nvSpPr>
+        <p:spPr/>
+        <p:txBody>
+          <a:bodyPr/>
+          <a:lstStyle/>
+          <a:p>
+            <a:r>
+              <a:rPr lang="en-US" altLang="zh-CN" dirty="0" smtClean="0"/>
+              <a:t>Node.js </a:t>
+            </a:r>
+            <a:r>
+              <a:rPr lang="en-US" altLang="zh-CN" dirty="0" err="1" smtClean="0"/>
+              <a:t>gRPC</a:t>
+            </a:r>
+            <a:endParaRPr lang="zh-TW" altLang="en-US" dirty="0"/>
+          </a:p>
+        </p:txBody>
+      </p:sp>
+      <p:sp>
+        <p:nvSpPr>
+          <p:cNvPr id="3" name="內容版面配置區 2"/>
+          <p:cNvSpPr>
+            <a:spLocks noGrp="1"/>
+          </p:cNvSpPr>
+          <p:nvPr>
+            <p:ph sz="quarter" idx="13"/>
+          </p:nvPr>
+        </p:nvSpPr>
+        <p:spPr/>
+        <p:txBody>
+          <a:bodyPr/>
+          <a:lstStyle/>
+          <a:p>
+            <a:endParaRPr lang="zh-TW" altLang="en-US"/>
+          </a:p>
+        </p:txBody>
+      </p:sp>
+      <p:sp>
+        <p:nvSpPr>
+          <p:cNvPr id="4" name="內容版面配置區 3"/>
+          <p:cNvSpPr>
+            <a:spLocks noGrp="1"/>
+          </p:cNvSpPr>
+          <p:nvPr>
+            <p:ph sz="half" idx="1"/>
+          </p:nvPr>
+        </p:nvSpPr>
+        <p:spPr/>
+        <p:txBody>
+          <a:bodyPr/>
+          <a:lstStyle/>
+          <a:p>
+            <a:r>
+              <a:rPr lang="en-US" altLang="zh-CN" dirty="0" err="1" smtClean="0"/>
+              <a:t>Clinet</a:t>
+            </a:r>
+            <a:r>
+              <a:rPr lang="zh-CN" altLang="en-US" dirty="0" smtClean="0"/>
+              <a:t>的實驗環境</a:t>
+            </a:r>
+            <a:endParaRPr lang="en-US" altLang="zh-CN" dirty="0" smtClean="0"/>
+          </a:p>
+          <a:p>
+            <a:r>
+              <a:rPr lang="en-US" altLang="zh-CN" dirty="0" smtClean="0"/>
+              <a:t>	Node v12.15.0</a:t>
+            </a:r>
+          </a:p>
+          <a:p>
+            <a:r>
+              <a:rPr lang="en-US" altLang="zh-TW" dirty="0" smtClean="0"/>
+              <a:t>	</a:t>
+            </a:r>
+            <a:r>
+              <a:rPr lang="en-US" altLang="zh-TW" dirty="0" err="1" smtClean="0"/>
+              <a:t>Npm</a:t>
+            </a:r>
+            <a:r>
+              <a:rPr lang="en-US" altLang="zh-TW" dirty="0" smtClean="0"/>
+              <a:t> 6.13.4</a:t>
+            </a:r>
+          </a:p>
+          <a:p>
+            <a:r>
+              <a:rPr lang="en-US" altLang="zh-TW" dirty="0" err="1" smtClean="0"/>
+              <a:t>Npm</a:t>
+            </a:r>
+            <a:r>
+              <a:rPr lang="en-US" altLang="zh-TW" dirty="0" smtClean="0"/>
+              <a:t> </a:t>
+            </a:r>
+            <a:r>
+              <a:rPr lang="zh-CN" altLang="en-US" dirty="0" smtClean="0"/>
+              <a:t>的包</a:t>
+            </a:r>
+            <a:endParaRPr lang="en-US" altLang="zh-CN" dirty="0" smtClean="0"/>
+          </a:p>
+          <a:p>
+            <a:r>
+              <a:rPr lang="en-US" altLang="zh-TW" dirty="0" smtClean="0"/>
+              <a:t>	</a:t>
+            </a:r>
+            <a:r>
+              <a:rPr lang="en-US" altLang="zh-TW" dirty="0" err="1" smtClean="0"/>
+              <a:t>async</a:t>
+            </a:r>
+            <a:endParaRPr lang="en-US" altLang="zh-TW" dirty="0" smtClean="0"/>
+          </a:p>
+          <a:p>
+            <a:r>
+              <a:rPr lang="en-US" altLang="zh-TW" dirty="0"/>
+              <a:t>	</a:t>
+            </a:r>
+            <a:r>
+              <a:rPr lang="en-US" altLang="zh-TW" dirty="0" err="1" smtClean="0"/>
+              <a:t>grpc</a:t>
+            </a:r>
+            <a:endParaRPr lang="en-US" altLang="zh-TW" dirty="0" smtClean="0"/>
+          </a:p>
+          <a:p>
+            <a:r>
+              <a:rPr lang="en-US" altLang="zh-TW" dirty="0"/>
+              <a:t>	</a:t>
+            </a:r>
+            <a:r>
+              <a:rPr lang="en-US" altLang="zh-TW" dirty="0" err="1" smtClean="0"/>
+              <a:t>lodash</a:t>
+            </a:r>
+            <a:endParaRPr lang="en-US" altLang="zh-TW" dirty="0" smtClean="0"/>
+          </a:p>
+          <a:p>
+            <a:r>
+              <a:rPr lang="en-US" altLang="zh-TW" dirty="0"/>
+              <a:t>	</a:t>
+            </a:r>
+            <a:r>
+              <a:rPr lang="en-US" altLang="zh-TW" dirty="0" smtClean="0"/>
+              <a:t>@</a:t>
+            </a:r>
+            <a:r>
+              <a:rPr lang="en-US" altLang="zh-TW" dirty="0" err="1" smtClean="0"/>
+              <a:t>grpc</a:t>
+            </a:r>
+            <a:r>
+              <a:rPr lang="en-US" altLang="zh-TW" dirty="0" smtClean="0"/>
+              <a:t>/proto-loader</a:t>
+            </a:r>
+          </a:p>
+        </p:txBody>
+      </p:sp>
+    </p:spTree>
+    <p:extLst>
+      <p:ext uri="{BB962C8B-B14F-4D97-AF65-F5344CB8AC3E}">
+        <p14:creationId xmlns:p14="http://schemas.microsoft.com/office/powerpoint/2010/main" val="1841034900"/>
+      </p:ext>
+    </p:extLst>
+  </p:cSld>
+  <p:clrMapOvr>
+    <a:masterClrMapping/>
+  </p:clrMapOvr>
+</p:sld>
+</file>
+
+<file path=ppt/slides/slide14.xml><?xml version="1.0" encoding="utf-8"?>
+<p:sld xmlns:a="http://schemas.openxmlformats.org/drawingml/2006/main" xmlns:r="http://schemas.openxmlformats.org/officeDocument/2006/relationships" xmlns:p="http://schemas.openxmlformats.org/presentationml/2006/main">
+  <p:cSld>
+    <p:spTree>
+      <p:nvGrpSpPr>
+        <p:cNvPr id="1" name=""/>
+        <p:cNvGrpSpPr/>
+        <p:nvPr/>
+      </p:nvGrpSpPr>
+      <p:grpSpPr>
+        <a:xfrm>
+          <a:off x="0" y="0"/>
+          <a:ext cx="0" cy="0"/>
+          <a:chOff x="0" y="0"/>
+          <a:chExt cx="0" cy="0"/>
+        </a:xfrm>
+      </p:grpSpPr>
+      <p:sp>
+        <p:nvSpPr>
+          <p:cNvPr id="2" name="標題 1"/>
+          <p:cNvSpPr>
+            <a:spLocks noGrp="1"/>
+          </p:cNvSpPr>
+          <p:nvPr>
+            <p:ph type="title"/>
+          </p:nvPr>
+        </p:nvSpPr>
+        <p:spPr/>
+        <p:txBody>
+          <a:bodyPr/>
+          <a:lstStyle/>
+          <a:p>
+            <a:endParaRPr lang="zh-TW" altLang="en-US"/>
+          </a:p>
+        </p:txBody>
+      </p:sp>
+      <p:sp>
+        <p:nvSpPr>
+          <p:cNvPr id="3" name="內容版面配置區 2"/>
+          <p:cNvSpPr>
+            <a:spLocks noGrp="1"/>
+          </p:cNvSpPr>
+          <p:nvPr>
+            <p:ph sz="quarter" idx="13"/>
+          </p:nvPr>
+        </p:nvSpPr>
+        <p:spPr/>
+        <p:txBody>
+          <a:bodyPr/>
+          <a:lstStyle/>
+          <a:p>
+            <a:endParaRPr lang="zh-TW" altLang="en-US"/>
+          </a:p>
+        </p:txBody>
+      </p:sp>
+      <p:sp>
+        <p:nvSpPr>
+          <p:cNvPr id="4" name="內容版面配置區 3"/>
+          <p:cNvSpPr>
+            <a:spLocks noGrp="1"/>
+          </p:cNvSpPr>
+          <p:nvPr>
+            <p:ph sz="half" idx="1"/>
+          </p:nvPr>
+        </p:nvSpPr>
+        <p:spPr/>
+        <p:txBody>
+          <a:bodyPr/>
+          <a:lstStyle/>
+          <a:p>
+            <a:endParaRPr lang="zh-TW" altLang="en-US"/>
+          </a:p>
+        </p:txBody>
+      </p:sp>
+    </p:spTree>
+    <p:extLst>
+      <p:ext uri="{BB962C8B-B14F-4D97-AF65-F5344CB8AC3E}">
+        <p14:creationId xmlns:p14="http://schemas.microsoft.com/office/powerpoint/2010/main" val="2491741162"/>
+      </p:ext>
+    </p:extLst>
+  </p:cSld>
+  <p:clrMapOvr>
+    <a:masterClrMapping/>
+  </p:clrMapOvr>
+</p:sld>
+</file>
+
+<file path=ppt/slides/slide15.xml><?xml version="1.0" encoding="utf-8"?>
 <p:sld xmlns:a="http://schemas.openxmlformats.org/drawingml/2006/main" xmlns:r="http://schemas.openxmlformats.org/officeDocument/2006/relationships" xmlns:p="http://schemas.openxmlformats.org/presentationml/2006/main">
   <p:cSld>
     <p:spTree>
@@ -17291,7 +17711,11 @@
             </a:pPr>
             <a:r>
               <a:rPr lang="zh-CN" altLang="en-US" dirty="0" smtClean="0"/>
-              <a:t>雙向的流（</a:t>
+              <a:t>雙向的</a:t>
+            </a:r>
+            <a:r>
+              <a:rPr lang="zh-CN" altLang="en-US" dirty="0" smtClean="0"/>
+              <a:t>流（）必須借住（</a:t>
             </a:r>
             <a:r>
               <a:rPr lang="en-US" altLang="zh-CN" dirty="0" err="1" smtClean="0"/>
@@ -17299,7 +17723,15 @@
             </a:r>
             <a:r>
               <a:rPr lang="zh-CN" altLang="en-US" dirty="0" smtClean="0"/>
-              <a:t>）根本不可能</a:t>
+              <a:t>）</a:t>
+            </a:r>
+            <a:r>
+              <a:rPr lang="zh-CN" altLang="en-US" dirty="0" smtClean="0"/>
+              <a:t>才能</a:t>
+            </a:r>
+            <a:r>
+              <a:rPr lang="zh-CN" altLang="en-US" dirty="0"/>
+              <a:t>實現</a:t>
             </a:r>
             <a:endParaRPr lang="en-US" altLang="zh-CN" dirty="0" smtClean="0"/>
           </a:p>
@@ -17318,12 +17750,17 @@
             </a:r>
             <a:r>
               <a:rPr lang="zh-CN" altLang="en-US" dirty="0" smtClean="0"/>
-              <a:t>不會有規範的文件</a:t>
+              <a:t>不會有規範</a:t>
+            </a:r>
+            <a:r>
+              <a:rPr lang="zh-CN" altLang="en-US" dirty="0" smtClean="0"/>
+              <a:t>的文件</a:t>
             </a:r>
             <a:r>
               <a:rPr lang="en-US" altLang="zh-CN" dirty="0" smtClean="0"/>
               <a:t>)</a:t>
             </a:r>
+            <a:endParaRPr lang="en-US" altLang="zh-CN" dirty="0" smtClean="0"/>
           </a:p>
           <a:p>
             <a:pPr marL="457200" indent="-457200">
@@ -17336,7 +17773,11 @@
             </a:r>
             <a:r>
               <a:rPr lang="zh-CN" altLang="en-US" dirty="0" smtClean="0"/>
-              <a:t>難再一個請求中取得多個資源數據</a:t>
+              <a:t>難再一個請求中取得多個資源</a:t>
+            </a:r>
+            <a:r>
+              <a:rPr lang="zh-CN" altLang="en-US" dirty="0" smtClean="0"/>
+              <a:t>數據</a:t>
             </a:r>
             <a:r>
               <a:rPr lang="en-US" altLang="zh-CN" dirty="0" smtClean="0"/>
@@ -17358,6 +17799,7 @@
               <a:rPr lang="en-US" altLang="zh-CN" dirty="0" smtClean="0"/>
               <a:t>)</a:t>
             </a:r>
+            <a:endParaRPr lang="en-US" altLang="zh-CN" dirty="0" smtClean="0"/>
           </a:p>
           <a:p>
             <a:pPr marL="457200" indent="-457200">
@@ -17534,11 +17976,7 @@
             </a:r>
             <a:r>
               <a:rPr lang="zh-CN" altLang="en-US" dirty="0" smtClean="0"/>
-              <a:t>我們</a:t>
-            </a:r>
-            <a:r>
-              <a:rPr lang="zh-CN" altLang="en-US" dirty="0" smtClean="0"/>
-              <a:t>從寫</a:t>
+              <a:t>我們從寫</a:t>
             </a:r>
             <a:r>
               <a:rPr lang="en-US" altLang="zh-CN" dirty="0" err="1" smtClean="0"/>
@@ -17562,11 +18000,7 @@
             </a:r>
             <a:r>
               <a:rPr lang="zh-CN" altLang="en-US" dirty="0" smtClean="0"/>
-              <a:t>開始</a:t>
-            </a:r>
-            <a:r>
-              <a:rPr lang="zh-CN" altLang="en-US" dirty="0" smtClean="0"/>
-              <a:t>。</a:t>
+              <a:t>開始。</a:t>
             </a:r>
             <a:endParaRPr lang="en-US" altLang="zh-CN" dirty="0" smtClean="0"/>
           </a:p>
@@ -17929,7 +18363,7 @@
   <a:extraClrSchemeLst/>
   <a:extLst>
     <a:ext uri="{05A4C25C-085E-4340-85A3-A5531E510DB2}">
-      <thm15:themeFamily xmlns="" xmlns:thm15="http://schemas.microsoft.com/office/thememl/2012/main" name="Office Theme" id="{62F939B6-93AF-4DB8-9C6B-D6C7DFDC589F}" vid="{4A3C46E8-61CC-4603-A589-7422A47A8E4A}"/>
+      <thm15:themeFamily xmlns:thm15="http://schemas.microsoft.com/office/thememl/2012/main" xmlns="" name="Office Theme" id="{62F939B6-93AF-4DB8-9C6B-D6C7DFDC589F}" vid="{4A3C46E8-61CC-4603-A589-7422A47A8E4A}"/>
     </a:ext>
   </a:extLst>
 </a:theme>

</xml_diff>